<commit_message>
Just small edits while reading
</commit_message>
<xml_diff>
--- a/06_ohjelmistoarkkitehtuurit_ja_patternit/ApacheKafka_DistributedEventStreamOrBroker.pptx
+++ b/06_ohjelmistoarkkitehtuurit_ja_patternit/ApacheKafka_DistributedEventStreamOrBroker.pptx
@@ -5,18 +5,19 @@
     <p:sldMasterId id="2147483648" r:id="rId4"/>
   </p:sldMasterIdLst>
   <p:notesMasterIdLst>
-    <p:notesMasterId r:id="rId14"/>
+    <p:notesMasterId r:id="rId15"/>
   </p:notesMasterIdLst>
   <p:sldIdLst>
     <p:sldId id="256" r:id="rId5"/>
     <p:sldId id="259" r:id="rId6"/>
     <p:sldId id="267" r:id="rId7"/>
     <p:sldId id="268" r:id="rId8"/>
-    <p:sldId id="282" r:id="rId9"/>
-    <p:sldId id="283" r:id="rId10"/>
-    <p:sldId id="269" r:id="rId11"/>
-    <p:sldId id="270" r:id="rId12"/>
-    <p:sldId id="266" r:id="rId13"/>
+    <p:sldId id="284" r:id="rId9"/>
+    <p:sldId id="282" r:id="rId10"/>
+    <p:sldId id="283" r:id="rId11"/>
+    <p:sldId id="269" r:id="rId12"/>
+    <p:sldId id="270" r:id="rId13"/>
+    <p:sldId id="266" r:id="rId14"/>
   </p:sldIdLst>
   <p:sldSz cx="12192000" cy="6858000"/>
   <p:notesSz cx="6858000" cy="9144000"/>
@@ -6839,6 +6840,234 @@
 </p:sld>
 </file>
 
+<file path=ppt/slides/slide10.xml><?xml version="1.0" encoding="utf-8"?>
+<p:sld xmlns:a="http://schemas.openxmlformats.org/drawingml/2006/main" xmlns:r="http://schemas.openxmlformats.org/officeDocument/2006/relationships" xmlns:p="http://schemas.openxmlformats.org/presentationml/2006/main">
+  <p:cSld>
+    <p:spTree>
+      <p:nvGrpSpPr>
+        <p:cNvPr id="1" name=""/>
+        <p:cNvGrpSpPr/>
+        <p:nvPr/>
+      </p:nvGrpSpPr>
+      <p:grpSpPr>
+        <a:xfrm>
+          <a:off x="0" y="0"/>
+          <a:ext cx="0" cy="0"/>
+          <a:chOff x="0" y="0"/>
+          <a:chExt cx="0" cy="0"/>
+        </a:xfrm>
+      </p:grpSpPr>
+      <p:sp>
+        <p:nvSpPr>
+          <p:cNvPr id="8" name="Title 7">
+            <a:extLst>
+              <a:ext uri="{FF2B5EF4-FFF2-40B4-BE49-F238E27FC236}">
+                <a16:creationId xmlns:a16="http://schemas.microsoft.com/office/drawing/2014/main" id="{49202545-D26B-485C-9E25-62859E92ED89}"/>
+              </a:ext>
+            </a:extLst>
+          </p:cNvPr>
+          <p:cNvSpPr>
+            <a:spLocks noGrp="1"/>
+          </p:cNvSpPr>
+          <p:nvPr>
+            <p:ph type="title"/>
+          </p:nvPr>
+        </p:nvSpPr>
+        <p:spPr/>
+        <p:txBody>
+          <a:bodyPr/>
+          <a:lstStyle/>
+          <a:p>
+            <a:r>
+              <a:rPr lang="fi-FI" dirty="0" err="1"/>
+              <a:t>Happy</a:t>
+            </a:r>
+            <a:r>
+              <a:rPr lang="fi-FI" dirty="0"/>
+              <a:t> </a:t>
+            </a:r>
+            <a:r>
+              <a:rPr lang="fi-FI" dirty="0" err="1"/>
+              <a:t>hacking</a:t>
+            </a:r>
+            <a:r>
+              <a:rPr lang="fi-FI" dirty="0"/>
+              <a:t>!</a:t>
+            </a:r>
+            <a:endParaRPr lang="LID4096" dirty="0"/>
+          </a:p>
+        </p:txBody>
+      </p:sp>
+      <p:sp>
+        <p:nvSpPr>
+          <p:cNvPr id="9" name="Text Placeholder 8">
+            <a:extLst>
+              <a:ext uri="{FF2B5EF4-FFF2-40B4-BE49-F238E27FC236}">
+                <a16:creationId xmlns:a16="http://schemas.microsoft.com/office/drawing/2014/main" id="{B5958F18-B2CD-466B-9484-119914465620}"/>
+              </a:ext>
+            </a:extLst>
+          </p:cNvPr>
+          <p:cNvSpPr>
+            <a:spLocks noGrp="1"/>
+          </p:cNvSpPr>
+          <p:nvPr>
+            <p:ph type="body" idx="1"/>
+          </p:nvPr>
+        </p:nvSpPr>
+        <p:spPr>
+          <a:xfrm>
+            <a:off x="6096000" y="4061598"/>
+            <a:ext cx="5580062" cy="1672452"/>
+          </a:xfrm>
+        </p:spPr>
+        <p:txBody>
+          <a:bodyPr/>
+          <a:lstStyle/>
+          <a:p>
+            <a:r>
+              <a:rPr lang="fi-FI" dirty="0" err="1"/>
+              <a:t>Remember</a:t>
+            </a:r>
+            <a:r>
+              <a:rPr lang="fi-FI" dirty="0"/>
+              <a:t> </a:t>
+            </a:r>
+            <a:r>
+              <a:rPr lang="fi-FI" dirty="0" err="1"/>
+              <a:t>also</a:t>
+            </a:r>
+            <a:r>
+              <a:rPr lang="fi-FI" dirty="0"/>
+              <a:t> </a:t>
+            </a:r>
+            <a:r>
+              <a:rPr lang="fi-FI" dirty="0" err="1"/>
+              <a:t>worklife</a:t>
+            </a:r>
+            <a:r>
+              <a:rPr lang="fi-FI" dirty="0"/>
+              <a:t> </a:t>
+            </a:r>
+            <a:r>
+              <a:rPr lang="fi-FI" dirty="0" err="1"/>
+              <a:t>balance</a:t>
+            </a:r>
+            <a:r>
+              <a:rPr lang="fi-FI" dirty="0"/>
+              <a:t> and </a:t>
+            </a:r>
+            <a:r>
+              <a:rPr lang="fi-FI" dirty="0" err="1"/>
+              <a:t>outdoor</a:t>
+            </a:r>
+            <a:r>
+              <a:rPr lang="fi-FI" dirty="0"/>
+              <a:t> </a:t>
+            </a:r>
+            <a:r>
+              <a:rPr lang="fi-FI" dirty="0" err="1"/>
+              <a:t>activities</a:t>
+            </a:r>
+            <a:endParaRPr lang="LID4096" dirty="0"/>
+          </a:p>
+        </p:txBody>
+      </p:sp>
+      <p:sp>
+        <p:nvSpPr>
+          <p:cNvPr id="3" name="Date Placeholder 2">
+            <a:extLst>
+              <a:ext uri="{FF2B5EF4-FFF2-40B4-BE49-F238E27FC236}">
+                <a16:creationId xmlns:a16="http://schemas.microsoft.com/office/drawing/2014/main" id="{1B360C12-A89E-4C4C-BD2F-3613A5008805}"/>
+              </a:ext>
+            </a:extLst>
+          </p:cNvPr>
+          <p:cNvSpPr>
+            <a:spLocks noGrp="1"/>
+          </p:cNvSpPr>
+          <p:nvPr>
+            <p:ph type="dt" sz="half" idx="10"/>
+          </p:nvPr>
+        </p:nvSpPr>
+        <p:spPr/>
+        <p:txBody>
+          <a:bodyPr/>
+          <a:lstStyle/>
+          <a:p>
+            <a:fld id="{7A2E22EC-FB8F-BE4C-8513-60D11DB7758C}" type="datetime1">
+              <a:rPr lang="fi-FI" smtClean="0"/>
+              <a:t>11.10.2022</a:t>
+            </a:fld>
+            <a:endParaRPr lang="en-GB"/>
+          </a:p>
+        </p:txBody>
+      </p:sp>
+      <p:sp>
+        <p:nvSpPr>
+          <p:cNvPr id="4" name="Footer Placeholder 3">
+            <a:extLst>
+              <a:ext uri="{FF2B5EF4-FFF2-40B4-BE49-F238E27FC236}">
+                <a16:creationId xmlns:a16="http://schemas.microsoft.com/office/drawing/2014/main" id="{C8DE976D-5A91-AB4D-B2D0-A126959D8CD3}"/>
+              </a:ext>
+            </a:extLst>
+          </p:cNvPr>
+          <p:cNvSpPr>
+            <a:spLocks noGrp="1"/>
+          </p:cNvSpPr>
+          <p:nvPr>
+            <p:ph type="ftr" sz="quarter" idx="11"/>
+          </p:nvPr>
+        </p:nvSpPr>
+        <p:spPr/>
+        <p:txBody>
+          <a:bodyPr/>
+          <a:lstStyle/>
+          <a:p>
+            <a:endParaRPr lang="en-GB"/>
+          </a:p>
+        </p:txBody>
+      </p:sp>
+      <p:sp>
+        <p:nvSpPr>
+          <p:cNvPr id="5" name="Slide Number Placeholder 4">
+            <a:extLst>
+              <a:ext uri="{FF2B5EF4-FFF2-40B4-BE49-F238E27FC236}">
+                <a16:creationId xmlns:a16="http://schemas.microsoft.com/office/drawing/2014/main" id="{F8A06A27-2D07-2E41-8780-1ACD4314987F}"/>
+              </a:ext>
+            </a:extLst>
+          </p:cNvPr>
+          <p:cNvSpPr>
+            <a:spLocks noGrp="1"/>
+          </p:cNvSpPr>
+          <p:nvPr>
+            <p:ph type="sldNum" sz="quarter" idx="12"/>
+          </p:nvPr>
+        </p:nvSpPr>
+        <p:spPr/>
+        <p:txBody>
+          <a:bodyPr/>
+          <a:lstStyle/>
+          <a:p>
+            <a:fld id="{76BAB7ED-EDE9-4D4B-9A2D-30E18C47C16E}" type="slidenum">
+              <a:rPr lang="en-GB" smtClean="0"/>
+              <a:t>10</a:t>
+            </a:fld>
+            <a:endParaRPr lang="en-GB"/>
+          </a:p>
+        </p:txBody>
+      </p:sp>
+    </p:spTree>
+    <p:extLst>
+      <p:ext uri="{BB962C8B-B14F-4D97-AF65-F5344CB8AC3E}">
+        <p14:creationId xmlns:p14="http://schemas.microsoft.com/office/powerpoint/2010/main" val="3239231242"/>
+      </p:ext>
+    </p:extLst>
+  </p:cSld>
+  <p:clrMapOvr>
+    <a:masterClrMapping/>
+  </p:clrMapOvr>
+</p:sld>
+</file>
+
 <file path=ppt/slides/slide2.xml><?xml version="1.0" encoding="utf-8"?>
 <p:sld xmlns:a="http://schemas.openxmlformats.org/drawingml/2006/main" xmlns:r="http://schemas.openxmlformats.org/officeDocument/2006/relationships" xmlns:p="http://schemas.openxmlformats.org/presentationml/2006/main">
   <p:cSld>
@@ -6910,20 +7139,16 @@
               <a:buChar char="•"/>
             </a:pPr>
             <a:r>
-              <a:rPr lang="fi-FI" dirty="0"/>
-              <a:t>”</a:t>
-            </a:r>
-            <a:r>
               <a:rPr lang="en-US" dirty="0"/>
-              <a:t> More than </a:t>
+              <a:t>“Apache Kafka is an open-source </a:t>
             </a:r>
             <a:r>
               <a:rPr lang="en-US" b="1" dirty="0"/>
-              <a:t>80% of all Fortune 100 companies </a:t>
+              <a:t>distributed event streaming platform</a:t>
             </a:r>
             <a:r>
               <a:rPr lang="en-US" dirty="0"/>
-              <a:t>trust, and use Kafka”  (</a:t>
+              <a:t> used by thousands of companies for high-performance data pipelines, streaming analytics, data integration, and mission-critical applications.” (</a:t>
             </a:r>
             <a:r>
               <a:rPr lang="en-US" dirty="0">
@@ -6933,7 +7158,7 @@
             </a:r>
             <a:r>
               <a:rPr lang="en-US" dirty="0"/>
-              <a:t>) </a:t>
+              <a:t>)</a:t>
             </a:r>
           </a:p>
           <a:p>
@@ -6942,16 +7167,20 @@
               <a:buChar char="•"/>
             </a:pPr>
             <a:r>
+              <a:rPr lang="fi-FI" dirty="0"/>
+              <a:t>”</a:t>
+            </a:r>
+            <a:r>
               <a:rPr lang="en-US" dirty="0"/>
-              <a:t>“Apache Kafka is an open-source </a:t>
+              <a:t> More than </a:t>
             </a:r>
             <a:r>
               <a:rPr lang="en-US" b="1" dirty="0"/>
-              <a:t>distributed event streaming platform</a:t>
+              <a:t>80% of all Fortune 100 companies </a:t>
             </a:r>
             <a:r>
               <a:rPr lang="en-US" dirty="0"/>
-              <a:t> used by thousands of companies for high-performance data pipelines, streaming analytics, data integration, and mission-critical applications.” (</a:t>
+              <a:t>trust, and use Kafka”  (</a:t>
             </a:r>
             <a:r>
               <a:rPr lang="en-US" dirty="0">
@@ -6961,7 +7190,7 @@
             </a:r>
             <a:r>
               <a:rPr lang="en-US" dirty="0"/>
-              <a:t>) </a:t>
+              <a:t>)  </a:t>
             </a:r>
           </a:p>
           <a:p>
@@ -6971,7 +7200,27 @@
             </a:pPr>
             <a:r>
               <a:rPr lang="en-US" dirty="0"/>
-              <a:t>Usually you should not use the creators/owners of technology as source, especially when very positive terms are used. Here the two statements above have been proven by practice though</a:t>
+              <a:t>Usually you should not use the creators/owners of technology as source, especially when very positive claims are used. Here the two statements above have been proven by practice though.</a:t>
+            </a:r>
+          </a:p>
+          <a:p>
+            <a:pPr>
+              <a:buFont typeface="Arial" panose="020B0604020202020204" pitchFamily="34" charset="0"/>
+              <a:buChar char="•"/>
+            </a:pPr>
+            <a:r>
+              <a:rPr lang="en-US" dirty="0"/>
+              <a:t>Kafka is also developed by the community together and it’s not proprietary project.</a:t>
+            </a:r>
+          </a:p>
+          <a:p>
+            <a:pPr>
+              <a:buFont typeface="Arial" panose="020B0604020202020204" pitchFamily="34" charset="0"/>
+              <a:buChar char="•"/>
+            </a:pPr>
+            <a:r>
+              <a:rPr lang="en-US" dirty="0"/>
+              <a:t>And as we are not doing thesis or other academic research those quotes are maybe ok</a:t>
             </a:r>
             <a:endParaRPr lang="fi-FI" dirty="0"/>
           </a:p>
@@ -7233,8 +7482,12 @@
               <a:buChar char="•"/>
             </a:pPr>
             <a:r>
-              <a:rPr lang="fi-FI" dirty="0"/>
-              <a:t>Publisher </a:t>
+              <a:rPr lang="fi-FI" b="1" dirty="0"/>
+              <a:t>Publisher</a:t>
+            </a:r>
+            <a:r>
+              <a:rPr lang="fi-FI" dirty="0"/>
+              <a:t> </a:t>
             </a:r>
             <a:r>
               <a:rPr lang="fi-FI" dirty="0" err="1"/>
@@ -7245,15 +7498,15 @@
               <a:t> </a:t>
             </a:r>
             <a:r>
-              <a:rPr lang="fi-FI" dirty="0" err="1"/>
+              <a:rPr lang="fi-FI" b="1" dirty="0" err="1"/>
               <a:t>messages</a:t>
             </a:r>
             <a:r>
-              <a:rPr lang="fi-FI" dirty="0"/>
+              <a:rPr lang="fi-FI" b="1" dirty="0"/>
               <a:t>/</a:t>
             </a:r>
             <a:r>
-              <a:rPr lang="fi-FI" dirty="0" err="1"/>
+              <a:rPr lang="fi-FI" b="1" dirty="0" err="1"/>
               <a:t>events</a:t>
             </a:r>
             <a:r>
@@ -7261,23 +7514,23 @@
               <a:t> to </a:t>
             </a:r>
             <a:r>
-              <a:rPr lang="fi-FI" dirty="0" err="1"/>
+              <a:rPr lang="fi-FI" b="1" dirty="0" err="1"/>
               <a:t>stream</a:t>
             </a:r>
             <a:r>
-              <a:rPr lang="fi-FI" dirty="0"/>
+              <a:rPr lang="fi-FI" b="1" dirty="0"/>
               <a:t>/</a:t>
             </a:r>
             <a:r>
-              <a:rPr lang="fi-FI" dirty="0" err="1"/>
+              <a:rPr lang="fi-FI" b="1" dirty="0" err="1"/>
               <a:t>queue</a:t>
             </a:r>
             <a:r>
-              <a:rPr lang="fi-FI" dirty="0"/>
+              <a:rPr lang="fi-FI" b="1" dirty="0"/>
               <a:t>/</a:t>
             </a:r>
             <a:r>
-              <a:rPr lang="fi-FI" dirty="0" err="1"/>
+              <a:rPr lang="fi-FI" b="1" dirty="0" err="1"/>
               <a:t>broker</a:t>
             </a:r>
             <a:r>
@@ -7328,23 +7581,23 @@
               <a:buChar char="•"/>
             </a:pPr>
             <a:r>
-              <a:rPr lang="fi-FI" dirty="0" err="1"/>
+              <a:rPr lang="fi-FI" b="1" dirty="0" err="1"/>
               <a:t>Subscriber</a:t>
             </a:r>
             <a:r>
-              <a:rPr lang="fi-FI" dirty="0"/>
-              <a:t> </a:t>
-            </a:r>
-            <a:r>
-              <a:rPr lang="fi-FI" dirty="0" err="1"/>
+              <a:rPr lang="fi-FI" b="1" dirty="0"/>
+              <a:t> </a:t>
+            </a:r>
+            <a:r>
+              <a:rPr lang="fi-FI" b="1" dirty="0" err="1"/>
               <a:t>subscribes</a:t>
             </a:r>
             <a:r>
-              <a:rPr lang="fi-FI" dirty="0"/>
+              <a:rPr lang="fi-FI" b="1" dirty="0"/>
               <a:t> to </a:t>
             </a:r>
             <a:r>
-              <a:rPr lang="fi-FI" dirty="0" err="1"/>
+              <a:rPr lang="fi-FI" b="1" dirty="0" err="1"/>
               <a:t>receive</a:t>
             </a:r>
             <a:r>
@@ -7558,7 +7811,7 @@
             </a:r>
             <a:r>
               <a:rPr lang="fi-FI" dirty="0" err="1"/>
-              <a:t>less</a:t>
+              <a:t>minimal</a:t>
             </a:r>
             <a:r>
               <a:rPr lang="fi-FI" dirty="0"/>
@@ -7589,6 +7842,14 @@
             </a:r>
             <a:r>
               <a:rPr lang="fi-FI" dirty="0" err="1"/>
+              <a:t>written</a:t>
+            </a:r>
+            <a:r>
+              <a:rPr lang="fi-FI" dirty="0"/>
+              <a:t> </a:t>
+            </a:r>
+            <a:r>
+              <a:rPr lang="fi-FI" dirty="0" err="1"/>
               <a:t>even</a:t>
             </a:r>
             <a:r>
@@ -7629,11 +7890,19 @@
             </a:r>
             <a:r>
               <a:rPr lang="fi-FI" dirty="0" err="1"/>
+              <a:t>the</a:t>
+            </a:r>
+            <a:r>
+              <a:rPr lang="fi-FI" dirty="0"/>
+              <a:t> </a:t>
+            </a:r>
+            <a:r>
+              <a:rPr lang="fi-FI" dirty="0" err="1"/>
               <a:t>message</a:t>
             </a:r>
             <a:r>
               <a:rPr lang="fi-FI" dirty="0"/>
-              <a:t> of </a:t>
+              <a:t> is of a </a:t>
             </a:r>
             <a:r>
               <a:rPr lang="fi-FI" dirty="0" err="1"/>
@@ -7690,6 +7959,70 @@
               <a:rPr lang="fi-FI" dirty="0" err="1"/>
               <a:t>buffering</a:t>
             </a:r>
+            <a:r>
+              <a:rPr lang="fi-FI" dirty="0"/>
+              <a:t> and </a:t>
+            </a:r>
+            <a:r>
+              <a:rPr lang="fi-FI" dirty="0" err="1"/>
+              <a:t>message</a:t>
+            </a:r>
+            <a:r>
+              <a:rPr lang="fi-FI" dirty="0"/>
+              <a:t> </a:t>
+            </a:r>
+            <a:r>
+              <a:rPr lang="fi-FI" dirty="0" err="1"/>
+              <a:t>retention</a:t>
+            </a:r>
+            <a:r>
+              <a:rPr lang="fi-FI" dirty="0"/>
+              <a:t> for long </a:t>
+            </a:r>
+            <a:r>
+              <a:rPr lang="fi-FI" dirty="0" err="1"/>
+              <a:t>time</a:t>
+            </a:r>
+            <a:r>
+              <a:rPr lang="fi-FI" dirty="0"/>
+              <a:t> / ’</a:t>
+            </a:r>
+            <a:r>
+              <a:rPr lang="fi-FI" dirty="0" err="1"/>
+              <a:t>forever</a:t>
+            </a:r>
+            <a:r>
+              <a:rPr lang="fi-FI" dirty="0"/>
+              <a:t>’ </a:t>
+            </a:r>
+            <a:r>
+              <a:rPr lang="fi-FI" dirty="0" err="1"/>
+              <a:t>if</a:t>
+            </a:r>
+            <a:r>
+              <a:rPr lang="fi-FI" dirty="0"/>
+              <a:t> </a:t>
+            </a:r>
+            <a:r>
+              <a:rPr lang="fi-FI" dirty="0" err="1"/>
+              <a:t>we</a:t>
+            </a:r>
+            <a:r>
+              <a:rPr lang="fi-FI" dirty="0"/>
+              <a:t> </a:t>
+            </a:r>
+            <a:r>
+              <a:rPr lang="fi-FI" dirty="0" err="1"/>
+              <a:t>so</a:t>
+            </a:r>
+            <a:r>
+              <a:rPr lang="fi-FI" dirty="0"/>
+              <a:t> </a:t>
+            </a:r>
+            <a:r>
+              <a:rPr lang="fi-FI" dirty="0" err="1"/>
+              <a:t>like</a:t>
+            </a:r>
             <a:endParaRPr lang="fi-FI" dirty="0"/>
           </a:p>
           <a:p>
@@ -7698,32 +8031,44 @@
               <a:buChar char="•"/>
             </a:pPr>
             <a:r>
-              <a:rPr lang="fi-FI" dirty="0"/>
-              <a:t>Message </a:t>
-            </a:r>
-            <a:r>
-              <a:rPr lang="fi-FI" dirty="0" err="1"/>
-              <a:t>retention</a:t>
-            </a:r>
-            <a:r>
-              <a:rPr lang="fi-FI" dirty="0"/>
-              <a:t> for long </a:t>
-            </a:r>
-            <a:r>
-              <a:rPr lang="fi-FI" dirty="0" err="1"/>
-              <a:t>time</a:t>
-            </a:r>
-            <a:r>
-              <a:rPr lang="fi-FI" dirty="0"/>
-              <a:t> / ’</a:t>
-            </a:r>
-            <a:r>
-              <a:rPr lang="fi-FI" dirty="0" err="1"/>
-              <a:t>forever</a:t>
-            </a:r>
-            <a:r>
-              <a:rPr lang="fi-FI" dirty="0"/>
-              <a:t>’ </a:t>
+              <a:rPr lang="fi-FI" dirty="0" err="1"/>
+              <a:t>First</a:t>
+            </a:r>
+            <a:r>
+              <a:rPr lang="fi-FI" dirty="0"/>
+              <a:t> </a:t>
+            </a:r>
+            <a:r>
+              <a:rPr lang="fi-FI" dirty="0" err="1"/>
+              <a:t>come</a:t>
+            </a:r>
+            <a:r>
+              <a:rPr lang="fi-FI" dirty="0"/>
+              <a:t> </a:t>
+            </a:r>
+            <a:r>
+              <a:rPr lang="fi-FI" dirty="0" err="1"/>
+              <a:t>first</a:t>
+            </a:r>
+            <a:r>
+              <a:rPr lang="fi-FI" dirty="0"/>
+              <a:t> </a:t>
+            </a:r>
+            <a:r>
+              <a:rPr lang="fi-FI" dirty="0" err="1"/>
+              <a:t>served</a:t>
+            </a:r>
+            <a:r>
+              <a:rPr lang="fi-FI" dirty="0"/>
+              <a:t> </a:t>
+            </a:r>
+            <a:r>
+              <a:rPr lang="fi-FI" dirty="0" err="1"/>
+              <a:t>principle</a:t>
+            </a:r>
+            <a:r>
+              <a:rPr lang="fi-FI" dirty="0"/>
+              <a:t> </a:t>
             </a:r>
             <a:r>
               <a:rPr lang="fi-FI" dirty="0" err="1"/>
@@ -7751,84 +8096,36 @@
             </a:r>
             <a:r>
               <a:rPr lang="fi-FI" dirty="0" err="1"/>
-              <a:t>like</a:t>
-            </a:r>
-            <a:endParaRPr lang="fi-FI" dirty="0"/>
-          </a:p>
-          <a:p>
-            <a:pPr marL="789750" lvl="1" indent="-285750">
-              <a:buFont typeface="Arial" panose="020B0604020202020204" pitchFamily="34" charset="0"/>
-              <a:buChar char="•"/>
-            </a:pPr>
-            <a:r>
-              <a:rPr lang="fi-FI" dirty="0" err="1"/>
-              <a:t>First</a:t>
-            </a:r>
-            <a:r>
-              <a:rPr lang="fi-FI" dirty="0"/>
-              <a:t> </a:t>
-            </a:r>
-            <a:r>
-              <a:rPr lang="fi-FI" dirty="0" err="1"/>
-              <a:t>come</a:t>
-            </a:r>
-            <a:r>
-              <a:rPr lang="fi-FI" dirty="0"/>
-              <a:t> </a:t>
-            </a:r>
-            <a:r>
-              <a:rPr lang="fi-FI" dirty="0" err="1"/>
-              <a:t>first</a:t>
-            </a:r>
-            <a:r>
-              <a:rPr lang="fi-FI" dirty="0"/>
-              <a:t> </a:t>
-            </a:r>
-            <a:r>
-              <a:rPr lang="fi-FI" dirty="0" err="1"/>
-              <a:t>served</a:t>
-            </a:r>
-            <a:r>
-              <a:rPr lang="fi-FI" dirty="0"/>
-              <a:t> </a:t>
-            </a:r>
-            <a:r>
-              <a:rPr lang="fi-FI" dirty="0" err="1"/>
-              <a:t>principle</a:t>
-            </a:r>
-            <a:r>
-              <a:rPr lang="fi-FI" dirty="0"/>
-              <a:t> </a:t>
-            </a:r>
-            <a:r>
-              <a:rPr lang="fi-FI" dirty="0" err="1"/>
-              <a:t>if</a:t>
-            </a:r>
-            <a:r>
-              <a:rPr lang="fi-FI" dirty="0"/>
-              <a:t> </a:t>
-            </a:r>
-            <a:r>
-              <a:rPr lang="fi-FI" dirty="0" err="1"/>
-              <a:t>we</a:t>
-            </a:r>
-            <a:r>
-              <a:rPr lang="fi-FI" dirty="0"/>
-              <a:t> </a:t>
-            </a:r>
-            <a:r>
-              <a:rPr lang="fi-FI" dirty="0" err="1"/>
-              <a:t>so</a:t>
-            </a:r>
-            <a:r>
-              <a:rPr lang="fi-FI" dirty="0"/>
-              <a:t> </a:t>
-            </a:r>
-            <a:r>
-              <a:rPr lang="fi-FI" dirty="0" err="1"/>
               <a:t>wish</a:t>
             </a:r>
-            <a:endParaRPr lang="fi-FI" dirty="0"/>
+            <a:r>
+              <a:rPr lang="fi-FI" dirty="0"/>
+              <a:t>. </a:t>
+            </a:r>
+            <a:r>
+              <a:rPr lang="fi-FI" dirty="0" err="1"/>
+              <a:t>Or</a:t>
+            </a:r>
+            <a:r>
+              <a:rPr lang="fi-FI" dirty="0"/>
+              <a:t> some </a:t>
+            </a:r>
+            <a:r>
+              <a:rPr lang="fi-FI" dirty="0" err="1"/>
+              <a:t>priorities</a:t>
+            </a:r>
+            <a:r>
+              <a:rPr lang="fi-FI" dirty="0"/>
+              <a:t> </a:t>
+            </a:r>
+            <a:r>
+              <a:rPr lang="fi-FI" dirty="0" err="1"/>
+              <a:t>used</a:t>
+            </a:r>
+            <a:r>
+              <a:rPr lang="fi-FI" dirty="0"/>
+              <a:t>.</a:t>
+            </a:r>
           </a:p>
         </p:txBody>
       </p:sp>
@@ -8030,10 +8327,15 @@
             <p:ph sz="half" idx="2"/>
           </p:nvPr>
         </p:nvSpPr>
-        <p:spPr/>
+        <p:spPr>
+          <a:xfrm>
+            <a:off x="550864" y="1773238"/>
+            <a:ext cx="9684137" cy="4140200"/>
+          </a:xfrm>
+        </p:spPr>
         <p:txBody>
           <a:bodyPr>
-            <a:normAutofit fontScale="85000" lnSpcReduction="10000"/>
+            <a:normAutofit/>
           </a:bodyPr>
           <a:lstStyle/>
           <a:p>
@@ -8627,318 +8929,10 @@
             </a:r>
           </a:p>
           <a:p>
-            <a:pPr marL="285750" indent="-285750">
-              <a:buFont typeface="Arial" panose="020B0604020202020204" pitchFamily="34" charset="0"/>
-              <a:buChar char="•"/>
-            </a:pPr>
-            <a:r>
-              <a:rPr lang="fi-FI" dirty="0"/>
-              <a:t>Offset – </a:t>
-            </a:r>
-            <a:r>
-              <a:rPr lang="fi-FI" dirty="0" err="1"/>
-              <a:t>Basically</a:t>
-            </a:r>
-            <a:r>
-              <a:rPr lang="fi-FI" dirty="0"/>
-              <a:t> an </a:t>
-            </a:r>
-            <a:r>
-              <a:rPr lang="fi-FI" dirty="0" err="1"/>
-              <a:t>index</a:t>
-            </a:r>
-            <a:r>
-              <a:rPr lang="fi-FI" dirty="0"/>
-              <a:t> on </a:t>
-            </a:r>
-            <a:r>
-              <a:rPr lang="fi-FI" dirty="0" err="1"/>
-              <a:t>how</a:t>
-            </a:r>
-            <a:r>
-              <a:rPr lang="fi-FI" dirty="0"/>
-              <a:t> </a:t>
-            </a:r>
-            <a:r>
-              <a:rPr lang="fi-FI" dirty="0" err="1"/>
-              <a:t>much</a:t>
-            </a:r>
-            <a:r>
-              <a:rPr lang="fi-FI" dirty="0"/>
-              <a:t> a </a:t>
-            </a:r>
-            <a:r>
-              <a:rPr lang="fi-FI" dirty="0" err="1"/>
-              <a:t>certain</a:t>
-            </a:r>
-            <a:r>
-              <a:rPr lang="fi-FI" dirty="0"/>
-              <a:t> Consumer </a:t>
-            </a:r>
-            <a:r>
-              <a:rPr lang="fi-FI" dirty="0" err="1"/>
-              <a:t>has</a:t>
-            </a:r>
-            <a:r>
-              <a:rPr lang="fi-FI" dirty="0"/>
-              <a:t> </a:t>
-            </a:r>
-            <a:r>
-              <a:rPr lang="fi-FI" dirty="0" err="1"/>
-              <a:t>already</a:t>
-            </a:r>
-            <a:r>
-              <a:rPr lang="fi-FI" dirty="0"/>
-              <a:t> </a:t>
-            </a:r>
-            <a:r>
-              <a:rPr lang="fi-FI" dirty="0" err="1"/>
-              <a:t>handled</a:t>
-            </a:r>
-            <a:r>
-              <a:rPr lang="fi-FI" dirty="0"/>
-              <a:t> of </a:t>
-            </a:r>
-            <a:r>
-              <a:rPr lang="fi-FI" dirty="0" err="1"/>
-              <a:t>the</a:t>
-            </a:r>
-            <a:r>
-              <a:rPr lang="fi-FI" dirty="0"/>
-              <a:t> </a:t>
-            </a:r>
-            <a:r>
-              <a:rPr lang="fi-FI" dirty="0" err="1"/>
-              <a:t>arrived</a:t>
-            </a:r>
-            <a:r>
-              <a:rPr lang="fi-FI" dirty="0"/>
-              <a:t> </a:t>
-            </a:r>
-            <a:r>
-              <a:rPr lang="fi-FI" dirty="0" err="1"/>
-              <a:t>messages</a:t>
-            </a:r>
-            <a:endParaRPr lang="fi-FI" dirty="0"/>
-          </a:p>
-          <a:p>
-            <a:pPr marL="285750" indent="-285750">
-              <a:buFont typeface="Arial" panose="020B0604020202020204" pitchFamily="34" charset="0"/>
-              <a:buChar char="•"/>
-            </a:pPr>
-            <a:r>
-              <a:rPr lang="fi-FI" dirty="0">
-                <a:hlinkClick r:id="rId2"/>
-              </a:rPr>
-              <a:t>https://data-flair.training/blogs/kafka-terminologies/</a:t>
-            </a:r>
-            <a:endParaRPr lang="fi-FI" dirty="0"/>
-          </a:p>
-          <a:p>
-            <a:pPr marL="285750" indent="-285750">
-              <a:buFont typeface="Arial" panose="020B0604020202020204" pitchFamily="34" charset="0"/>
-              <a:buChar char="•"/>
-            </a:pPr>
-            <a:r>
-              <a:rPr lang="fi-FI" dirty="0" err="1"/>
-              <a:t>Not</a:t>
-            </a:r>
-            <a:r>
-              <a:rPr lang="fi-FI" dirty="0"/>
-              <a:t> </a:t>
-            </a:r>
-            <a:r>
-              <a:rPr lang="fi-FI" dirty="0" err="1"/>
-              <a:t>so</a:t>
-            </a:r>
-            <a:r>
-              <a:rPr lang="fi-FI" dirty="0"/>
-              <a:t> </a:t>
-            </a:r>
-            <a:r>
-              <a:rPr lang="fi-FI" dirty="0" err="1"/>
-              <a:t>important</a:t>
-            </a:r>
-            <a:r>
-              <a:rPr lang="fi-FI" dirty="0"/>
-              <a:t> Kafka </a:t>
-            </a:r>
-            <a:r>
-              <a:rPr lang="fi-FI" dirty="0" err="1"/>
-              <a:t>terms</a:t>
-            </a:r>
-            <a:r>
-              <a:rPr lang="fi-FI" dirty="0"/>
-              <a:t> </a:t>
-            </a:r>
-            <a:r>
-              <a:rPr lang="fi-FI" dirty="0" err="1"/>
-              <a:t>now</a:t>
-            </a:r>
-            <a:r>
-              <a:rPr lang="fi-FI" dirty="0"/>
-              <a:t> (</a:t>
-            </a:r>
-            <a:r>
-              <a:rPr lang="fi-FI" dirty="0" err="1"/>
-              <a:t>related</a:t>
-            </a:r>
-            <a:r>
-              <a:rPr lang="fi-FI" dirty="0"/>
-              <a:t> to </a:t>
-            </a:r>
-            <a:r>
-              <a:rPr lang="fi-FI" dirty="0" err="1"/>
-              <a:t>performance</a:t>
-            </a:r>
-            <a:r>
-              <a:rPr lang="fi-FI" dirty="0"/>
-              <a:t>, </a:t>
-            </a:r>
-            <a:r>
-              <a:rPr lang="fi-FI" dirty="0" err="1"/>
-              <a:t>reliability</a:t>
-            </a:r>
-            <a:r>
-              <a:rPr lang="fi-FI" dirty="0"/>
-              <a:t>, </a:t>
-            </a:r>
-            <a:r>
-              <a:rPr lang="fi-FI" dirty="0" err="1"/>
-              <a:t>modularity</a:t>
-            </a:r>
-            <a:r>
-              <a:rPr lang="fi-FI" dirty="0"/>
-              <a:t>, etc. </a:t>
-            </a:r>
-            <a:r>
-              <a:rPr lang="fi-FI" dirty="0" err="1"/>
-              <a:t>not</a:t>
-            </a:r>
-            <a:r>
-              <a:rPr lang="fi-FI" dirty="0"/>
-              <a:t> </a:t>
-            </a:r>
-            <a:r>
-              <a:rPr lang="fi-FI" dirty="0" err="1"/>
-              <a:t>the</a:t>
-            </a:r>
-            <a:r>
-              <a:rPr lang="fi-FI" dirty="0"/>
-              <a:t> </a:t>
-            </a:r>
-            <a:r>
-              <a:rPr lang="fi-FI" dirty="0" err="1"/>
-              <a:t>first</a:t>
-            </a:r>
-            <a:r>
-              <a:rPr lang="fi-FI" dirty="0"/>
-              <a:t> </a:t>
-            </a:r>
-            <a:r>
-              <a:rPr lang="fi-FI" dirty="0" err="1"/>
-              <a:t>simple</a:t>
-            </a:r>
-            <a:r>
-              <a:rPr lang="fi-FI" dirty="0"/>
-              <a:t> </a:t>
-            </a:r>
-            <a:r>
-              <a:rPr lang="fi-FI" dirty="0" err="1"/>
-              <a:t>operation</a:t>
-            </a:r>
-            <a:r>
-              <a:rPr lang="fi-FI" dirty="0"/>
-              <a:t> </a:t>
-            </a:r>
-            <a:r>
-              <a:rPr lang="fi-FI" dirty="0" err="1"/>
-              <a:t>you</a:t>
-            </a:r>
-            <a:r>
-              <a:rPr lang="fi-FI" dirty="0"/>
-              <a:t> </a:t>
-            </a:r>
-            <a:r>
-              <a:rPr lang="fi-FI" dirty="0" err="1"/>
-              <a:t>need</a:t>
-            </a:r>
-            <a:r>
-              <a:rPr lang="fi-FI" dirty="0"/>
-              <a:t>):</a:t>
-            </a:r>
-          </a:p>
-          <a:p>
-            <a:pPr marL="789750" lvl="1" indent="-285750">
-              <a:buFont typeface="Arial" panose="020B0604020202020204" pitchFamily="34" charset="0"/>
-              <a:buChar char="•"/>
-            </a:pPr>
-            <a:r>
-              <a:rPr lang="fi-FI" dirty="0"/>
-              <a:t>Cluster, </a:t>
-            </a:r>
-            <a:r>
-              <a:rPr lang="fi-FI" dirty="0" err="1"/>
-              <a:t>Node</a:t>
-            </a:r>
-            <a:r>
-              <a:rPr lang="fi-FI" dirty="0"/>
-              <a:t>, </a:t>
-            </a:r>
-            <a:r>
-              <a:rPr lang="fi-FI" dirty="0" err="1"/>
-              <a:t>Partition</a:t>
-            </a:r>
-            <a:r>
-              <a:rPr lang="fi-FI" dirty="0"/>
-              <a:t>, </a:t>
-            </a:r>
-            <a:r>
-              <a:rPr lang="fi-FI" dirty="0" err="1"/>
-              <a:t>Log</a:t>
-            </a:r>
-            <a:r>
-              <a:rPr lang="fi-FI" dirty="0"/>
-              <a:t>, </a:t>
-            </a:r>
-            <a:r>
-              <a:rPr lang="fi-FI" dirty="0" err="1"/>
-              <a:t>Replica</a:t>
-            </a:r>
-            <a:r>
-              <a:rPr lang="fi-FI" dirty="0"/>
-              <a:t>, </a:t>
-            </a:r>
-            <a:r>
-              <a:rPr lang="fi-FI" dirty="0" err="1"/>
-              <a:t>Leader</a:t>
-            </a:r>
-            <a:r>
-              <a:rPr lang="fi-FI" dirty="0"/>
-              <a:t>, </a:t>
-            </a:r>
-            <a:r>
-              <a:rPr lang="fi-FI" dirty="0" err="1"/>
-              <a:t>Follower</a:t>
-            </a:r>
-            <a:r>
-              <a:rPr lang="fi-FI" dirty="0"/>
-              <a:t>, Consumer </a:t>
-            </a:r>
-            <a:r>
-              <a:rPr lang="fi-FI" dirty="0" err="1"/>
-              <a:t>group</a:t>
-            </a:r>
-            <a:endParaRPr lang="fi-FI" dirty="0"/>
-          </a:p>
-          <a:p>
             <a:pPr marL="0" indent="0">
               <a:buNone/>
             </a:pPr>
-            <a:r>
-              <a:rPr lang="fi-FI" dirty="0"/>
-              <a:t> </a:t>
-            </a:r>
+            <a:endParaRPr lang="fi-FI" dirty="0"/>
           </a:p>
         </p:txBody>
       </p:sp>
@@ -9057,6 +9051,1048 @@
       </p:grpSpPr>
       <p:sp>
         <p:nvSpPr>
+          <p:cNvPr id="8" name="Title 7">
+            <a:extLst>
+              <a:ext uri="{FF2B5EF4-FFF2-40B4-BE49-F238E27FC236}">
+                <a16:creationId xmlns:a16="http://schemas.microsoft.com/office/drawing/2014/main" id="{03801FB7-8FBC-844F-8D63-9A597A066215}"/>
+              </a:ext>
+            </a:extLst>
+          </p:cNvPr>
+          <p:cNvSpPr>
+            <a:spLocks noGrp="1"/>
+          </p:cNvSpPr>
+          <p:nvPr>
+            <p:ph type="title"/>
+          </p:nvPr>
+        </p:nvSpPr>
+        <p:spPr/>
+        <p:txBody>
+          <a:bodyPr/>
+          <a:lstStyle/>
+          <a:p>
+            <a:r>
+              <a:rPr lang="fi-FI" b="0" dirty="0"/>
+              <a:t>Kafka </a:t>
+            </a:r>
+            <a:r>
+              <a:rPr lang="fi-FI" b="0" dirty="0" err="1"/>
+              <a:t>uses</a:t>
+            </a:r>
+            <a:r>
+              <a:rPr lang="fi-FI" b="0" dirty="0"/>
+              <a:t> some of </a:t>
+            </a:r>
+            <a:r>
+              <a:rPr lang="fi-FI" b="0" dirty="0" err="1"/>
+              <a:t>those</a:t>
+            </a:r>
+            <a:r>
+              <a:rPr lang="fi-FI" b="0" dirty="0"/>
+              <a:t> </a:t>
+            </a:r>
+            <a:r>
+              <a:rPr lang="fi-FI" b="0" dirty="0" err="1"/>
+              <a:t>common</a:t>
+            </a:r>
+            <a:r>
+              <a:rPr lang="fi-FI" b="0" dirty="0"/>
+              <a:t> </a:t>
+            </a:r>
+            <a:r>
+              <a:rPr lang="fi-FI" b="0" dirty="0" err="1"/>
+              <a:t>terms</a:t>
+            </a:r>
+            <a:endParaRPr lang="fi-FI" b="0" dirty="0"/>
+          </a:p>
+        </p:txBody>
+      </p:sp>
+      <p:sp>
+        <p:nvSpPr>
+          <p:cNvPr id="9" name="Content Placeholder 8">
+            <a:extLst>
+              <a:ext uri="{FF2B5EF4-FFF2-40B4-BE49-F238E27FC236}">
+                <a16:creationId xmlns:a16="http://schemas.microsoft.com/office/drawing/2014/main" id="{C711FFF1-5700-384F-B322-71416B4D664F}"/>
+              </a:ext>
+            </a:extLst>
+          </p:cNvPr>
+          <p:cNvSpPr>
+            <a:spLocks noGrp="1"/>
+          </p:cNvSpPr>
+          <p:nvPr>
+            <p:ph sz="half" idx="2"/>
+          </p:nvPr>
+        </p:nvSpPr>
+        <p:spPr/>
+        <p:txBody>
+          <a:bodyPr>
+            <a:normAutofit fontScale="85000" lnSpcReduction="10000"/>
+          </a:bodyPr>
+          <a:lstStyle/>
+          <a:p>
+            <a:pPr marL="285750" indent="-285750">
+              <a:buFont typeface="Arial" panose="020B0604020202020204" pitchFamily="34" charset="0"/>
+              <a:buChar char="•"/>
+            </a:pPr>
+            <a:r>
+              <a:rPr lang="fi-FI" b="1" dirty="0" err="1"/>
+              <a:t>Event</a:t>
+            </a:r>
+            <a:r>
+              <a:rPr lang="fi-FI" dirty="0"/>
+              <a:t>  -  Message </a:t>
+            </a:r>
+            <a:r>
+              <a:rPr lang="fi-FI" dirty="0" err="1"/>
+              <a:t>or</a:t>
+            </a:r>
+            <a:r>
+              <a:rPr lang="fi-FI" dirty="0"/>
+              <a:t> </a:t>
+            </a:r>
+            <a:r>
+              <a:rPr lang="fi-FI" dirty="0" err="1"/>
+              <a:t>signal</a:t>
+            </a:r>
+            <a:r>
+              <a:rPr lang="fi-FI" dirty="0"/>
+              <a:t> </a:t>
+            </a:r>
+            <a:r>
+              <a:rPr lang="fi-FI" dirty="0" err="1"/>
+              <a:t>or</a:t>
+            </a:r>
+            <a:r>
+              <a:rPr lang="fi-FI" dirty="0"/>
+              <a:t> </a:t>
+            </a:r>
+            <a:r>
+              <a:rPr lang="fi-FI" dirty="0" err="1"/>
+              <a:t>other</a:t>
+            </a:r>
+            <a:r>
+              <a:rPr lang="fi-FI" dirty="0"/>
+              <a:t> data </a:t>
+            </a:r>
+            <a:r>
+              <a:rPr lang="fi-FI" dirty="0" err="1"/>
+              <a:t>from</a:t>
+            </a:r>
+            <a:r>
+              <a:rPr lang="fi-FI" dirty="0"/>
+              <a:t> </a:t>
+            </a:r>
+            <a:r>
+              <a:rPr lang="fi-FI" dirty="0" err="1"/>
+              <a:t>system</a:t>
+            </a:r>
+            <a:r>
+              <a:rPr lang="fi-FI" dirty="0"/>
+              <a:t> </a:t>
+            </a:r>
+            <a:r>
+              <a:rPr lang="fi-FI" dirty="0" err="1"/>
+              <a:t>or</a:t>
+            </a:r>
+            <a:r>
+              <a:rPr lang="fi-FI" dirty="0"/>
+              <a:t> </a:t>
+            </a:r>
+            <a:r>
+              <a:rPr lang="fi-FI" dirty="0" err="1"/>
+              <a:t>subsystem</a:t>
+            </a:r>
+            <a:r>
+              <a:rPr lang="fi-FI" dirty="0"/>
+              <a:t> to </a:t>
+            </a:r>
+            <a:r>
+              <a:rPr lang="fi-FI" dirty="0" err="1"/>
+              <a:t>another</a:t>
+            </a:r>
+            <a:endParaRPr lang="fi-FI" dirty="0"/>
+          </a:p>
+          <a:p>
+            <a:pPr marL="285750" indent="-285750">
+              <a:buFont typeface="Arial" panose="020B0604020202020204" pitchFamily="34" charset="0"/>
+              <a:buChar char="•"/>
+            </a:pPr>
+            <a:r>
+              <a:rPr lang="fi-FI" b="1" dirty="0" err="1"/>
+              <a:t>Broker</a:t>
+            </a:r>
+            <a:r>
+              <a:rPr lang="fi-FI" b="1" dirty="0"/>
+              <a:t>  </a:t>
+            </a:r>
+            <a:r>
+              <a:rPr lang="fi-FI" dirty="0"/>
+              <a:t>-   ”Server” </a:t>
+            </a:r>
+            <a:r>
+              <a:rPr lang="fi-FI" dirty="0" err="1"/>
+              <a:t>needed</a:t>
+            </a:r>
+            <a:r>
+              <a:rPr lang="fi-FI" dirty="0"/>
+              <a:t> for </a:t>
+            </a:r>
+            <a:r>
+              <a:rPr lang="fi-FI" dirty="0" err="1"/>
+              <a:t>relaying</a:t>
+            </a:r>
+            <a:r>
+              <a:rPr lang="fi-FI" dirty="0"/>
+              <a:t> </a:t>
+            </a:r>
+            <a:r>
+              <a:rPr lang="fi-FI" dirty="0" err="1"/>
+              <a:t>messages</a:t>
+            </a:r>
+            <a:endParaRPr lang="fi-FI" dirty="0"/>
+          </a:p>
+          <a:p>
+            <a:pPr marL="285750" indent="-285750">
+              <a:buFont typeface="Arial" panose="020B0604020202020204" pitchFamily="34" charset="0"/>
+              <a:buChar char="•"/>
+            </a:pPr>
+            <a:r>
+              <a:rPr lang="fi-FI" b="1" dirty="0" err="1"/>
+              <a:t>Producer</a:t>
+            </a:r>
+            <a:r>
+              <a:rPr lang="fi-FI" b="1" dirty="0"/>
+              <a:t> </a:t>
+            </a:r>
+            <a:r>
+              <a:rPr lang="fi-FI" dirty="0"/>
+              <a:t>– Application </a:t>
+            </a:r>
+            <a:r>
+              <a:rPr lang="fi-FI" dirty="0" err="1"/>
+              <a:t>or</a:t>
+            </a:r>
+            <a:r>
+              <a:rPr lang="fi-FI" dirty="0"/>
+              <a:t> </a:t>
+            </a:r>
+            <a:r>
+              <a:rPr lang="fi-FI" dirty="0" err="1"/>
+              <a:t>process</a:t>
+            </a:r>
+            <a:r>
+              <a:rPr lang="fi-FI" dirty="0"/>
+              <a:t> </a:t>
+            </a:r>
+            <a:r>
+              <a:rPr lang="fi-FI" dirty="0" err="1"/>
+              <a:t>that</a:t>
+            </a:r>
+            <a:r>
+              <a:rPr lang="fi-FI" dirty="0"/>
+              <a:t> </a:t>
+            </a:r>
+            <a:r>
+              <a:rPr lang="fi-FI" dirty="0" err="1"/>
+              <a:t>creates</a:t>
+            </a:r>
+            <a:r>
+              <a:rPr lang="fi-FI" dirty="0"/>
+              <a:t> </a:t>
+            </a:r>
+            <a:r>
+              <a:rPr lang="fi-FI" dirty="0" err="1"/>
+              <a:t>messages</a:t>
+            </a:r>
+            <a:r>
+              <a:rPr lang="fi-FI" dirty="0"/>
+              <a:t> to </a:t>
+            </a:r>
+            <a:r>
+              <a:rPr lang="fi-FI" dirty="0" err="1"/>
+              <a:t>the</a:t>
+            </a:r>
+            <a:r>
+              <a:rPr lang="fi-FI" dirty="0"/>
+              <a:t> </a:t>
+            </a:r>
+            <a:r>
+              <a:rPr lang="fi-FI" dirty="0" err="1"/>
+              <a:t>server</a:t>
+            </a:r>
+            <a:endParaRPr lang="fi-FI" dirty="0"/>
+          </a:p>
+          <a:p>
+            <a:pPr marL="285750" indent="-285750">
+              <a:buFont typeface="Arial" panose="020B0604020202020204" pitchFamily="34" charset="0"/>
+              <a:buChar char="•"/>
+            </a:pPr>
+            <a:r>
+              <a:rPr lang="fi-FI" b="1" dirty="0"/>
+              <a:t>Consumer, </a:t>
+            </a:r>
+            <a:r>
+              <a:rPr lang="fi-FI" b="1" dirty="0" err="1"/>
+              <a:t>subscribe</a:t>
+            </a:r>
+            <a:r>
+              <a:rPr lang="fi-FI" b="1" dirty="0"/>
+              <a:t> </a:t>
+            </a:r>
+            <a:r>
+              <a:rPr lang="fi-FI" dirty="0"/>
+              <a:t>- Application </a:t>
+            </a:r>
+            <a:r>
+              <a:rPr lang="fi-FI" dirty="0" err="1"/>
+              <a:t>or</a:t>
+            </a:r>
+            <a:r>
+              <a:rPr lang="fi-FI" dirty="0"/>
+              <a:t> </a:t>
+            </a:r>
+            <a:r>
+              <a:rPr lang="fi-FI" dirty="0" err="1"/>
+              <a:t>process</a:t>
+            </a:r>
+            <a:r>
+              <a:rPr lang="fi-FI" dirty="0"/>
+              <a:t> </a:t>
+            </a:r>
+            <a:r>
+              <a:rPr lang="fi-FI" dirty="0" err="1"/>
+              <a:t>that</a:t>
+            </a:r>
+            <a:r>
+              <a:rPr lang="fi-FI" dirty="0"/>
+              <a:t> </a:t>
+            </a:r>
+            <a:r>
+              <a:rPr lang="fi-FI" dirty="0" err="1"/>
+              <a:t>will</a:t>
+            </a:r>
+            <a:r>
+              <a:rPr lang="fi-FI" dirty="0"/>
+              <a:t> </a:t>
+            </a:r>
+            <a:r>
+              <a:rPr lang="fi-FI" dirty="0" err="1"/>
+              <a:t>receive</a:t>
+            </a:r>
+            <a:r>
+              <a:rPr lang="fi-FI" dirty="0"/>
+              <a:t> </a:t>
+            </a:r>
+            <a:r>
+              <a:rPr lang="fi-FI" dirty="0" err="1"/>
+              <a:t>messages</a:t>
+            </a:r>
+            <a:r>
+              <a:rPr lang="fi-FI" dirty="0"/>
+              <a:t> </a:t>
+            </a:r>
+            <a:r>
+              <a:rPr lang="fi-FI" dirty="0" err="1"/>
+              <a:t>from</a:t>
+            </a:r>
+            <a:r>
+              <a:rPr lang="fi-FI" dirty="0"/>
+              <a:t> </a:t>
+            </a:r>
+            <a:r>
+              <a:rPr lang="fi-FI" dirty="0" err="1"/>
+              <a:t>the</a:t>
+            </a:r>
+            <a:r>
+              <a:rPr lang="fi-FI" dirty="0"/>
+              <a:t> </a:t>
+            </a:r>
+            <a:r>
+              <a:rPr lang="fi-FI" dirty="0" err="1"/>
+              <a:t>server</a:t>
+            </a:r>
+            <a:endParaRPr lang="fi-FI" dirty="0"/>
+          </a:p>
+          <a:p>
+            <a:pPr marL="285750" indent="-285750">
+              <a:buFont typeface="Arial" panose="020B0604020202020204" pitchFamily="34" charset="0"/>
+              <a:buChar char="•"/>
+            </a:pPr>
+            <a:r>
+              <a:rPr lang="fi-FI" b="1" dirty="0" err="1"/>
+              <a:t>Topic</a:t>
+            </a:r>
+            <a:r>
+              <a:rPr lang="fi-FI" b="1" dirty="0"/>
+              <a:t> </a:t>
+            </a:r>
+            <a:r>
+              <a:rPr lang="fi-FI" dirty="0"/>
+              <a:t>– </a:t>
+            </a:r>
+            <a:r>
+              <a:rPr lang="fi-FI" dirty="0" err="1"/>
+              <a:t>Way</a:t>
+            </a:r>
+            <a:r>
+              <a:rPr lang="fi-FI" dirty="0"/>
+              <a:t> to </a:t>
+            </a:r>
+            <a:r>
+              <a:rPr lang="fi-FI" dirty="0" err="1"/>
+              <a:t>have</a:t>
+            </a:r>
+            <a:r>
+              <a:rPr lang="fi-FI" dirty="0"/>
+              <a:t> </a:t>
+            </a:r>
+            <a:r>
+              <a:rPr lang="fi-FI" dirty="0" err="1"/>
+              <a:t>multiple</a:t>
+            </a:r>
+            <a:r>
+              <a:rPr lang="fi-FI" dirty="0"/>
+              <a:t> </a:t>
+            </a:r>
+            <a:r>
+              <a:rPr lang="fi-FI" dirty="0" err="1"/>
+              <a:t>streams</a:t>
+            </a:r>
+            <a:r>
+              <a:rPr lang="fi-FI" dirty="0"/>
+              <a:t> in </a:t>
+            </a:r>
+            <a:r>
+              <a:rPr lang="fi-FI" dirty="0" err="1"/>
+              <a:t>same</a:t>
+            </a:r>
+            <a:r>
+              <a:rPr lang="fi-FI" dirty="0"/>
+              <a:t> </a:t>
+            </a:r>
+            <a:r>
+              <a:rPr lang="fi-FI" dirty="0" err="1"/>
+              <a:t>broker</a:t>
+            </a:r>
+            <a:r>
+              <a:rPr lang="fi-FI" dirty="0"/>
+              <a:t> </a:t>
+            </a:r>
+            <a:r>
+              <a:rPr lang="fi-FI" dirty="0" err="1"/>
+              <a:t>process</a:t>
+            </a:r>
+            <a:r>
+              <a:rPr lang="fi-FI" dirty="0"/>
+              <a:t>, </a:t>
+            </a:r>
+            <a:r>
+              <a:rPr lang="fi-FI" dirty="0" err="1"/>
+              <a:t>thus</a:t>
+            </a:r>
+            <a:r>
+              <a:rPr lang="fi-FI" dirty="0"/>
+              <a:t> </a:t>
+            </a:r>
+            <a:r>
+              <a:rPr lang="fi-FI" dirty="0" err="1"/>
+              <a:t>also</a:t>
+            </a:r>
+            <a:r>
+              <a:rPr lang="fi-FI" dirty="0"/>
+              <a:t> </a:t>
+            </a:r>
+            <a:r>
+              <a:rPr lang="fi-FI" dirty="0" err="1"/>
+              <a:t>connect</a:t>
+            </a:r>
+            <a:r>
+              <a:rPr lang="fi-FI" dirty="0"/>
+              <a:t> </a:t>
+            </a:r>
+            <a:r>
+              <a:rPr lang="fi-FI" dirty="0" err="1"/>
+              <a:t>the</a:t>
+            </a:r>
+            <a:r>
+              <a:rPr lang="fi-FI" dirty="0"/>
+              <a:t> </a:t>
+            </a:r>
+            <a:r>
+              <a:rPr lang="fi-FI" dirty="0" err="1"/>
+              <a:t>ends</a:t>
+            </a:r>
+            <a:r>
+              <a:rPr lang="fi-FI" dirty="0"/>
+              <a:t> </a:t>
+            </a:r>
+            <a:r>
+              <a:rPr lang="fi-FI" dirty="0" err="1"/>
+              <a:t>more</a:t>
+            </a:r>
+            <a:r>
+              <a:rPr lang="fi-FI" dirty="0"/>
+              <a:t> </a:t>
+            </a:r>
+            <a:r>
+              <a:rPr lang="fi-FI" dirty="0" err="1"/>
+              <a:t>than</a:t>
+            </a:r>
+            <a:r>
+              <a:rPr lang="fi-FI" dirty="0"/>
+              <a:t> </a:t>
+            </a:r>
+            <a:r>
+              <a:rPr lang="fi-FI" dirty="0" err="1"/>
+              <a:t>one</a:t>
+            </a:r>
+            <a:r>
+              <a:rPr lang="fi-FI" dirty="0"/>
+              <a:t> </a:t>
+            </a:r>
+            <a:r>
+              <a:rPr lang="fi-FI" dirty="0" err="1"/>
+              <a:t>way</a:t>
+            </a:r>
+            <a:r>
+              <a:rPr lang="fi-FI" dirty="0"/>
+              <a:t> (A </a:t>
+            </a:r>
+            <a:r>
+              <a:rPr lang="fi-FI" dirty="0" err="1"/>
+              <a:t>might</a:t>
+            </a:r>
+            <a:r>
+              <a:rPr lang="fi-FI" dirty="0"/>
+              <a:t> </a:t>
+            </a:r>
+            <a:r>
+              <a:rPr lang="fi-FI" dirty="0" err="1"/>
+              <a:t>produce</a:t>
+            </a:r>
+            <a:r>
+              <a:rPr lang="fi-FI" dirty="0"/>
+              <a:t> </a:t>
+            </a:r>
+            <a:r>
+              <a:rPr lang="fi-FI" dirty="0" err="1"/>
+              <a:t>message</a:t>
+            </a:r>
+            <a:r>
+              <a:rPr lang="fi-FI" dirty="0"/>
+              <a:t> to </a:t>
+            </a:r>
+            <a:r>
+              <a:rPr lang="fi-FI" dirty="0" err="1"/>
+              <a:t>topic</a:t>
+            </a:r>
+            <a:r>
+              <a:rPr lang="fi-FI" dirty="0"/>
+              <a:t> X, </a:t>
+            </a:r>
+            <a:r>
+              <a:rPr lang="fi-FI" dirty="0" err="1"/>
+              <a:t>but</a:t>
+            </a:r>
+            <a:r>
+              <a:rPr lang="fi-FI" dirty="0"/>
+              <a:t> </a:t>
+            </a:r>
+            <a:r>
+              <a:rPr lang="fi-FI" dirty="0" err="1"/>
+              <a:t>consume</a:t>
+            </a:r>
+            <a:r>
+              <a:rPr lang="fi-FI" dirty="0"/>
+              <a:t> a </a:t>
+            </a:r>
+            <a:r>
+              <a:rPr lang="fi-FI" dirty="0" err="1"/>
+              <a:t>message</a:t>
+            </a:r>
+            <a:r>
+              <a:rPr lang="fi-FI" dirty="0"/>
+              <a:t> </a:t>
+            </a:r>
+            <a:r>
+              <a:rPr lang="fi-FI" dirty="0" err="1"/>
+              <a:t>from</a:t>
+            </a:r>
+            <a:r>
+              <a:rPr lang="fi-FI" dirty="0"/>
+              <a:t> </a:t>
+            </a:r>
+            <a:r>
+              <a:rPr lang="fi-FI" dirty="0" err="1"/>
+              <a:t>topic</a:t>
+            </a:r>
+            <a:r>
+              <a:rPr lang="fi-FI" dirty="0"/>
+              <a:t> Y. B </a:t>
+            </a:r>
+            <a:r>
+              <a:rPr lang="fi-FI" dirty="0" err="1"/>
+              <a:t>might</a:t>
+            </a:r>
+            <a:r>
+              <a:rPr lang="fi-FI" dirty="0"/>
+              <a:t> </a:t>
+            </a:r>
+            <a:r>
+              <a:rPr lang="fi-FI" dirty="0" err="1"/>
+              <a:t>do</a:t>
+            </a:r>
+            <a:r>
+              <a:rPr lang="fi-FI" dirty="0"/>
+              <a:t> </a:t>
+            </a:r>
+            <a:r>
+              <a:rPr lang="fi-FI" dirty="0" err="1"/>
+              <a:t>vice</a:t>
+            </a:r>
+            <a:r>
+              <a:rPr lang="fi-FI" dirty="0"/>
+              <a:t> </a:t>
+            </a:r>
+            <a:r>
+              <a:rPr lang="fi-FI" dirty="0" err="1"/>
+              <a:t>versa</a:t>
+            </a:r>
+            <a:r>
+              <a:rPr lang="fi-FI" dirty="0"/>
+              <a:t>)</a:t>
+            </a:r>
+          </a:p>
+          <a:p>
+            <a:pPr marL="285750" indent="-285750">
+              <a:buFont typeface="Arial" panose="020B0604020202020204" pitchFamily="34" charset="0"/>
+              <a:buChar char="•"/>
+            </a:pPr>
+            <a:r>
+              <a:rPr lang="fi-FI" dirty="0"/>
+              <a:t>Offset – </a:t>
+            </a:r>
+            <a:r>
+              <a:rPr lang="fi-FI" dirty="0" err="1"/>
+              <a:t>Basically</a:t>
+            </a:r>
+            <a:r>
+              <a:rPr lang="fi-FI" dirty="0"/>
+              <a:t> an </a:t>
+            </a:r>
+            <a:r>
+              <a:rPr lang="fi-FI" dirty="0" err="1"/>
+              <a:t>index</a:t>
+            </a:r>
+            <a:r>
+              <a:rPr lang="fi-FI" dirty="0"/>
+              <a:t> on </a:t>
+            </a:r>
+            <a:r>
+              <a:rPr lang="fi-FI" dirty="0" err="1"/>
+              <a:t>how</a:t>
+            </a:r>
+            <a:r>
+              <a:rPr lang="fi-FI" dirty="0"/>
+              <a:t> </a:t>
+            </a:r>
+            <a:r>
+              <a:rPr lang="fi-FI" dirty="0" err="1"/>
+              <a:t>much</a:t>
+            </a:r>
+            <a:r>
+              <a:rPr lang="fi-FI" dirty="0"/>
+              <a:t> a </a:t>
+            </a:r>
+            <a:r>
+              <a:rPr lang="fi-FI" dirty="0" err="1"/>
+              <a:t>certain</a:t>
+            </a:r>
+            <a:r>
+              <a:rPr lang="fi-FI" dirty="0"/>
+              <a:t> Consumer </a:t>
+            </a:r>
+            <a:r>
+              <a:rPr lang="fi-FI" dirty="0" err="1"/>
+              <a:t>has</a:t>
+            </a:r>
+            <a:r>
+              <a:rPr lang="fi-FI" dirty="0"/>
+              <a:t> </a:t>
+            </a:r>
+            <a:r>
+              <a:rPr lang="fi-FI" dirty="0" err="1"/>
+              <a:t>already</a:t>
+            </a:r>
+            <a:r>
+              <a:rPr lang="fi-FI" dirty="0"/>
+              <a:t> </a:t>
+            </a:r>
+            <a:r>
+              <a:rPr lang="fi-FI" dirty="0" err="1"/>
+              <a:t>handled</a:t>
+            </a:r>
+            <a:r>
+              <a:rPr lang="fi-FI" dirty="0"/>
+              <a:t> of </a:t>
+            </a:r>
+            <a:r>
+              <a:rPr lang="fi-FI" dirty="0" err="1"/>
+              <a:t>the</a:t>
+            </a:r>
+            <a:r>
+              <a:rPr lang="fi-FI" dirty="0"/>
+              <a:t> </a:t>
+            </a:r>
+            <a:r>
+              <a:rPr lang="fi-FI" dirty="0" err="1"/>
+              <a:t>arrived</a:t>
+            </a:r>
+            <a:r>
+              <a:rPr lang="fi-FI" dirty="0"/>
+              <a:t> </a:t>
+            </a:r>
+            <a:r>
+              <a:rPr lang="fi-FI" dirty="0" err="1"/>
+              <a:t>messages</a:t>
+            </a:r>
+            <a:endParaRPr lang="fi-FI" dirty="0"/>
+          </a:p>
+          <a:p>
+            <a:pPr marL="285750" indent="-285750">
+              <a:buFont typeface="Arial" panose="020B0604020202020204" pitchFamily="34" charset="0"/>
+              <a:buChar char="•"/>
+            </a:pPr>
+            <a:r>
+              <a:rPr lang="fi-FI" dirty="0">
+                <a:hlinkClick r:id="rId2"/>
+              </a:rPr>
+              <a:t>https://data-flair.training/blogs/kafka-terminologies/</a:t>
+            </a:r>
+            <a:endParaRPr lang="fi-FI" dirty="0"/>
+          </a:p>
+          <a:p>
+            <a:pPr marL="285750" indent="-285750">
+              <a:buFont typeface="Arial" panose="020B0604020202020204" pitchFamily="34" charset="0"/>
+              <a:buChar char="•"/>
+            </a:pPr>
+            <a:r>
+              <a:rPr lang="fi-FI" dirty="0" err="1"/>
+              <a:t>Not</a:t>
+            </a:r>
+            <a:r>
+              <a:rPr lang="fi-FI" dirty="0"/>
+              <a:t> </a:t>
+            </a:r>
+            <a:r>
+              <a:rPr lang="fi-FI" dirty="0" err="1"/>
+              <a:t>so</a:t>
+            </a:r>
+            <a:r>
+              <a:rPr lang="fi-FI" dirty="0"/>
+              <a:t> </a:t>
+            </a:r>
+            <a:r>
+              <a:rPr lang="fi-FI" dirty="0" err="1"/>
+              <a:t>important</a:t>
+            </a:r>
+            <a:r>
+              <a:rPr lang="fi-FI" dirty="0"/>
+              <a:t> Kafka </a:t>
+            </a:r>
+            <a:r>
+              <a:rPr lang="fi-FI" dirty="0" err="1"/>
+              <a:t>terms</a:t>
+            </a:r>
+            <a:r>
+              <a:rPr lang="fi-FI" dirty="0"/>
+              <a:t> </a:t>
+            </a:r>
+            <a:r>
+              <a:rPr lang="fi-FI" dirty="0" err="1"/>
+              <a:t>now</a:t>
+            </a:r>
+            <a:r>
+              <a:rPr lang="fi-FI" dirty="0"/>
+              <a:t> (</a:t>
+            </a:r>
+            <a:r>
+              <a:rPr lang="fi-FI" dirty="0" err="1"/>
+              <a:t>related</a:t>
+            </a:r>
+            <a:r>
+              <a:rPr lang="fi-FI" dirty="0"/>
+              <a:t> to </a:t>
+            </a:r>
+            <a:r>
+              <a:rPr lang="fi-FI" dirty="0" err="1"/>
+              <a:t>performance</a:t>
+            </a:r>
+            <a:r>
+              <a:rPr lang="fi-FI" dirty="0"/>
+              <a:t>, </a:t>
+            </a:r>
+            <a:r>
+              <a:rPr lang="fi-FI" dirty="0" err="1"/>
+              <a:t>reliability</a:t>
+            </a:r>
+            <a:r>
+              <a:rPr lang="fi-FI" dirty="0"/>
+              <a:t>, </a:t>
+            </a:r>
+            <a:r>
+              <a:rPr lang="fi-FI" dirty="0" err="1"/>
+              <a:t>modularity</a:t>
+            </a:r>
+            <a:r>
+              <a:rPr lang="fi-FI" dirty="0"/>
+              <a:t>, etc. </a:t>
+            </a:r>
+            <a:r>
+              <a:rPr lang="fi-FI" dirty="0" err="1"/>
+              <a:t>not</a:t>
+            </a:r>
+            <a:r>
+              <a:rPr lang="fi-FI" dirty="0"/>
+              <a:t> </a:t>
+            </a:r>
+            <a:r>
+              <a:rPr lang="fi-FI" dirty="0" err="1"/>
+              <a:t>the</a:t>
+            </a:r>
+            <a:r>
+              <a:rPr lang="fi-FI" dirty="0"/>
+              <a:t> </a:t>
+            </a:r>
+            <a:r>
+              <a:rPr lang="fi-FI" dirty="0" err="1"/>
+              <a:t>first</a:t>
+            </a:r>
+            <a:r>
+              <a:rPr lang="fi-FI" dirty="0"/>
+              <a:t> </a:t>
+            </a:r>
+            <a:r>
+              <a:rPr lang="fi-FI" dirty="0" err="1"/>
+              <a:t>simple</a:t>
+            </a:r>
+            <a:r>
+              <a:rPr lang="fi-FI" dirty="0"/>
+              <a:t> </a:t>
+            </a:r>
+            <a:r>
+              <a:rPr lang="fi-FI" dirty="0" err="1"/>
+              <a:t>operation</a:t>
+            </a:r>
+            <a:r>
+              <a:rPr lang="fi-FI" dirty="0"/>
+              <a:t> </a:t>
+            </a:r>
+            <a:r>
+              <a:rPr lang="fi-FI" dirty="0" err="1"/>
+              <a:t>you</a:t>
+            </a:r>
+            <a:r>
+              <a:rPr lang="fi-FI" dirty="0"/>
+              <a:t> </a:t>
+            </a:r>
+            <a:r>
+              <a:rPr lang="fi-FI" dirty="0" err="1"/>
+              <a:t>need</a:t>
+            </a:r>
+            <a:r>
+              <a:rPr lang="fi-FI" dirty="0"/>
+              <a:t>):</a:t>
+            </a:r>
+          </a:p>
+          <a:p>
+            <a:pPr marL="789750" lvl="1" indent="-285750">
+              <a:buFont typeface="Arial" panose="020B0604020202020204" pitchFamily="34" charset="0"/>
+              <a:buChar char="•"/>
+            </a:pPr>
+            <a:r>
+              <a:rPr lang="fi-FI" dirty="0"/>
+              <a:t>Cluster, </a:t>
+            </a:r>
+            <a:r>
+              <a:rPr lang="fi-FI" dirty="0" err="1"/>
+              <a:t>Node</a:t>
+            </a:r>
+            <a:r>
+              <a:rPr lang="fi-FI" dirty="0"/>
+              <a:t>, </a:t>
+            </a:r>
+            <a:r>
+              <a:rPr lang="fi-FI" dirty="0" err="1"/>
+              <a:t>Partition</a:t>
+            </a:r>
+            <a:r>
+              <a:rPr lang="fi-FI" dirty="0"/>
+              <a:t>, </a:t>
+            </a:r>
+            <a:r>
+              <a:rPr lang="fi-FI" dirty="0" err="1"/>
+              <a:t>Log</a:t>
+            </a:r>
+            <a:r>
+              <a:rPr lang="fi-FI" dirty="0"/>
+              <a:t>, </a:t>
+            </a:r>
+            <a:r>
+              <a:rPr lang="fi-FI" dirty="0" err="1"/>
+              <a:t>Replica</a:t>
+            </a:r>
+            <a:r>
+              <a:rPr lang="fi-FI" dirty="0"/>
+              <a:t>, </a:t>
+            </a:r>
+            <a:r>
+              <a:rPr lang="fi-FI" dirty="0" err="1"/>
+              <a:t>Leader</a:t>
+            </a:r>
+            <a:r>
+              <a:rPr lang="fi-FI" dirty="0"/>
+              <a:t>, </a:t>
+            </a:r>
+            <a:r>
+              <a:rPr lang="fi-FI" dirty="0" err="1"/>
+              <a:t>Follower</a:t>
+            </a:r>
+            <a:r>
+              <a:rPr lang="fi-FI" dirty="0"/>
+              <a:t>, Consumer </a:t>
+            </a:r>
+            <a:r>
+              <a:rPr lang="fi-FI" dirty="0" err="1"/>
+              <a:t>group</a:t>
+            </a:r>
+            <a:endParaRPr lang="fi-FI" dirty="0"/>
+          </a:p>
+          <a:p>
+            <a:pPr marL="0" indent="0">
+              <a:buNone/>
+            </a:pPr>
+            <a:r>
+              <a:rPr lang="fi-FI" dirty="0"/>
+              <a:t> </a:t>
+            </a:r>
+          </a:p>
+        </p:txBody>
+      </p:sp>
+      <p:sp>
+        <p:nvSpPr>
+          <p:cNvPr id="5" name="Date Placeholder 4">
+            <a:extLst>
+              <a:ext uri="{FF2B5EF4-FFF2-40B4-BE49-F238E27FC236}">
+                <a16:creationId xmlns:a16="http://schemas.microsoft.com/office/drawing/2014/main" id="{CDF9BDDB-4154-894E-83EF-04FB624FF30E}"/>
+              </a:ext>
+            </a:extLst>
+          </p:cNvPr>
+          <p:cNvSpPr>
+            <a:spLocks noGrp="1"/>
+          </p:cNvSpPr>
+          <p:nvPr>
+            <p:ph type="dt" sz="half" idx="10"/>
+          </p:nvPr>
+        </p:nvSpPr>
+        <p:spPr/>
+        <p:txBody>
+          <a:bodyPr/>
+          <a:lstStyle/>
+          <a:p>
+            <a:fld id="{551D5D1D-8623-7244-B1BC-5984C123D6C5}" type="datetime1">
+              <a:rPr lang="fi-FI" smtClean="0"/>
+              <a:t>11.10.2022</a:t>
+            </a:fld>
+            <a:endParaRPr lang="en-GB"/>
+          </a:p>
+        </p:txBody>
+      </p:sp>
+      <p:sp>
+        <p:nvSpPr>
+          <p:cNvPr id="6" name="Footer Placeholder 5">
+            <a:extLst>
+              <a:ext uri="{FF2B5EF4-FFF2-40B4-BE49-F238E27FC236}">
+                <a16:creationId xmlns:a16="http://schemas.microsoft.com/office/drawing/2014/main" id="{DEED56F3-0862-1748-A7A9-EE5914100F54}"/>
+              </a:ext>
+            </a:extLst>
+          </p:cNvPr>
+          <p:cNvSpPr>
+            <a:spLocks noGrp="1"/>
+          </p:cNvSpPr>
+          <p:nvPr>
+            <p:ph type="ftr" sz="quarter" idx="11"/>
+          </p:nvPr>
+        </p:nvSpPr>
+        <p:spPr/>
+        <p:txBody>
+          <a:bodyPr/>
+          <a:lstStyle/>
+          <a:p>
+            <a:endParaRPr lang="en-GB"/>
+          </a:p>
+        </p:txBody>
+      </p:sp>
+      <p:sp>
+        <p:nvSpPr>
+          <p:cNvPr id="7" name="Slide Number Placeholder 6">
+            <a:extLst>
+              <a:ext uri="{FF2B5EF4-FFF2-40B4-BE49-F238E27FC236}">
+                <a16:creationId xmlns:a16="http://schemas.microsoft.com/office/drawing/2014/main" id="{6CBC8079-2140-8745-901A-8EB4BF8EAF2D}"/>
+              </a:ext>
+            </a:extLst>
+          </p:cNvPr>
+          <p:cNvSpPr>
+            <a:spLocks noGrp="1"/>
+          </p:cNvSpPr>
+          <p:nvPr>
+            <p:ph type="sldNum" sz="quarter" idx="12"/>
+          </p:nvPr>
+        </p:nvSpPr>
+        <p:spPr/>
+        <p:txBody>
+          <a:bodyPr/>
+          <a:lstStyle/>
+          <a:p>
+            <a:fld id="{76BAB7ED-EDE9-4D4B-9A2D-30E18C47C16E}" type="slidenum">
+              <a:rPr lang="en-GB" smtClean="0"/>
+              <a:t>5</a:t>
+            </a:fld>
+            <a:endParaRPr lang="en-GB"/>
+          </a:p>
+        </p:txBody>
+      </p:sp>
+    </p:spTree>
+    <p:extLst>
+      <p:ext uri="{BB962C8B-B14F-4D97-AF65-F5344CB8AC3E}">
+        <p14:creationId xmlns:p14="http://schemas.microsoft.com/office/powerpoint/2010/main" val="1183798096"/>
+      </p:ext>
+    </p:extLst>
+  </p:cSld>
+  <p:clrMapOvr>
+    <a:masterClrMapping/>
+  </p:clrMapOvr>
+</p:sld>
+</file>
+
+<file path=ppt/slides/slide6.xml><?xml version="1.0" encoding="utf-8"?>
+<p:sld xmlns:a="http://schemas.openxmlformats.org/drawingml/2006/main" xmlns:r="http://schemas.openxmlformats.org/officeDocument/2006/relationships" xmlns:p="http://schemas.openxmlformats.org/presentationml/2006/main">
+  <p:cSld>
+    <p:spTree>
+      <p:nvGrpSpPr>
+        <p:cNvPr id="1" name=""/>
+        <p:cNvGrpSpPr/>
+        <p:nvPr/>
+      </p:nvGrpSpPr>
+      <p:grpSpPr>
+        <a:xfrm>
+          <a:off x="0" y="0"/>
+          <a:ext cx="0" cy="0"/>
+          <a:chOff x="0" y="0"/>
+          <a:chExt cx="0" cy="0"/>
+        </a:xfrm>
+      </p:grpSpPr>
+      <p:sp>
+        <p:nvSpPr>
           <p:cNvPr id="36" name="Rectangle 35">
             <a:extLst>
               <a:ext uri="{FF2B5EF4-FFF2-40B4-BE49-F238E27FC236}">
@@ -9318,7 +10354,7 @@
           <a:p>
             <a:fld id="{76BAB7ED-EDE9-4D4B-9A2D-30E18C47C16E}" type="slidenum">
               <a:rPr lang="en-GB" smtClean="0"/>
-              <a:t>5</a:t>
+              <a:t>6</a:t>
             </a:fld>
             <a:endParaRPr lang="en-GB"/>
           </a:p>
@@ -10986,7 +12022,7 @@
 </p:sld>
 </file>
 
-<file path=ppt/slides/slide6.xml><?xml version="1.0" encoding="utf-8"?>
+<file path=ppt/slides/slide7.xml><?xml version="1.0" encoding="utf-8"?>
 <p:sld xmlns:a="http://schemas.openxmlformats.org/drawingml/2006/main" xmlns:r="http://schemas.openxmlformats.org/officeDocument/2006/relationships" xmlns:p="http://schemas.openxmlformats.org/presentationml/2006/main">
   <p:cSld>
     <p:spTree>
@@ -11235,7 +12271,7 @@
           <a:p>
             <a:fld id="{76BAB7ED-EDE9-4D4B-9A2D-30E18C47C16E}" type="slidenum">
               <a:rPr lang="en-GB" smtClean="0"/>
-              <a:t>6</a:t>
+              <a:t>7</a:t>
             </a:fld>
             <a:endParaRPr lang="en-GB"/>
           </a:p>
@@ -13279,577 +14315,6 @@
 </p:sld>
 </file>
 
-<file path=ppt/slides/slide7.xml><?xml version="1.0" encoding="utf-8"?>
-<p:sld xmlns:a="http://schemas.openxmlformats.org/drawingml/2006/main" xmlns:r="http://schemas.openxmlformats.org/officeDocument/2006/relationships" xmlns:p="http://schemas.openxmlformats.org/presentationml/2006/main">
-  <p:cSld>
-    <p:spTree>
-      <p:nvGrpSpPr>
-        <p:cNvPr id="1" name=""/>
-        <p:cNvGrpSpPr/>
-        <p:nvPr/>
-      </p:nvGrpSpPr>
-      <p:grpSpPr>
-        <a:xfrm>
-          <a:off x="0" y="0"/>
-          <a:ext cx="0" cy="0"/>
-          <a:chOff x="0" y="0"/>
-          <a:chExt cx="0" cy="0"/>
-        </a:xfrm>
-      </p:grpSpPr>
-      <p:sp>
-        <p:nvSpPr>
-          <p:cNvPr id="8" name="Title 7">
-            <a:extLst>
-              <a:ext uri="{FF2B5EF4-FFF2-40B4-BE49-F238E27FC236}">
-                <a16:creationId xmlns:a16="http://schemas.microsoft.com/office/drawing/2014/main" id="{03801FB7-8FBC-844F-8D63-9A597A066215}"/>
-              </a:ext>
-            </a:extLst>
-          </p:cNvPr>
-          <p:cNvSpPr>
-            <a:spLocks noGrp="1"/>
-          </p:cNvSpPr>
-          <p:nvPr>
-            <p:ph type="title"/>
-          </p:nvPr>
-        </p:nvSpPr>
-        <p:spPr/>
-        <p:txBody>
-          <a:bodyPr/>
-          <a:lstStyle/>
-          <a:p>
-            <a:r>
-              <a:rPr lang="fi-FI" b="0" dirty="0" err="1"/>
-              <a:t>Create</a:t>
-            </a:r>
-            <a:r>
-              <a:rPr lang="fi-FI" b="0" dirty="0"/>
-              <a:t> </a:t>
-            </a:r>
-            <a:r>
-              <a:rPr lang="fi-FI" b="0" dirty="0" err="1"/>
-              <a:t>your</a:t>
-            </a:r>
-            <a:r>
-              <a:rPr lang="fi-FI" b="0" dirty="0"/>
-              <a:t> </a:t>
-            </a:r>
-            <a:r>
-              <a:rPr lang="fi-FI" b="0" dirty="0" err="1"/>
-              <a:t>own</a:t>
-            </a:r>
-            <a:r>
-              <a:rPr lang="fi-FI" b="0" dirty="0"/>
-              <a:t> Kafka </a:t>
-            </a:r>
-            <a:r>
-              <a:rPr lang="fi-FI" b="0" dirty="0" err="1"/>
-              <a:t>test</a:t>
-            </a:r>
-            <a:r>
-              <a:rPr lang="fi-FI" b="0" dirty="0"/>
-              <a:t>? </a:t>
-            </a:r>
-          </a:p>
-        </p:txBody>
-      </p:sp>
-      <p:sp>
-        <p:nvSpPr>
-          <p:cNvPr id="9" name="Content Placeholder 8">
-            <a:extLst>
-              <a:ext uri="{FF2B5EF4-FFF2-40B4-BE49-F238E27FC236}">
-                <a16:creationId xmlns:a16="http://schemas.microsoft.com/office/drawing/2014/main" id="{C711FFF1-5700-384F-B322-71416B4D664F}"/>
-              </a:ext>
-            </a:extLst>
-          </p:cNvPr>
-          <p:cNvSpPr>
-            <a:spLocks noGrp="1"/>
-          </p:cNvSpPr>
-          <p:nvPr>
-            <p:ph sz="half" idx="2"/>
-          </p:nvPr>
-        </p:nvSpPr>
-        <p:spPr/>
-        <p:txBody>
-          <a:bodyPr/>
-          <a:lstStyle/>
-          <a:p>
-            <a:pPr marL="285750" indent="-285750">
-              <a:buFont typeface="Arial" panose="020B0604020202020204" pitchFamily="34" charset="0"/>
-              <a:buChar char="•"/>
-            </a:pPr>
-            <a:r>
-              <a:rPr lang="fi-FI" dirty="0" err="1"/>
-              <a:t>You</a:t>
-            </a:r>
-            <a:r>
-              <a:rPr lang="fi-FI" dirty="0"/>
-              <a:t> </a:t>
-            </a:r>
-            <a:r>
-              <a:rPr lang="fi-FI" dirty="0" err="1"/>
-              <a:t>can</a:t>
-            </a:r>
-            <a:r>
-              <a:rPr lang="fi-FI" dirty="0"/>
-              <a:t> </a:t>
-            </a:r>
-            <a:r>
-              <a:rPr lang="fi-FI" dirty="0" err="1"/>
-              <a:t>write</a:t>
-            </a:r>
-            <a:r>
-              <a:rPr lang="fi-FI" dirty="0"/>
-              <a:t> Kafka </a:t>
-            </a:r>
-            <a:r>
-              <a:rPr lang="fi-FI" dirty="0" err="1"/>
-              <a:t>clients</a:t>
-            </a:r>
-            <a:r>
-              <a:rPr lang="fi-FI" dirty="0"/>
-              <a:t> (</a:t>
-            </a:r>
-            <a:r>
-              <a:rPr lang="fi-FI" dirty="0" err="1"/>
-              <a:t>publishers</a:t>
-            </a:r>
-            <a:r>
-              <a:rPr lang="fi-FI" dirty="0"/>
-              <a:t> and/</a:t>
-            </a:r>
-            <a:r>
-              <a:rPr lang="fi-FI" dirty="0" err="1"/>
-              <a:t>or</a:t>
-            </a:r>
-            <a:r>
-              <a:rPr lang="fi-FI" dirty="0"/>
-              <a:t> </a:t>
-            </a:r>
-            <a:r>
-              <a:rPr lang="fi-FI" dirty="0" err="1"/>
-              <a:t>subscribers</a:t>
-            </a:r>
-            <a:r>
-              <a:rPr lang="fi-FI" dirty="0"/>
-              <a:t>) </a:t>
-            </a:r>
-            <a:r>
-              <a:rPr lang="fi-FI" dirty="0" err="1"/>
-              <a:t>with</a:t>
-            </a:r>
-            <a:r>
-              <a:rPr lang="fi-FI" dirty="0"/>
-              <a:t> at </a:t>
-            </a:r>
-            <a:r>
-              <a:rPr lang="fi-FI" dirty="0" err="1"/>
-              <a:t>least</a:t>
-            </a:r>
-            <a:r>
-              <a:rPr lang="fi-FI" dirty="0"/>
-              <a:t> </a:t>
-            </a:r>
-            <a:r>
-              <a:rPr lang="fi-FI" dirty="0" err="1"/>
-              <a:t>these</a:t>
-            </a:r>
-            <a:r>
-              <a:rPr lang="fi-FI" dirty="0"/>
-              <a:t> </a:t>
-            </a:r>
-            <a:r>
-              <a:rPr lang="fi-FI" dirty="0" err="1"/>
-              <a:t>languages</a:t>
-            </a:r>
-            <a:r>
-              <a:rPr lang="fi-FI" dirty="0"/>
-              <a:t>:</a:t>
-            </a:r>
-          </a:p>
-          <a:p>
-            <a:pPr marL="789750" lvl="1" indent="-285750">
-              <a:buFont typeface="Arial" panose="020B0604020202020204" pitchFamily="34" charset="0"/>
-              <a:buChar char="•"/>
-            </a:pPr>
-            <a:r>
-              <a:rPr lang="fi-FI" dirty="0">
-                <a:hlinkClick r:id="rId2"/>
-              </a:rPr>
-              <a:t>https://cwiki.apache.org/confluence/display/KAFKA/Clients</a:t>
-            </a:r>
-          </a:p>
-          <a:p>
-            <a:pPr marL="789750" lvl="1" indent="-285750">
-              <a:buFont typeface="Arial" panose="020B0604020202020204" pitchFamily="34" charset="0"/>
-              <a:buChar char="•"/>
-            </a:pPr>
-            <a:r>
-              <a:rPr lang="fi-FI" sz="1800" dirty="0" err="1"/>
-              <a:t>E.g</a:t>
-            </a:r>
-            <a:r>
-              <a:rPr lang="fi-FI" sz="1800" dirty="0"/>
-              <a:t>. Node.js, C/C++, .NET, Java, Python, </a:t>
-            </a:r>
-            <a:r>
-              <a:rPr lang="fi-FI" sz="1800" dirty="0" err="1"/>
-              <a:t>Rust</a:t>
-            </a:r>
-            <a:r>
-              <a:rPr lang="fi-FI" sz="1800" dirty="0"/>
-              <a:t>, </a:t>
-            </a:r>
-            <a:r>
-              <a:rPr lang="fi-FI" sz="1800" dirty="0" err="1"/>
-              <a:t>Ruby</a:t>
-            </a:r>
-            <a:r>
-              <a:rPr lang="fi-FI" sz="1800" dirty="0"/>
-              <a:t>, Swift… </a:t>
-            </a:r>
-            <a:r>
-              <a:rPr lang="fi-FI" sz="1800" dirty="0" err="1"/>
-              <a:t>Basically</a:t>
-            </a:r>
-            <a:r>
-              <a:rPr lang="fi-FI" sz="1800" dirty="0"/>
-              <a:t> </a:t>
-            </a:r>
-            <a:r>
-              <a:rPr lang="fi-FI" sz="1800" dirty="0" err="1"/>
-              <a:t>any</a:t>
-            </a:r>
-            <a:r>
-              <a:rPr lang="fi-FI" sz="1800" dirty="0"/>
-              <a:t> </a:t>
-            </a:r>
-            <a:r>
-              <a:rPr lang="fi-FI" sz="1800" dirty="0" err="1"/>
-              <a:t>language</a:t>
-            </a:r>
-            <a:r>
-              <a:rPr lang="fi-FI" sz="1800" dirty="0"/>
-              <a:t> </a:t>
-            </a:r>
-            <a:r>
-              <a:rPr lang="fi-FI" sz="1800" dirty="0" err="1"/>
-              <a:t>that</a:t>
-            </a:r>
-            <a:r>
-              <a:rPr lang="fi-FI" sz="1800" dirty="0"/>
-              <a:t> </a:t>
-            </a:r>
-            <a:r>
-              <a:rPr lang="fi-FI" sz="1800" dirty="0" err="1"/>
-              <a:t>has</a:t>
-            </a:r>
-            <a:r>
-              <a:rPr lang="fi-FI" sz="1800" dirty="0"/>
-              <a:t> </a:t>
-            </a:r>
-            <a:r>
-              <a:rPr lang="fi-FI" sz="1800" dirty="0" err="1"/>
-              <a:t>any</a:t>
-            </a:r>
-            <a:r>
-              <a:rPr lang="fi-FI" sz="1800" dirty="0"/>
-              <a:t> </a:t>
-            </a:r>
-            <a:r>
-              <a:rPr lang="fi-FI" sz="1800" dirty="0" err="1"/>
-              <a:t>relevance</a:t>
-            </a:r>
-            <a:r>
-              <a:rPr lang="fi-FI" sz="1800" dirty="0"/>
-              <a:t> </a:t>
-            </a:r>
-            <a:r>
-              <a:rPr lang="fi-FI" sz="1800" dirty="0" err="1"/>
-              <a:t>nowadays</a:t>
-            </a:r>
-            <a:endParaRPr lang="fi-FI" sz="1800" dirty="0"/>
-          </a:p>
-          <a:p>
-            <a:pPr marL="285750" indent="-285750">
-              <a:buFont typeface="Arial" panose="020B0604020202020204" pitchFamily="34" charset="0"/>
-              <a:buChar char="•"/>
-            </a:pPr>
-            <a:r>
-              <a:rPr lang="fi-FI" dirty="0" err="1"/>
-              <a:t>Advance</a:t>
-            </a:r>
-            <a:r>
-              <a:rPr lang="fi-FI" dirty="0"/>
-              <a:t> </a:t>
-            </a:r>
-            <a:r>
-              <a:rPr lang="fi-FI" dirty="0" err="1"/>
-              <a:t>step</a:t>
-            </a:r>
-            <a:r>
-              <a:rPr lang="fi-FI" dirty="0"/>
-              <a:t> </a:t>
-            </a:r>
-            <a:r>
-              <a:rPr lang="fi-FI" dirty="0" err="1"/>
-              <a:t>by</a:t>
-            </a:r>
-            <a:r>
-              <a:rPr lang="fi-FI" dirty="0"/>
-              <a:t> </a:t>
-            </a:r>
-            <a:r>
-              <a:rPr lang="fi-FI" dirty="0" err="1"/>
-              <a:t>step</a:t>
-            </a:r>
-            <a:r>
-              <a:rPr lang="fi-FI" dirty="0"/>
-              <a:t>, </a:t>
-            </a:r>
-            <a:r>
-              <a:rPr lang="fi-FI" dirty="0" err="1"/>
-              <a:t>testing</a:t>
-            </a:r>
-            <a:r>
-              <a:rPr lang="fi-FI" dirty="0"/>
-              <a:t> </a:t>
-            </a:r>
-            <a:r>
-              <a:rPr lang="fi-FI" dirty="0" err="1"/>
-              <a:t>each</a:t>
-            </a:r>
-            <a:r>
-              <a:rPr lang="fi-FI" dirty="0"/>
-              <a:t> </a:t>
-            </a:r>
-            <a:r>
-              <a:rPr lang="fi-FI" dirty="0" err="1"/>
-              <a:t>step</a:t>
-            </a:r>
-            <a:r>
-              <a:rPr lang="fi-FI" dirty="0"/>
-              <a:t> to </a:t>
-            </a:r>
-            <a:r>
-              <a:rPr lang="fi-FI" dirty="0" err="1"/>
-              <a:t>reduce</a:t>
-            </a:r>
-            <a:r>
-              <a:rPr lang="fi-FI" dirty="0"/>
-              <a:t> </a:t>
-            </a:r>
-            <a:r>
-              <a:rPr lang="fi-FI" dirty="0" err="1"/>
-              <a:t>error</a:t>
-            </a:r>
-            <a:r>
-              <a:rPr lang="fi-FI" dirty="0"/>
-              <a:t> </a:t>
-            </a:r>
-            <a:r>
-              <a:rPr lang="fi-FI" dirty="0" err="1"/>
-              <a:t>possibilities</a:t>
-            </a:r>
-            <a:r>
-              <a:rPr lang="fi-FI" dirty="0"/>
-              <a:t>.</a:t>
-            </a:r>
-          </a:p>
-          <a:p>
-            <a:pPr marL="285750" indent="-285750">
-              <a:buFont typeface="Arial" panose="020B0604020202020204" pitchFamily="34" charset="0"/>
-              <a:buChar char="•"/>
-            </a:pPr>
-            <a:r>
-              <a:rPr lang="fi-FI" dirty="0" err="1"/>
-              <a:t>There</a:t>
-            </a:r>
-            <a:r>
-              <a:rPr lang="fi-FI" dirty="0"/>
-              <a:t> is an </a:t>
-            </a:r>
-            <a:r>
-              <a:rPr lang="fi-FI" dirty="0" err="1"/>
-              <a:t>Assignment</a:t>
-            </a:r>
-            <a:r>
-              <a:rPr lang="fi-FI" dirty="0"/>
-              <a:t> </a:t>
-            </a:r>
-            <a:r>
-              <a:rPr lang="fi-FI" dirty="0" err="1"/>
-              <a:t>available</a:t>
-            </a:r>
-            <a:r>
-              <a:rPr lang="fi-FI" dirty="0"/>
-              <a:t> </a:t>
-            </a:r>
-            <a:r>
-              <a:rPr lang="fi-FI" dirty="0" err="1"/>
-              <a:t>that</a:t>
-            </a:r>
-            <a:r>
-              <a:rPr lang="fi-FI" dirty="0"/>
-              <a:t> </a:t>
-            </a:r>
-            <a:r>
-              <a:rPr lang="fi-FI" dirty="0" err="1"/>
-              <a:t>first</a:t>
-            </a:r>
-            <a:r>
-              <a:rPr lang="fi-FI" dirty="0"/>
-              <a:t> is just </a:t>
-            </a:r>
-            <a:r>
-              <a:rPr lang="fi-FI" dirty="0" err="1"/>
-              <a:t>writing</a:t>
-            </a:r>
-            <a:r>
-              <a:rPr lang="fi-FI" dirty="0"/>
-              <a:t> </a:t>
-            </a:r>
-            <a:r>
-              <a:rPr lang="fi-FI" dirty="0" err="1"/>
-              <a:t>based</a:t>
-            </a:r>
-            <a:r>
-              <a:rPr lang="fi-FI" dirty="0"/>
-              <a:t> on </a:t>
-            </a:r>
-            <a:r>
-              <a:rPr lang="fi-FI" dirty="0" err="1"/>
-              <a:t>model</a:t>
-            </a:r>
-            <a:r>
-              <a:rPr lang="fi-FI" dirty="0"/>
-              <a:t> and </a:t>
-            </a:r>
-            <a:r>
-              <a:rPr lang="fi-FI" dirty="0" err="1"/>
-              <a:t>making</a:t>
-            </a:r>
-            <a:r>
-              <a:rPr lang="fi-FI" dirty="0"/>
-              <a:t> it to </a:t>
-            </a:r>
-            <a:r>
-              <a:rPr lang="fi-FI" dirty="0" err="1"/>
-              <a:t>run</a:t>
-            </a:r>
-            <a:endParaRPr lang="fi-FI" dirty="0">
-              <a:hlinkClick r:id="rId2">
-                <a:extLst>
-                  <a:ext uri="{A12FA001-AC4F-418D-AE19-62706E023703}">
-                    <ahyp:hlinkClr xmlns:ahyp="http://schemas.microsoft.com/office/drawing/2018/hyperlinkcolor" val="tx"/>
-                  </a:ext>
-                </a:extLst>
-              </a:hlinkClick>
-            </a:endParaRPr>
-          </a:p>
-          <a:p>
-            <a:pPr marL="0" indent="0">
-              <a:buNone/>
-            </a:pPr>
-            <a:endParaRPr lang="fi-FI" dirty="0"/>
-          </a:p>
-        </p:txBody>
-      </p:sp>
-      <p:sp>
-        <p:nvSpPr>
-          <p:cNvPr id="5" name="Date Placeholder 4">
-            <a:extLst>
-              <a:ext uri="{FF2B5EF4-FFF2-40B4-BE49-F238E27FC236}">
-                <a16:creationId xmlns:a16="http://schemas.microsoft.com/office/drawing/2014/main" id="{CDF9BDDB-4154-894E-83EF-04FB624FF30E}"/>
-              </a:ext>
-            </a:extLst>
-          </p:cNvPr>
-          <p:cNvSpPr>
-            <a:spLocks noGrp="1"/>
-          </p:cNvSpPr>
-          <p:nvPr>
-            <p:ph type="dt" sz="half" idx="10"/>
-          </p:nvPr>
-        </p:nvSpPr>
-        <p:spPr/>
-        <p:txBody>
-          <a:bodyPr/>
-          <a:lstStyle/>
-          <a:p>
-            <a:fld id="{551D5D1D-8623-7244-B1BC-5984C123D6C5}" type="datetime1">
-              <a:rPr lang="fi-FI" smtClean="0"/>
-              <a:t>11.10.2022</a:t>
-            </a:fld>
-            <a:endParaRPr lang="en-GB"/>
-          </a:p>
-        </p:txBody>
-      </p:sp>
-      <p:sp>
-        <p:nvSpPr>
-          <p:cNvPr id="6" name="Footer Placeholder 5">
-            <a:extLst>
-              <a:ext uri="{FF2B5EF4-FFF2-40B4-BE49-F238E27FC236}">
-                <a16:creationId xmlns:a16="http://schemas.microsoft.com/office/drawing/2014/main" id="{DEED56F3-0862-1748-A7A9-EE5914100F54}"/>
-              </a:ext>
-            </a:extLst>
-          </p:cNvPr>
-          <p:cNvSpPr>
-            <a:spLocks noGrp="1"/>
-          </p:cNvSpPr>
-          <p:nvPr>
-            <p:ph type="ftr" sz="quarter" idx="11"/>
-          </p:nvPr>
-        </p:nvSpPr>
-        <p:spPr/>
-        <p:txBody>
-          <a:bodyPr/>
-          <a:lstStyle/>
-          <a:p>
-            <a:endParaRPr lang="en-GB"/>
-          </a:p>
-        </p:txBody>
-      </p:sp>
-      <p:sp>
-        <p:nvSpPr>
-          <p:cNvPr id="7" name="Slide Number Placeholder 6">
-            <a:extLst>
-              <a:ext uri="{FF2B5EF4-FFF2-40B4-BE49-F238E27FC236}">
-                <a16:creationId xmlns:a16="http://schemas.microsoft.com/office/drawing/2014/main" id="{6CBC8079-2140-8745-901A-8EB4BF8EAF2D}"/>
-              </a:ext>
-            </a:extLst>
-          </p:cNvPr>
-          <p:cNvSpPr>
-            <a:spLocks noGrp="1"/>
-          </p:cNvSpPr>
-          <p:nvPr>
-            <p:ph type="sldNum" sz="quarter" idx="12"/>
-          </p:nvPr>
-        </p:nvSpPr>
-        <p:spPr/>
-        <p:txBody>
-          <a:bodyPr/>
-          <a:lstStyle/>
-          <a:p>
-            <a:fld id="{76BAB7ED-EDE9-4D4B-9A2D-30E18C47C16E}" type="slidenum">
-              <a:rPr lang="en-GB" smtClean="0"/>
-              <a:t>7</a:t>
-            </a:fld>
-            <a:endParaRPr lang="en-GB"/>
-          </a:p>
-        </p:txBody>
-      </p:sp>
-    </p:spTree>
-    <p:extLst>
-      <p:ext uri="{BB962C8B-B14F-4D97-AF65-F5344CB8AC3E}">
-        <p14:creationId xmlns:p14="http://schemas.microsoft.com/office/powerpoint/2010/main" val="820472147"/>
-      </p:ext>
-    </p:extLst>
-  </p:cSld>
-  <p:clrMapOvr>
-    <a:masterClrMapping/>
-  </p:clrMapOvr>
-</p:sld>
-</file>
-
 <file path=ppt/slides/slide8.xml><?xml version="1.0" encoding="utf-8"?>
 <p:sld xmlns:a="http://schemas.openxmlformats.org/drawingml/2006/main" xmlns:r="http://schemas.openxmlformats.org/officeDocument/2006/relationships" xmlns:p="http://schemas.openxmlformats.org/presentationml/2006/main">
   <p:cSld>
@@ -13890,15 +14355,15 @@
           <a:p>
             <a:r>
               <a:rPr lang="fi-FI" b="0" dirty="0" err="1"/>
-              <a:t>Steps</a:t>
+              <a:t>Create</a:t>
             </a:r>
             <a:r>
               <a:rPr lang="fi-FI" b="0" dirty="0"/>
-              <a:t> of Kafka demo/</a:t>
+              <a:t> </a:t>
             </a:r>
             <a:r>
               <a:rPr lang="fi-FI" b="0" dirty="0" err="1"/>
-              <a:t>tryout</a:t>
+              <a:t>your</a:t>
             </a:r>
             <a:r>
               <a:rPr lang="fi-FI" b="0" dirty="0"/>
@@ -13906,17 +14371,20 @@
             </a:r>
             <a:r>
               <a:rPr lang="fi-FI" b="0" dirty="0" err="1"/>
-              <a:t>system</a:t>
+              <a:t>own</a:t>
             </a:r>
             <a:r>
               <a:rPr lang="fi-FI" b="0" dirty="0"/>
-              <a:t> </a:t>
+              <a:t> Kafka </a:t>
             </a:r>
             <a:r>
               <a:rPr lang="fi-FI" b="0" dirty="0" err="1"/>
-              <a:t>development</a:t>
-            </a:r>
-            <a:endParaRPr lang="fi-FI" b="0" dirty="0"/>
+              <a:t>test</a:t>
+            </a:r>
+            <a:r>
+              <a:rPr lang="fi-FI" b="0" dirty="0"/>
+              <a:t>? </a:t>
+            </a:r>
           </a:p>
         </p:txBody>
       </p:sp>
@@ -13947,76 +14415,195 @@
             </a:pPr>
             <a:r>
               <a:rPr lang="fi-FI" dirty="0" err="1"/>
-              <a:t>Download</a:t>
-            </a:r>
-            <a:r>
-              <a:rPr lang="fi-FI" dirty="0"/>
-              <a:t> Kafka (Kafka </a:t>
-            </a:r>
-            <a:r>
-              <a:rPr lang="fi-FI" dirty="0" err="1"/>
-              <a:t>server</a:t>
-            </a:r>
-            <a:r>
-              <a:rPr lang="fi-FI" dirty="0"/>
-              <a:t> and </a:t>
-            </a:r>
-            <a:r>
-              <a:rPr lang="fi-FI" dirty="0" err="1"/>
-              <a:t>Zookeeper</a:t>
-            </a:r>
-            <a:r>
-              <a:rPr lang="fi-FI" dirty="0"/>
-              <a:t>) (</a:t>
-            </a:r>
-            <a:r>
-              <a:rPr lang="fi-FI" dirty="0" err="1"/>
-              <a:t>Or</a:t>
-            </a:r>
-            <a:r>
-              <a:rPr lang="fi-FI" dirty="0"/>
-              <a:t> </a:t>
-            </a:r>
-            <a:r>
-              <a:rPr lang="fi-FI" dirty="0" err="1"/>
-              <a:t>use</a:t>
-            </a:r>
-            <a:r>
-              <a:rPr lang="fi-FI" dirty="0"/>
-              <a:t> </a:t>
-            </a:r>
-            <a:r>
-              <a:rPr lang="fi-FI" dirty="0" err="1"/>
-              <a:t>them</a:t>
-            </a:r>
-            <a:r>
-              <a:rPr lang="fi-FI" dirty="0"/>
-              <a:t> </a:t>
-            </a:r>
-            <a:r>
-              <a:rPr lang="fi-FI" dirty="0" err="1"/>
-              <a:t>from</a:t>
-            </a:r>
-            <a:r>
-              <a:rPr lang="fi-FI" dirty="0"/>
-              <a:t> </a:t>
-            </a:r>
-            <a:r>
-              <a:rPr lang="fi-FI" dirty="0" err="1"/>
-              <a:t>Docker</a:t>
-            </a:r>
-            <a:r>
-              <a:rPr lang="fi-FI" dirty="0"/>
-              <a:t> image </a:t>
-            </a:r>
-            <a:r>
-              <a:rPr lang="fi-FI" dirty="0" err="1"/>
-              <a:t>repository</a:t>
-            </a:r>
-            <a:r>
-              <a:rPr lang="fi-FI" dirty="0"/>
-              <a:t>)</a:t>
-            </a:r>
+              <a:t>You</a:t>
+            </a:r>
+            <a:r>
+              <a:rPr lang="fi-FI" dirty="0"/>
+              <a:t> </a:t>
+            </a:r>
+            <a:r>
+              <a:rPr lang="fi-FI" dirty="0" err="1"/>
+              <a:t>can</a:t>
+            </a:r>
+            <a:r>
+              <a:rPr lang="fi-FI" dirty="0"/>
+              <a:t> </a:t>
+            </a:r>
+            <a:r>
+              <a:rPr lang="fi-FI" dirty="0" err="1"/>
+              <a:t>write</a:t>
+            </a:r>
+            <a:r>
+              <a:rPr lang="fi-FI" dirty="0"/>
+              <a:t> Kafka </a:t>
+            </a:r>
+            <a:r>
+              <a:rPr lang="fi-FI" dirty="0" err="1"/>
+              <a:t>clients</a:t>
+            </a:r>
+            <a:r>
+              <a:rPr lang="fi-FI" dirty="0"/>
+              <a:t> (</a:t>
+            </a:r>
+            <a:r>
+              <a:rPr lang="fi-FI" dirty="0" err="1"/>
+              <a:t>publishers</a:t>
+            </a:r>
+            <a:r>
+              <a:rPr lang="fi-FI" dirty="0"/>
+              <a:t> and/</a:t>
+            </a:r>
+            <a:r>
+              <a:rPr lang="fi-FI" dirty="0" err="1"/>
+              <a:t>or</a:t>
+            </a:r>
+            <a:r>
+              <a:rPr lang="fi-FI" dirty="0"/>
+              <a:t> </a:t>
+            </a:r>
+            <a:r>
+              <a:rPr lang="fi-FI" dirty="0" err="1"/>
+              <a:t>subscribers</a:t>
+            </a:r>
+            <a:r>
+              <a:rPr lang="fi-FI" dirty="0"/>
+              <a:t>) </a:t>
+            </a:r>
+            <a:r>
+              <a:rPr lang="fi-FI" dirty="0" err="1"/>
+              <a:t>with</a:t>
+            </a:r>
+            <a:r>
+              <a:rPr lang="fi-FI" dirty="0"/>
+              <a:t> at </a:t>
+            </a:r>
+            <a:r>
+              <a:rPr lang="fi-FI" dirty="0" err="1"/>
+              <a:t>least</a:t>
+            </a:r>
+            <a:r>
+              <a:rPr lang="fi-FI" dirty="0"/>
+              <a:t> </a:t>
+            </a:r>
+            <a:r>
+              <a:rPr lang="fi-FI" dirty="0" err="1"/>
+              <a:t>these</a:t>
+            </a:r>
+            <a:r>
+              <a:rPr lang="fi-FI" dirty="0"/>
+              <a:t> </a:t>
+            </a:r>
+            <a:r>
+              <a:rPr lang="fi-FI" dirty="0" err="1"/>
+              <a:t>languages</a:t>
+            </a:r>
+            <a:r>
+              <a:rPr lang="fi-FI" dirty="0"/>
+              <a:t>:</a:t>
+            </a:r>
+          </a:p>
+          <a:p>
+            <a:pPr marL="789750" lvl="1" indent="-285750">
+              <a:buFont typeface="Arial" panose="020B0604020202020204" pitchFamily="34" charset="0"/>
+              <a:buChar char="•"/>
+            </a:pPr>
+            <a:r>
+              <a:rPr lang="fi-FI" dirty="0">
+                <a:hlinkClick r:id="rId2"/>
+              </a:rPr>
+              <a:t>https://cwiki.apache.org/confluence/display/KAFKA/Clients</a:t>
+            </a:r>
+          </a:p>
+          <a:p>
+            <a:pPr marL="789750" lvl="1" indent="-285750">
+              <a:buFont typeface="Arial" panose="020B0604020202020204" pitchFamily="34" charset="0"/>
+              <a:buChar char="•"/>
+            </a:pPr>
+            <a:r>
+              <a:rPr lang="fi-FI" sz="1800" dirty="0" err="1"/>
+              <a:t>E.g</a:t>
+            </a:r>
+            <a:r>
+              <a:rPr lang="fi-FI" sz="1800" dirty="0"/>
+              <a:t>. Node.js, C/C++, .NET, Java, Python, </a:t>
+            </a:r>
+            <a:r>
+              <a:rPr lang="fi-FI" sz="1800" dirty="0" err="1"/>
+              <a:t>Rust</a:t>
+            </a:r>
+            <a:r>
+              <a:rPr lang="fi-FI" sz="1800" dirty="0"/>
+              <a:t>, </a:t>
+            </a:r>
+            <a:r>
+              <a:rPr lang="fi-FI" sz="1800" dirty="0" err="1"/>
+              <a:t>Ruby</a:t>
+            </a:r>
+            <a:r>
+              <a:rPr lang="fi-FI" sz="1800" dirty="0"/>
+              <a:t>, Swift… </a:t>
+            </a:r>
+            <a:r>
+              <a:rPr lang="fi-FI" sz="1800" dirty="0" err="1"/>
+              <a:t>Basically</a:t>
+            </a:r>
+            <a:r>
+              <a:rPr lang="fi-FI" sz="1800" dirty="0"/>
+              <a:t> </a:t>
+            </a:r>
+            <a:r>
+              <a:rPr lang="fi-FI" sz="1800" dirty="0" err="1"/>
+              <a:t>any</a:t>
+            </a:r>
+            <a:r>
+              <a:rPr lang="fi-FI" sz="1800" dirty="0"/>
+              <a:t> </a:t>
+            </a:r>
+            <a:r>
+              <a:rPr lang="fi-FI" sz="1800" dirty="0" err="1"/>
+              <a:t>language</a:t>
+            </a:r>
+            <a:r>
+              <a:rPr lang="fi-FI" sz="1800" dirty="0"/>
+              <a:t> </a:t>
+            </a:r>
+            <a:r>
+              <a:rPr lang="fi-FI" sz="1800" dirty="0" err="1"/>
+              <a:t>that</a:t>
+            </a:r>
+            <a:r>
+              <a:rPr lang="fi-FI" sz="1800" dirty="0"/>
+              <a:t> </a:t>
+            </a:r>
+            <a:r>
+              <a:rPr lang="fi-FI" sz="1800" dirty="0" err="1"/>
+              <a:t>has</a:t>
+            </a:r>
+            <a:r>
+              <a:rPr lang="fi-FI" sz="1800" dirty="0"/>
+              <a:t> </a:t>
+            </a:r>
+            <a:r>
+              <a:rPr lang="fi-FI" sz="1800" dirty="0" err="1"/>
+              <a:t>any</a:t>
+            </a:r>
+            <a:r>
+              <a:rPr lang="fi-FI" sz="1800" dirty="0"/>
+              <a:t> </a:t>
+            </a:r>
+            <a:r>
+              <a:rPr lang="fi-FI" sz="1800" dirty="0" err="1"/>
+              <a:t>relevance</a:t>
+            </a:r>
+            <a:r>
+              <a:rPr lang="fi-FI" sz="1800" dirty="0"/>
+              <a:t> </a:t>
+            </a:r>
+            <a:r>
+              <a:rPr lang="fi-FI" sz="1800" dirty="0" err="1"/>
+              <a:t>nowadays</a:t>
+            </a:r>
+            <a:endParaRPr lang="fi-FI" sz="1800" dirty="0"/>
           </a:p>
           <a:p>
             <a:pPr marL="285750" indent="-285750">
@@ -14025,67 +14612,83 @@
             </a:pPr>
             <a:r>
               <a:rPr lang="fi-FI" dirty="0" err="1"/>
-              <a:t>Configure</a:t>
-            </a:r>
-            <a:r>
-              <a:rPr lang="fi-FI" dirty="0"/>
-              <a:t> Kafka </a:t>
-            </a:r>
-            <a:r>
-              <a:rPr lang="fi-FI" dirty="0" err="1"/>
-              <a:t>server</a:t>
-            </a:r>
-            <a:r>
-              <a:rPr lang="fi-FI" dirty="0"/>
-              <a:t> and </a:t>
-            </a:r>
-            <a:r>
-              <a:rPr lang="fi-FI" dirty="0" err="1"/>
-              <a:t>Zookeeper</a:t>
-            </a:r>
-            <a:r>
-              <a:rPr lang="fi-FI" dirty="0"/>
-              <a:t> (</a:t>
-            </a:r>
-            <a:r>
-              <a:rPr lang="fi-FI" dirty="0" err="1"/>
-              <a:t>Or</a:t>
-            </a:r>
-            <a:r>
-              <a:rPr lang="fi-FI" dirty="0"/>
-              <a:t> </a:t>
-            </a:r>
-            <a:r>
-              <a:rPr lang="fi-FI" dirty="0" err="1"/>
-              <a:t>the</a:t>
-            </a:r>
-            <a:r>
-              <a:rPr lang="fi-FI" dirty="0"/>
-              <a:t> </a:t>
-            </a:r>
-            <a:r>
-              <a:rPr lang="fi-FI" dirty="0" err="1"/>
-              <a:t>docker</a:t>
-            </a:r>
-            <a:r>
-              <a:rPr lang="fi-FI" dirty="0"/>
-              <a:t> </a:t>
-            </a:r>
-            <a:r>
-              <a:rPr lang="fi-FI" dirty="0" err="1"/>
-              <a:t>container</a:t>
-            </a:r>
-            <a:r>
-              <a:rPr lang="fi-FI" dirty="0"/>
-              <a:t> for </a:t>
-            </a:r>
-            <a:r>
-              <a:rPr lang="fi-FI" dirty="0" err="1"/>
-              <a:t>them</a:t>
-            </a:r>
-            <a:r>
-              <a:rPr lang="fi-FI" dirty="0"/>
-              <a:t>)</a:t>
+              <a:t>Advance</a:t>
+            </a:r>
+            <a:r>
+              <a:rPr lang="fi-FI" dirty="0"/>
+              <a:t> </a:t>
+            </a:r>
+            <a:r>
+              <a:rPr lang="fi-FI" dirty="0" err="1"/>
+              <a:t>step</a:t>
+            </a:r>
+            <a:r>
+              <a:rPr lang="fi-FI" dirty="0"/>
+              <a:t> </a:t>
+            </a:r>
+            <a:r>
+              <a:rPr lang="fi-FI" dirty="0" err="1"/>
+              <a:t>by</a:t>
+            </a:r>
+            <a:r>
+              <a:rPr lang="fi-FI" dirty="0"/>
+              <a:t> </a:t>
+            </a:r>
+            <a:r>
+              <a:rPr lang="fi-FI" dirty="0" err="1"/>
+              <a:t>step</a:t>
+            </a:r>
+            <a:r>
+              <a:rPr lang="fi-FI" dirty="0"/>
+              <a:t>, </a:t>
+            </a:r>
+            <a:r>
+              <a:rPr lang="fi-FI" dirty="0" err="1"/>
+              <a:t>testing</a:t>
+            </a:r>
+            <a:r>
+              <a:rPr lang="fi-FI" dirty="0"/>
+              <a:t> </a:t>
+            </a:r>
+            <a:r>
+              <a:rPr lang="fi-FI" dirty="0" err="1"/>
+              <a:t>each</a:t>
+            </a:r>
+            <a:r>
+              <a:rPr lang="fi-FI" dirty="0"/>
+              <a:t> </a:t>
+            </a:r>
+            <a:r>
+              <a:rPr lang="fi-FI" dirty="0" err="1"/>
+              <a:t>step</a:t>
+            </a:r>
+            <a:r>
+              <a:rPr lang="fi-FI" dirty="0"/>
+              <a:t> to </a:t>
+            </a:r>
+            <a:r>
+              <a:rPr lang="fi-FI" dirty="0" err="1"/>
+              <a:t>reduce</a:t>
+            </a:r>
+            <a:r>
+              <a:rPr lang="fi-FI" dirty="0"/>
+              <a:t> </a:t>
+            </a:r>
+            <a:r>
+              <a:rPr lang="fi-FI" dirty="0" err="1"/>
+              <a:t>error</a:t>
+            </a:r>
+            <a:r>
+              <a:rPr lang="fi-FI" dirty="0"/>
+              <a:t> </a:t>
+            </a:r>
+            <a:r>
+              <a:rPr lang="fi-FI" dirty="0" err="1"/>
+              <a:t>possibilities</a:t>
+            </a:r>
+            <a:r>
+              <a:rPr lang="fi-FI" dirty="0"/>
+              <a:t>.</a:t>
             </a:r>
           </a:p>
           <a:p>
@@ -14094,149 +14697,64 @@
               <a:buChar char="•"/>
             </a:pPr>
             <a:r>
-              <a:rPr lang="fi-FI" b="1" dirty="0" err="1"/>
-              <a:t>Start</a:t>
-            </a:r>
-            <a:r>
-              <a:rPr lang="fi-FI" dirty="0"/>
-              <a:t> </a:t>
-            </a:r>
-            <a:r>
-              <a:rPr lang="fi-FI" dirty="0" err="1"/>
-              <a:t>the</a:t>
-            </a:r>
-            <a:r>
-              <a:rPr lang="fi-FI" dirty="0"/>
-              <a:t> Kafka </a:t>
-            </a:r>
-            <a:r>
-              <a:rPr lang="fi-FI" dirty="0" err="1"/>
-              <a:t>server</a:t>
-            </a:r>
-            <a:endParaRPr lang="fi-FI" dirty="0"/>
-          </a:p>
-          <a:p>
-            <a:pPr marL="285750" indent="-285750">
-              <a:buFont typeface="Arial" panose="020B0604020202020204" pitchFamily="34" charset="0"/>
-              <a:buChar char="•"/>
-            </a:pPr>
-            <a:r>
-              <a:rPr lang="fi-FI" dirty="0"/>
-              <a:t>Setup a </a:t>
-            </a:r>
-            <a:r>
-              <a:rPr lang="fi-FI" dirty="0" err="1"/>
-              <a:t>Topic</a:t>
-            </a:r>
-            <a:r>
-              <a:rPr lang="fi-FI" dirty="0"/>
-              <a:t> (A </a:t>
-            </a:r>
-            <a:r>
-              <a:rPr lang="fi-FI" dirty="0" err="1"/>
-              <a:t>name</a:t>
-            </a:r>
-            <a:r>
-              <a:rPr lang="fi-FI" dirty="0"/>
-              <a:t> for </a:t>
-            </a:r>
-            <a:r>
-              <a:rPr lang="fi-FI" dirty="0" err="1"/>
-              <a:t>the</a:t>
-            </a:r>
-            <a:r>
-              <a:rPr lang="fi-FI" dirty="0"/>
-              <a:t> </a:t>
-            </a:r>
-            <a:r>
-              <a:rPr lang="fi-FI" dirty="0" err="1"/>
-              <a:t>Topic</a:t>
-            </a:r>
-            <a:r>
-              <a:rPr lang="fi-FI" dirty="0"/>
-              <a:t>, </a:t>
-            </a:r>
-            <a:r>
-              <a:rPr lang="fi-FI" dirty="0" err="1"/>
-              <a:t>kind</a:t>
-            </a:r>
-            <a:r>
-              <a:rPr lang="fi-FI" dirty="0"/>
-              <a:t> of a Channel)</a:t>
-            </a:r>
-          </a:p>
-          <a:p>
-            <a:pPr marL="285750" indent="-285750">
-              <a:buFont typeface="Arial" panose="020B0604020202020204" pitchFamily="34" charset="0"/>
-              <a:buChar char="•"/>
-            </a:pPr>
-            <a:r>
-              <a:rPr lang="fi-FI" dirty="0" err="1"/>
-              <a:t>Code</a:t>
-            </a:r>
-            <a:r>
-              <a:rPr lang="fi-FI" dirty="0"/>
-              <a:t> </a:t>
-            </a:r>
-            <a:r>
-              <a:rPr lang="fi-FI" dirty="0" err="1"/>
-              <a:t>your</a:t>
-            </a:r>
-            <a:r>
-              <a:rPr lang="fi-FI" dirty="0"/>
-              <a:t> Kafka </a:t>
-            </a:r>
-            <a:r>
-              <a:rPr lang="fi-FI" dirty="0" err="1"/>
-              <a:t>producer</a:t>
-            </a:r>
-            <a:r>
-              <a:rPr lang="fi-FI" dirty="0"/>
-              <a:t> </a:t>
-            </a:r>
-            <a:r>
-              <a:rPr lang="fi-FI" dirty="0" err="1"/>
-              <a:t>client</a:t>
-            </a:r>
-            <a:r>
-              <a:rPr lang="fi-FI" dirty="0"/>
-              <a:t> </a:t>
-            </a:r>
-            <a:r>
-              <a:rPr lang="fi-FI" dirty="0" err="1"/>
-              <a:t>with</a:t>
-            </a:r>
-            <a:r>
-              <a:rPr lang="fi-FI" dirty="0"/>
-              <a:t> </a:t>
-            </a:r>
-            <a:r>
-              <a:rPr lang="fi-FI" dirty="0" err="1"/>
-              <a:t>your</a:t>
-            </a:r>
-            <a:r>
-              <a:rPr lang="fi-FI" dirty="0"/>
-              <a:t> </a:t>
-            </a:r>
-            <a:r>
-              <a:rPr lang="fi-FI" dirty="0" err="1"/>
-              <a:t>preferred</a:t>
-            </a:r>
-            <a:r>
-              <a:rPr lang="fi-FI" dirty="0"/>
-              <a:t> </a:t>
-            </a:r>
-            <a:r>
-              <a:rPr lang="fi-FI" dirty="0" err="1"/>
-              <a:t>programming</a:t>
-            </a:r>
-            <a:r>
-              <a:rPr lang="fi-FI" dirty="0"/>
-              <a:t> </a:t>
-            </a:r>
-            <a:r>
-              <a:rPr lang="fi-FI" dirty="0" err="1"/>
-              <a:t>language</a:t>
+              <a:rPr lang="fi-FI" dirty="0" err="1"/>
+              <a:t>There</a:t>
+            </a:r>
+            <a:r>
+              <a:rPr lang="fi-FI" dirty="0"/>
+              <a:t> is an </a:t>
+            </a:r>
+            <a:r>
+              <a:rPr lang="fi-FI" dirty="0" err="1"/>
+              <a:t>Assignment</a:t>
+            </a:r>
+            <a:r>
+              <a:rPr lang="fi-FI" dirty="0"/>
+              <a:t> </a:t>
+            </a:r>
+            <a:r>
+              <a:rPr lang="fi-FI" dirty="0" err="1"/>
+              <a:t>available</a:t>
+            </a:r>
+            <a:r>
+              <a:rPr lang="fi-FI" dirty="0"/>
+              <a:t> </a:t>
+            </a:r>
+            <a:r>
+              <a:rPr lang="fi-FI" dirty="0" err="1"/>
+              <a:t>that</a:t>
+            </a:r>
+            <a:r>
+              <a:rPr lang="fi-FI" dirty="0"/>
+              <a:t> </a:t>
+            </a:r>
+            <a:r>
+              <a:rPr lang="fi-FI" dirty="0" err="1"/>
+              <a:t>first</a:t>
+            </a:r>
+            <a:r>
+              <a:rPr lang="fi-FI" dirty="0"/>
+              <a:t> is just </a:t>
+            </a:r>
+            <a:r>
+              <a:rPr lang="fi-FI" dirty="0" err="1"/>
+              <a:t>writing</a:t>
+            </a:r>
+            <a:r>
+              <a:rPr lang="fi-FI" dirty="0"/>
+              <a:t> </a:t>
+            </a:r>
+            <a:r>
+              <a:rPr lang="fi-FI" dirty="0" err="1"/>
+              <a:t>based</a:t>
+            </a:r>
+            <a:r>
+              <a:rPr lang="fi-FI" dirty="0"/>
+              <a:t> on </a:t>
+            </a:r>
+            <a:r>
+              <a:rPr lang="fi-FI" dirty="0" err="1"/>
+              <a:t>model</a:t>
             </a:r>
             <a:r>
               <a:rPr lang="fi-FI" dirty="0"/>
@@ -14244,393 +14762,25 @@
             </a:r>
             <a:r>
               <a:rPr lang="fi-FI" dirty="0" err="1"/>
-              <a:t>runtime</a:t>
-            </a:r>
-            <a:r>
-              <a:rPr lang="fi-FI" dirty="0"/>
-              <a:t> </a:t>
-            </a:r>
-            <a:r>
-              <a:rPr lang="fi-FI" dirty="0" err="1"/>
-              <a:t>so</a:t>
-            </a:r>
-            <a:r>
-              <a:rPr lang="fi-FI" dirty="0"/>
-              <a:t> </a:t>
-            </a:r>
-            <a:r>
-              <a:rPr lang="fi-FI" dirty="0" err="1"/>
-              <a:t>that</a:t>
-            </a:r>
-            <a:r>
-              <a:rPr lang="fi-FI" dirty="0"/>
-              <a:t> it </a:t>
-            </a:r>
-            <a:r>
-              <a:rPr lang="fi-FI" dirty="0" err="1"/>
-              <a:t>puts</a:t>
-            </a:r>
-            <a:r>
-              <a:rPr lang="fi-FI" dirty="0"/>
-              <a:t> some </a:t>
-            </a:r>
-            <a:r>
-              <a:rPr lang="fi-FI" dirty="0" err="1"/>
-              <a:t>message</a:t>
-            </a:r>
-            <a:r>
-              <a:rPr lang="fi-FI" dirty="0"/>
-              <a:t> to </a:t>
-            </a:r>
-            <a:r>
-              <a:rPr lang="fi-FI" dirty="0" err="1"/>
-              <a:t>server’s</a:t>
-            </a:r>
-            <a:r>
-              <a:rPr lang="fi-FI" dirty="0"/>
-              <a:t> </a:t>
-            </a:r>
-            <a:r>
-              <a:rPr lang="fi-FI" dirty="0" err="1"/>
-              <a:t>Topic</a:t>
-            </a:r>
-            <a:endParaRPr lang="fi-FI" dirty="0"/>
-          </a:p>
-          <a:p>
-            <a:pPr marL="789750" lvl="1" indent="-285750">
-              <a:buFont typeface="Arial" panose="020B0604020202020204" pitchFamily="34" charset="0"/>
-              <a:buChar char="•"/>
-            </a:pPr>
-            <a:r>
-              <a:rPr lang="fi-FI" dirty="0" err="1"/>
-              <a:t>Start</a:t>
-            </a:r>
-            <a:r>
-              <a:rPr lang="fi-FI" dirty="0"/>
-              <a:t> </a:t>
-            </a:r>
-            <a:r>
-              <a:rPr lang="fi-FI" dirty="0" err="1"/>
-              <a:t>the</a:t>
-            </a:r>
-            <a:r>
-              <a:rPr lang="fi-FI" dirty="0"/>
-              <a:t> </a:t>
-            </a:r>
-            <a:r>
-              <a:rPr lang="fi-FI" dirty="0" err="1"/>
-              <a:t>producer</a:t>
-            </a:r>
-            <a:endParaRPr lang="fi-FI" dirty="0"/>
-          </a:p>
-          <a:p>
-            <a:pPr marL="285750" indent="-285750">
-              <a:buFont typeface="Arial" panose="020B0604020202020204" pitchFamily="34" charset="0"/>
-              <a:buChar char="•"/>
-            </a:pPr>
-            <a:r>
-              <a:rPr lang="fi-FI" dirty="0" err="1"/>
-              <a:t>Code</a:t>
-            </a:r>
-            <a:r>
-              <a:rPr lang="fi-FI" dirty="0"/>
-              <a:t> </a:t>
-            </a:r>
-            <a:r>
-              <a:rPr lang="fi-FI" dirty="0" err="1"/>
-              <a:t>your</a:t>
-            </a:r>
-            <a:r>
-              <a:rPr lang="fi-FI" dirty="0"/>
-              <a:t> Kafka </a:t>
-            </a:r>
-            <a:r>
-              <a:rPr lang="fi-FI" dirty="0" err="1"/>
-              <a:t>consumer</a:t>
-            </a:r>
-            <a:r>
-              <a:rPr lang="fi-FI" dirty="0"/>
-              <a:t> </a:t>
-            </a:r>
-            <a:r>
-              <a:rPr lang="fi-FI" dirty="0" err="1"/>
-              <a:t>client</a:t>
-            </a:r>
-            <a:r>
-              <a:rPr lang="fi-FI" dirty="0"/>
-              <a:t> </a:t>
-            </a:r>
-            <a:r>
-              <a:rPr lang="fi-FI" dirty="0" err="1"/>
-              <a:t>with</a:t>
-            </a:r>
-            <a:r>
-              <a:rPr lang="fi-FI" dirty="0"/>
-              <a:t> </a:t>
-            </a:r>
-            <a:r>
-              <a:rPr lang="fi-FI" dirty="0" err="1"/>
-              <a:t>your</a:t>
-            </a:r>
-            <a:r>
-              <a:rPr lang="fi-FI" dirty="0"/>
-              <a:t> </a:t>
-            </a:r>
-            <a:r>
-              <a:rPr lang="fi-FI" dirty="0" err="1"/>
-              <a:t>preferred</a:t>
-            </a:r>
-            <a:r>
-              <a:rPr lang="fi-FI" dirty="0"/>
-              <a:t> </a:t>
-            </a:r>
-            <a:r>
-              <a:rPr lang="fi-FI" dirty="0" err="1"/>
-              <a:t>programming</a:t>
-            </a:r>
-            <a:r>
-              <a:rPr lang="fi-FI" dirty="0"/>
-              <a:t> </a:t>
-            </a:r>
-            <a:r>
-              <a:rPr lang="fi-FI" dirty="0" err="1"/>
-              <a:t>language</a:t>
-            </a:r>
-            <a:r>
-              <a:rPr lang="fi-FI" dirty="0"/>
-              <a:t> and </a:t>
-            </a:r>
-            <a:r>
-              <a:rPr lang="fi-FI" dirty="0" err="1"/>
-              <a:t>runtime</a:t>
-            </a:r>
-            <a:r>
-              <a:rPr lang="fi-FI" dirty="0"/>
-              <a:t> </a:t>
-            </a:r>
-            <a:r>
-              <a:rPr lang="fi-FI" dirty="0" err="1"/>
-              <a:t>so</a:t>
-            </a:r>
-            <a:r>
-              <a:rPr lang="fi-FI" dirty="0"/>
-              <a:t> </a:t>
-            </a:r>
-            <a:r>
-              <a:rPr lang="fi-FI" dirty="0" err="1"/>
-              <a:t>that</a:t>
-            </a:r>
-            <a:r>
-              <a:rPr lang="fi-FI" dirty="0"/>
-              <a:t> it </a:t>
-            </a:r>
-            <a:r>
-              <a:rPr lang="fi-FI" dirty="0" err="1"/>
-              <a:t>subscribes</a:t>
-            </a:r>
-            <a:r>
-              <a:rPr lang="fi-FI" dirty="0"/>
-              <a:t> to </a:t>
-            </a:r>
-            <a:r>
-              <a:rPr lang="fi-FI" dirty="0" err="1"/>
-              <a:t>receive</a:t>
-            </a:r>
-            <a:r>
-              <a:rPr lang="fi-FI" dirty="0"/>
-              <a:t> </a:t>
-            </a:r>
-            <a:r>
-              <a:rPr lang="fi-FI" dirty="0" err="1"/>
-              <a:t>those</a:t>
-            </a:r>
-            <a:r>
-              <a:rPr lang="fi-FI" dirty="0"/>
-              <a:t> </a:t>
-            </a:r>
-            <a:r>
-              <a:rPr lang="fi-FI" dirty="0" err="1"/>
-              <a:t>messages</a:t>
-            </a:r>
-            <a:r>
-              <a:rPr lang="fi-FI" dirty="0"/>
-              <a:t>.</a:t>
-            </a:r>
-          </a:p>
-          <a:p>
-            <a:pPr marL="789750" lvl="1" indent="-285750">
-              <a:buFont typeface="Arial" panose="020B0604020202020204" pitchFamily="34" charset="0"/>
-              <a:buChar char="•"/>
-            </a:pPr>
-            <a:r>
-              <a:rPr lang="fi-FI" dirty="0"/>
-              <a:t>Language </a:t>
-            </a:r>
-            <a:r>
-              <a:rPr lang="fi-FI" dirty="0" err="1"/>
-              <a:t>does</a:t>
-            </a:r>
-            <a:r>
-              <a:rPr lang="fi-FI" dirty="0"/>
-              <a:t> </a:t>
-            </a:r>
-            <a:r>
-              <a:rPr lang="fi-FI" dirty="0" err="1"/>
-              <a:t>not</a:t>
-            </a:r>
-            <a:r>
-              <a:rPr lang="fi-FI" dirty="0"/>
-              <a:t> </a:t>
-            </a:r>
-            <a:r>
-              <a:rPr lang="fi-FI" dirty="0" err="1"/>
-              <a:t>have</a:t>
-            </a:r>
-            <a:r>
-              <a:rPr lang="fi-FI" dirty="0"/>
-              <a:t> to </a:t>
-            </a:r>
-            <a:r>
-              <a:rPr lang="fi-FI" dirty="0" err="1"/>
-              <a:t>be</a:t>
-            </a:r>
-            <a:r>
-              <a:rPr lang="fi-FI" dirty="0"/>
-              <a:t> </a:t>
-            </a:r>
-            <a:r>
-              <a:rPr lang="fi-FI" dirty="0" err="1"/>
-              <a:t>same</a:t>
-            </a:r>
-            <a:r>
-              <a:rPr lang="fi-FI" dirty="0"/>
-              <a:t> as </a:t>
-            </a:r>
-            <a:r>
-              <a:rPr lang="fi-FI" dirty="0" err="1"/>
-              <a:t>the</a:t>
-            </a:r>
-            <a:r>
-              <a:rPr lang="fi-FI" dirty="0"/>
-              <a:t> </a:t>
-            </a:r>
-            <a:r>
-              <a:rPr lang="fi-FI" dirty="0" err="1"/>
-              <a:t>producer</a:t>
-            </a:r>
-            <a:r>
-              <a:rPr lang="fi-FI" dirty="0"/>
-              <a:t>. </a:t>
-            </a:r>
-            <a:r>
-              <a:rPr lang="fi-FI" dirty="0" err="1"/>
-              <a:t>But</a:t>
-            </a:r>
-            <a:r>
-              <a:rPr lang="fi-FI" dirty="0"/>
-              <a:t> </a:t>
-            </a:r>
-            <a:r>
-              <a:rPr lang="fi-FI" dirty="0" err="1"/>
-              <a:t>possibly</a:t>
-            </a:r>
-            <a:r>
-              <a:rPr lang="fi-FI" dirty="0"/>
-              <a:t> </a:t>
-            </a:r>
-            <a:r>
-              <a:rPr lang="fi-FI" dirty="0" err="1"/>
-              <a:t>you</a:t>
-            </a:r>
-            <a:r>
-              <a:rPr lang="fi-FI" dirty="0"/>
-              <a:t> </a:t>
-            </a:r>
-            <a:r>
-              <a:rPr lang="fi-FI" dirty="0" err="1"/>
-              <a:t>want</a:t>
-            </a:r>
-            <a:r>
-              <a:rPr lang="fi-FI" dirty="0"/>
-              <a:t> to </a:t>
-            </a:r>
-            <a:r>
-              <a:rPr lang="fi-FI" dirty="0" err="1"/>
-              <a:t>use</a:t>
-            </a:r>
-            <a:r>
-              <a:rPr lang="fi-FI" dirty="0"/>
-              <a:t> </a:t>
-            </a:r>
-            <a:r>
-              <a:rPr lang="fi-FI" dirty="0" err="1"/>
-              <a:t>the</a:t>
-            </a:r>
-            <a:r>
-              <a:rPr lang="fi-FI" dirty="0"/>
-              <a:t> </a:t>
-            </a:r>
-            <a:r>
-              <a:rPr lang="fi-FI" dirty="0" err="1"/>
-              <a:t>same</a:t>
-            </a:r>
-            <a:r>
-              <a:rPr lang="fi-FI" dirty="0"/>
-              <a:t> for </a:t>
-            </a:r>
-            <a:r>
-              <a:rPr lang="fi-FI" dirty="0" err="1"/>
-              <a:t>simplicity</a:t>
-            </a:r>
-            <a:endParaRPr lang="fi-FI" dirty="0"/>
-          </a:p>
-          <a:p>
-            <a:pPr marL="789750" lvl="1" indent="-285750">
-              <a:buFont typeface="Arial" panose="020B0604020202020204" pitchFamily="34" charset="0"/>
-              <a:buChar char="•"/>
-            </a:pPr>
-            <a:r>
-              <a:rPr lang="fi-FI" dirty="0" err="1"/>
-              <a:t>Start</a:t>
-            </a:r>
-            <a:r>
-              <a:rPr lang="fi-FI" dirty="0"/>
-              <a:t> </a:t>
-            </a:r>
-            <a:r>
-              <a:rPr lang="fi-FI" dirty="0" err="1"/>
-              <a:t>the</a:t>
-            </a:r>
-            <a:r>
-              <a:rPr lang="fi-FI" dirty="0"/>
-              <a:t> </a:t>
-            </a:r>
-            <a:r>
-              <a:rPr lang="fi-FI" dirty="0" err="1"/>
-              <a:t>consumer</a:t>
-            </a:r>
-            <a:endParaRPr lang="fi-FI" dirty="0"/>
-          </a:p>
-          <a:p>
-            <a:pPr marL="789750" lvl="1" indent="-285750">
-              <a:buFont typeface="Arial" panose="020B0604020202020204" pitchFamily="34" charset="0"/>
-              <a:buChar char="•"/>
-            </a:pPr>
-            <a:endParaRPr lang="fi-FI" dirty="0"/>
-          </a:p>
-          <a:p>
-            <a:pPr marL="285750" indent="-285750">
-              <a:buFont typeface="Arial" panose="020B0604020202020204" pitchFamily="34" charset="0"/>
-              <a:buChar char="•"/>
-            </a:pPr>
-            <a:endParaRPr lang="fi-FI" dirty="0"/>
-          </a:p>
-          <a:p>
-            <a:pPr marL="285750" indent="-285750">
-              <a:buFont typeface="Arial" panose="020B0604020202020204" pitchFamily="34" charset="0"/>
-              <a:buChar char="•"/>
-            </a:pPr>
-            <a:endParaRPr lang="fi-FI" dirty="0"/>
+              <a:t>making</a:t>
+            </a:r>
+            <a:r>
+              <a:rPr lang="fi-FI" dirty="0"/>
+              <a:t> it to </a:t>
+            </a:r>
+            <a:r>
+              <a:rPr lang="fi-FI" dirty="0" err="1"/>
+              <a:t>run</a:t>
+            </a:r>
+            <a:endParaRPr lang="fi-FI" dirty="0">
+              <a:hlinkClick r:id="rId2">
+                <a:extLst>
+                  <a:ext uri="{A12FA001-AC4F-418D-AE19-62706E023703}">
+                    <ahyp:hlinkClr xmlns:ahyp="http://schemas.microsoft.com/office/drawing/2018/hyperlinkcolor" val="tx"/>
+                  </a:ext>
+                </a:extLst>
+              </a:hlinkClick>
+            </a:endParaRPr>
           </a:p>
           <a:p>
             <a:pPr marL="0" indent="0">
@@ -14726,7 +14876,7 @@
     </p:spTree>
     <p:extLst>
       <p:ext uri="{BB962C8B-B14F-4D97-AF65-F5344CB8AC3E}">
-        <p14:creationId xmlns:p14="http://schemas.microsoft.com/office/powerpoint/2010/main" val="326178029"/>
+        <p14:creationId xmlns:p14="http://schemas.microsoft.com/office/powerpoint/2010/main" val="820472147"/>
       </p:ext>
     </p:extLst>
   </p:cSld>
@@ -14758,7 +14908,7 @@
           <p:cNvPr id="8" name="Title 7">
             <a:extLst>
               <a:ext uri="{FF2B5EF4-FFF2-40B4-BE49-F238E27FC236}">
-                <a16:creationId xmlns:a16="http://schemas.microsoft.com/office/drawing/2014/main" id="{49202545-D26B-485C-9E25-62859E92ED89}"/>
+                <a16:creationId xmlns:a16="http://schemas.microsoft.com/office/drawing/2014/main" id="{03801FB7-8FBC-844F-8D63-9A597A066215}"/>
               </a:ext>
             </a:extLst>
           </p:cNvPr>
@@ -14774,16 +14924,44 @@
           <a:bodyPr/>
           <a:lstStyle/>
           <a:p>
-            <a:endParaRPr lang="LID4096"/>
-          </a:p>
-        </p:txBody>
-      </p:sp>
-      <p:sp>
-        <p:nvSpPr>
-          <p:cNvPr id="9" name="Text Placeholder 8">
-            <a:extLst>
-              <a:ext uri="{FF2B5EF4-FFF2-40B4-BE49-F238E27FC236}">
-                <a16:creationId xmlns:a16="http://schemas.microsoft.com/office/drawing/2014/main" id="{B5958F18-B2CD-466B-9484-119914465620}"/>
+            <a:r>
+              <a:rPr lang="fi-FI" b="0" dirty="0" err="1"/>
+              <a:t>Steps</a:t>
+            </a:r>
+            <a:r>
+              <a:rPr lang="fi-FI" b="0" dirty="0"/>
+              <a:t> of Kafka demo/</a:t>
+            </a:r>
+            <a:r>
+              <a:rPr lang="fi-FI" b="0" dirty="0" err="1"/>
+              <a:t>tryout</a:t>
+            </a:r>
+            <a:r>
+              <a:rPr lang="fi-FI" b="0" dirty="0"/>
+              <a:t> </a:t>
+            </a:r>
+            <a:r>
+              <a:rPr lang="fi-FI" b="0" dirty="0" err="1"/>
+              <a:t>system</a:t>
+            </a:r>
+            <a:r>
+              <a:rPr lang="fi-FI" b="0" dirty="0"/>
+              <a:t> </a:t>
+            </a:r>
+            <a:r>
+              <a:rPr lang="fi-FI" b="0" dirty="0" err="1"/>
+              <a:t>development</a:t>
+            </a:r>
+            <a:endParaRPr lang="fi-FI" b="0" dirty="0"/>
+          </a:p>
+        </p:txBody>
+      </p:sp>
+      <p:sp>
+        <p:nvSpPr>
+          <p:cNvPr id="9" name="Content Placeholder 8">
+            <a:extLst>
+              <a:ext uri="{FF2B5EF4-FFF2-40B4-BE49-F238E27FC236}">
+                <a16:creationId xmlns:a16="http://schemas.microsoft.com/office/drawing/2014/main" id="{C711FFF1-5700-384F-B322-71416B4D664F}"/>
               </a:ext>
             </a:extLst>
           </p:cNvPr>
@@ -14791,29 +14969,740 @@
             <a:spLocks noGrp="1"/>
           </p:cNvSpPr>
           <p:nvPr>
-            <p:ph type="body" idx="1"/>
+            <p:ph sz="half" idx="2"/>
           </p:nvPr>
         </p:nvSpPr>
         <p:spPr>
           <a:xfrm>
-            <a:off x="6096000" y="4061598"/>
-            <a:ext cx="5580062" cy="1672452"/>
+            <a:off x="550865" y="1631957"/>
+            <a:ext cx="11125198" cy="4140200"/>
           </a:xfrm>
         </p:spPr>
         <p:txBody>
           <a:bodyPr/>
           <a:lstStyle/>
           <a:p>
-            <a:endParaRPr lang="LID4096" dirty="0"/>
-          </a:p>
-        </p:txBody>
-      </p:sp>
-      <p:sp>
-        <p:nvSpPr>
-          <p:cNvPr id="3" name="Date Placeholder 2">
-            <a:extLst>
-              <a:ext uri="{FF2B5EF4-FFF2-40B4-BE49-F238E27FC236}">
-                <a16:creationId xmlns:a16="http://schemas.microsoft.com/office/drawing/2014/main" id="{1B360C12-A89E-4C4C-BD2F-3613A5008805}"/>
+            <a:pPr marL="285750" indent="-285750">
+              <a:buFont typeface="Arial" panose="020B0604020202020204" pitchFamily="34" charset="0"/>
+              <a:buChar char="•"/>
+            </a:pPr>
+            <a:r>
+              <a:rPr lang="fi-FI" dirty="0" err="1"/>
+              <a:t>Download</a:t>
+            </a:r>
+            <a:r>
+              <a:rPr lang="fi-FI" dirty="0"/>
+              <a:t> Kafka </a:t>
+            </a:r>
+            <a:r>
+              <a:rPr lang="fi-FI" dirty="0" err="1"/>
+              <a:t>runnables</a:t>
+            </a:r>
+            <a:r>
+              <a:rPr lang="fi-FI" dirty="0"/>
+              <a:t> (Kafka </a:t>
+            </a:r>
+            <a:r>
+              <a:rPr lang="fi-FI" dirty="0" err="1"/>
+              <a:t>server</a:t>
+            </a:r>
+            <a:r>
+              <a:rPr lang="fi-FI" dirty="0"/>
+              <a:t> and </a:t>
+            </a:r>
+            <a:r>
+              <a:rPr lang="fi-FI" dirty="0" err="1"/>
+              <a:t>Zookeeper</a:t>
+            </a:r>
+            <a:r>
+              <a:rPr lang="fi-FI" dirty="0"/>
+              <a:t>) (</a:t>
+            </a:r>
+            <a:r>
+              <a:rPr lang="fi-FI" dirty="0" err="1"/>
+              <a:t>Or</a:t>
+            </a:r>
+            <a:r>
+              <a:rPr lang="fi-FI" dirty="0"/>
+              <a:t> </a:t>
+            </a:r>
+            <a:r>
+              <a:rPr lang="fi-FI" dirty="0" err="1"/>
+              <a:t>use</a:t>
+            </a:r>
+            <a:r>
+              <a:rPr lang="fi-FI" dirty="0"/>
+              <a:t> </a:t>
+            </a:r>
+            <a:r>
+              <a:rPr lang="fi-FI" dirty="0" err="1"/>
+              <a:t>them</a:t>
+            </a:r>
+            <a:r>
+              <a:rPr lang="fi-FI" dirty="0"/>
+              <a:t> </a:t>
+            </a:r>
+            <a:r>
+              <a:rPr lang="fi-FI" dirty="0" err="1"/>
+              <a:t>from</a:t>
+            </a:r>
+            <a:r>
+              <a:rPr lang="fi-FI" dirty="0"/>
+              <a:t> </a:t>
+            </a:r>
+            <a:r>
+              <a:rPr lang="fi-FI" dirty="0" err="1"/>
+              <a:t>Docker</a:t>
+            </a:r>
+            <a:r>
+              <a:rPr lang="fi-FI" dirty="0"/>
+              <a:t> image </a:t>
+            </a:r>
+            <a:r>
+              <a:rPr lang="fi-FI" dirty="0" err="1"/>
+              <a:t>repository</a:t>
+            </a:r>
+            <a:r>
+              <a:rPr lang="fi-FI" dirty="0"/>
+              <a:t>)</a:t>
+            </a:r>
+          </a:p>
+          <a:p>
+            <a:pPr marL="285750" indent="-285750">
+              <a:buFont typeface="Arial" panose="020B0604020202020204" pitchFamily="34" charset="0"/>
+              <a:buChar char="•"/>
+            </a:pPr>
+            <a:r>
+              <a:rPr lang="fi-FI" dirty="0" err="1"/>
+              <a:t>Configure</a:t>
+            </a:r>
+            <a:r>
+              <a:rPr lang="fi-FI" dirty="0"/>
+              <a:t> Kafka </a:t>
+            </a:r>
+            <a:r>
+              <a:rPr lang="fi-FI" dirty="0" err="1"/>
+              <a:t>server</a:t>
+            </a:r>
+            <a:r>
+              <a:rPr lang="fi-FI" dirty="0"/>
+              <a:t> and </a:t>
+            </a:r>
+            <a:r>
+              <a:rPr lang="fi-FI" dirty="0" err="1"/>
+              <a:t>Zookeeper</a:t>
+            </a:r>
+            <a:r>
+              <a:rPr lang="fi-FI" dirty="0"/>
+              <a:t> </a:t>
+            </a:r>
+            <a:r>
+              <a:rPr lang="fi-FI" dirty="0" err="1"/>
+              <a:t>process</a:t>
+            </a:r>
+            <a:r>
+              <a:rPr lang="fi-FI" dirty="0"/>
+              <a:t> (</a:t>
+            </a:r>
+            <a:r>
+              <a:rPr lang="fi-FI" dirty="0" err="1"/>
+              <a:t>Or</a:t>
+            </a:r>
+            <a:r>
+              <a:rPr lang="fi-FI" dirty="0"/>
+              <a:t> </a:t>
+            </a:r>
+            <a:r>
+              <a:rPr lang="fi-FI" dirty="0" err="1"/>
+              <a:t>the</a:t>
+            </a:r>
+            <a:r>
+              <a:rPr lang="fi-FI" dirty="0"/>
+              <a:t> </a:t>
+            </a:r>
+            <a:r>
+              <a:rPr lang="fi-FI" dirty="0" err="1"/>
+              <a:t>docker</a:t>
+            </a:r>
+            <a:r>
+              <a:rPr lang="fi-FI" dirty="0"/>
+              <a:t> </a:t>
+            </a:r>
+            <a:r>
+              <a:rPr lang="fi-FI" dirty="0" err="1"/>
+              <a:t>container</a:t>
+            </a:r>
+            <a:r>
+              <a:rPr lang="fi-FI" dirty="0"/>
+              <a:t> for </a:t>
+            </a:r>
+            <a:r>
+              <a:rPr lang="fi-FI" dirty="0" err="1"/>
+              <a:t>them</a:t>
+            </a:r>
+            <a:r>
+              <a:rPr lang="fi-FI" dirty="0"/>
+              <a:t>)</a:t>
+            </a:r>
+          </a:p>
+          <a:p>
+            <a:pPr marL="285750" indent="-285750">
+              <a:buFont typeface="Arial" panose="020B0604020202020204" pitchFamily="34" charset="0"/>
+              <a:buChar char="•"/>
+            </a:pPr>
+            <a:r>
+              <a:rPr lang="fi-FI" b="1" dirty="0" err="1"/>
+              <a:t>Start</a:t>
+            </a:r>
+            <a:r>
+              <a:rPr lang="fi-FI" dirty="0"/>
+              <a:t> </a:t>
+            </a:r>
+            <a:r>
+              <a:rPr lang="fi-FI" dirty="0" err="1"/>
+              <a:t>the</a:t>
+            </a:r>
+            <a:r>
+              <a:rPr lang="fi-FI" dirty="0"/>
+              <a:t> Kafka </a:t>
+            </a:r>
+            <a:r>
+              <a:rPr lang="fi-FI" dirty="0" err="1"/>
+              <a:t>server</a:t>
+            </a:r>
+            <a:endParaRPr lang="fi-FI" dirty="0"/>
+          </a:p>
+          <a:p>
+            <a:pPr marL="285750" indent="-285750">
+              <a:buFont typeface="Arial" panose="020B0604020202020204" pitchFamily="34" charset="0"/>
+              <a:buChar char="•"/>
+            </a:pPr>
+            <a:r>
+              <a:rPr lang="fi-FI" dirty="0"/>
+              <a:t>Setup a </a:t>
+            </a:r>
+            <a:r>
+              <a:rPr lang="fi-FI" dirty="0" err="1"/>
+              <a:t>Topic</a:t>
+            </a:r>
+            <a:r>
+              <a:rPr lang="fi-FI" dirty="0"/>
+              <a:t> (A </a:t>
+            </a:r>
+            <a:r>
+              <a:rPr lang="fi-FI" dirty="0" err="1"/>
+              <a:t>name</a:t>
+            </a:r>
+            <a:r>
+              <a:rPr lang="fi-FI" dirty="0"/>
+              <a:t> for </a:t>
+            </a:r>
+            <a:r>
+              <a:rPr lang="fi-FI" dirty="0" err="1"/>
+              <a:t>the</a:t>
+            </a:r>
+            <a:r>
+              <a:rPr lang="fi-FI" dirty="0"/>
+              <a:t> </a:t>
+            </a:r>
+            <a:r>
+              <a:rPr lang="fi-FI" dirty="0" err="1"/>
+              <a:t>Topic</a:t>
+            </a:r>
+            <a:r>
+              <a:rPr lang="fi-FI" dirty="0"/>
+              <a:t>, </a:t>
+            </a:r>
+            <a:r>
+              <a:rPr lang="fi-FI" dirty="0" err="1"/>
+              <a:t>kind</a:t>
+            </a:r>
+            <a:r>
+              <a:rPr lang="fi-FI" dirty="0"/>
+              <a:t> of a Channel)</a:t>
+            </a:r>
+          </a:p>
+          <a:p>
+            <a:pPr marL="285750" indent="-285750">
+              <a:buFont typeface="Arial" panose="020B0604020202020204" pitchFamily="34" charset="0"/>
+              <a:buChar char="•"/>
+            </a:pPr>
+            <a:r>
+              <a:rPr lang="fi-FI" dirty="0" err="1"/>
+              <a:t>Code</a:t>
+            </a:r>
+            <a:r>
+              <a:rPr lang="fi-FI" dirty="0"/>
+              <a:t> </a:t>
+            </a:r>
+            <a:r>
+              <a:rPr lang="fi-FI" dirty="0" err="1"/>
+              <a:t>your</a:t>
+            </a:r>
+            <a:r>
+              <a:rPr lang="fi-FI" dirty="0"/>
+              <a:t> Kafka </a:t>
+            </a:r>
+            <a:r>
+              <a:rPr lang="fi-FI" dirty="0" err="1"/>
+              <a:t>producer</a:t>
+            </a:r>
+            <a:r>
+              <a:rPr lang="fi-FI" dirty="0"/>
+              <a:t> </a:t>
+            </a:r>
+            <a:r>
+              <a:rPr lang="fi-FI" dirty="0" err="1"/>
+              <a:t>client</a:t>
+            </a:r>
+            <a:r>
+              <a:rPr lang="fi-FI" dirty="0"/>
+              <a:t> </a:t>
+            </a:r>
+            <a:r>
+              <a:rPr lang="fi-FI" dirty="0" err="1"/>
+              <a:t>with</a:t>
+            </a:r>
+            <a:r>
+              <a:rPr lang="fi-FI" dirty="0"/>
+              <a:t> </a:t>
+            </a:r>
+            <a:r>
+              <a:rPr lang="fi-FI" dirty="0" err="1"/>
+              <a:t>your</a:t>
+            </a:r>
+            <a:r>
+              <a:rPr lang="fi-FI" dirty="0"/>
+              <a:t> </a:t>
+            </a:r>
+            <a:r>
+              <a:rPr lang="fi-FI" dirty="0" err="1"/>
+              <a:t>preferred</a:t>
+            </a:r>
+            <a:r>
+              <a:rPr lang="fi-FI" dirty="0"/>
+              <a:t> </a:t>
+            </a:r>
+            <a:r>
+              <a:rPr lang="fi-FI" dirty="0" err="1"/>
+              <a:t>programming</a:t>
+            </a:r>
+            <a:r>
+              <a:rPr lang="fi-FI" dirty="0"/>
+              <a:t> </a:t>
+            </a:r>
+            <a:r>
+              <a:rPr lang="fi-FI" dirty="0" err="1"/>
+              <a:t>language</a:t>
+            </a:r>
+            <a:r>
+              <a:rPr lang="fi-FI" dirty="0"/>
+              <a:t> and </a:t>
+            </a:r>
+            <a:r>
+              <a:rPr lang="fi-FI" dirty="0" err="1"/>
+              <a:t>runtime</a:t>
+            </a:r>
+            <a:r>
+              <a:rPr lang="fi-FI" dirty="0"/>
+              <a:t> </a:t>
+            </a:r>
+            <a:r>
+              <a:rPr lang="fi-FI" dirty="0" err="1"/>
+              <a:t>so</a:t>
+            </a:r>
+            <a:r>
+              <a:rPr lang="fi-FI" dirty="0"/>
+              <a:t> </a:t>
+            </a:r>
+            <a:r>
+              <a:rPr lang="fi-FI" dirty="0" err="1"/>
+              <a:t>that</a:t>
+            </a:r>
+            <a:r>
+              <a:rPr lang="fi-FI" dirty="0"/>
+              <a:t> it </a:t>
+            </a:r>
+            <a:r>
+              <a:rPr lang="fi-FI" dirty="0" err="1"/>
+              <a:t>puts</a:t>
+            </a:r>
+            <a:r>
+              <a:rPr lang="fi-FI" dirty="0"/>
+              <a:t> some </a:t>
+            </a:r>
+            <a:r>
+              <a:rPr lang="fi-FI" dirty="0" err="1"/>
+              <a:t>message</a:t>
+            </a:r>
+            <a:r>
+              <a:rPr lang="fi-FI" dirty="0"/>
+              <a:t> to </a:t>
+            </a:r>
+            <a:r>
+              <a:rPr lang="fi-FI" dirty="0" err="1"/>
+              <a:t>server’s</a:t>
+            </a:r>
+            <a:r>
+              <a:rPr lang="fi-FI" dirty="0"/>
+              <a:t> </a:t>
+            </a:r>
+            <a:r>
+              <a:rPr lang="fi-FI" dirty="0" err="1"/>
+              <a:t>Topic</a:t>
+            </a:r>
+            <a:endParaRPr lang="fi-FI" dirty="0"/>
+          </a:p>
+          <a:p>
+            <a:pPr marL="789750" lvl="1" indent="-285750">
+              <a:buFont typeface="Arial" panose="020B0604020202020204" pitchFamily="34" charset="0"/>
+              <a:buChar char="•"/>
+            </a:pPr>
+            <a:r>
+              <a:rPr lang="fi-FI" dirty="0" err="1"/>
+              <a:t>Start</a:t>
+            </a:r>
+            <a:r>
+              <a:rPr lang="fi-FI" dirty="0"/>
+              <a:t> </a:t>
+            </a:r>
+            <a:r>
+              <a:rPr lang="fi-FI" dirty="0" err="1"/>
+              <a:t>the</a:t>
+            </a:r>
+            <a:r>
+              <a:rPr lang="fi-FI" dirty="0"/>
+              <a:t> </a:t>
+            </a:r>
+            <a:r>
+              <a:rPr lang="fi-FI" dirty="0" err="1"/>
+              <a:t>producer</a:t>
+            </a:r>
+            <a:endParaRPr lang="fi-FI" dirty="0"/>
+          </a:p>
+          <a:p>
+            <a:pPr marL="285750" indent="-285750">
+              <a:buFont typeface="Arial" panose="020B0604020202020204" pitchFamily="34" charset="0"/>
+              <a:buChar char="•"/>
+            </a:pPr>
+            <a:r>
+              <a:rPr lang="fi-FI" dirty="0" err="1"/>
+              <a:t>Code</a:t>
+            </a:r>
+            <a:r>
+              <a:rPr lang="fi-FI" dirty="0"/>
+              <a:t> </a:t>
+            </a:r>
+            <a:r>
+              <a:rPr lang="fi-FI" dirty="0" err="1"/>
+              <a:t>your</a:t>
+            </a:r>
+            <a:r>
+              <a:rPr lang="fi-FI" dirty="0"/>
+              <a:t> Kafka </a:t>
+            </a:r>
+            <a:r>
+              <a:rPr lang="fi-FI" dirty="0" err="1"/>
+              <a:t>consumer</a:t>
+            </a:r>
+            <a:r>
+              <a:rPr lang="fi-FI" dirty="0"/>
+              <a:t> </a:t>
+            </a:r>
+            <a:r>
+              <a:rPr lang="fi-FI" dirty="0" err="1"/>
+              <a:t>client</a:t>
+            </a:r>
+            <a:r>
+              <a:rPr lang="fi-FI" dirty="0"/>
+              <a:t> </a:t>
+            </a:r>
+            <a:r>
+              <a:rPr lang="fi-FI" dirty="0" err="1"/>
+              <a:t>with</a:t>
+            </a:r>
+            <a:r>
+              <a:rPr lang="fi-FI" dirty="0"/>
+              <a:t> </a:t>
+            </a:r>
+            <a:r>
+              <a:rPr lang="fi-FI" dirty="0" err="1"/>
+              <a:t>your</a:t>
+            </a:r>
+            <a:r>
+              <a:rPr lang="fi-FI" dirty="0"/>
+              <a:t> </a:t>
+            </a:r>
+            <a:r>
+              <a:rPr lang="fi-FI" dirty="0" err="1"/>
+              <a:t>preferred</a:t>
+            </a:r>
+            <a:r>
+              <a:rPr lang="fi-FI" dirty="0"/>
+              <a:t> </a:t>
+            </a:r>
+            <a:r>
+              <a:rPr lang="fi-FI" dirty="0" err="1"/>
+              <a:t>programming</a:t>
+            </a:r>
+            <a:r>
+              <a:rPr lang="fi-FI" dirty="0"/>
+              <a:t> </a:t>
+            </a:r>
+            <a:r>
+              <a:rPr lang="fi-FI" dirty="0" err="1"/>
+              <a:t>language</a:t>
+            </a:r>
+            <a:r>
+              <a:rPr lang="fi-FI" dirty="0"/>
+              <a:t> and </a:t>
+            </a:r>
+            <a:r>
+              <a:rPr lang="fi-FI" dirty="0" err="1"/>
+              <a:t>runtime</a:t>
+            </a:r>
+            <a:r>
+              <a:rPr lang="fi-FI" dirty="0"/>
+              <a:t> </a:t>
+            </a:r>
+            <a:r>
+              <a:rPr lang="fi-FI" dirty="0" err="1"/>
+              <a:t>so</a:t>
+            </a:r>
+            <a:r>
+              <a:rPr lang="fi-FI" dirty="0"/>
+              <a:t> </a:t>
+            </a:r>
+            <a:r>
+              <a:rPr lang="fi-FI" dirty="0" err="1"/>
+              <a:t>that</a:t>
+            </a:r>
+            <a:r>
+              <a:rPr lang="fi-FI" dirty="0"/>
+              <a:t> it </a:t>
+            </a:r>
+            <a:r>
+              <a:rPr lang="fi-FI" dirty="0" err="1"/>
+              <a:t>subscribes</a:t>
+            </a:r>
+            <a:r>
+              <a:rPr lang="fi-FI" dirty="0"/>
+              <a:t> to </a:t>
+            </a:r>
+            <a:r>
+              <a:rPr lang="fi-FI" dirty="0" err="1"/>
+              <a:t>receive</a:t>
+            </a:r>
+            <a:r>
+              <a:rPr lang="fi-FI" dirty="0"/>
+              <a:t> </a:t>
+            </a:r>
+            <a:r>
+              <a:rPr lang="fi-FI" dirty="0" err="1"/>
+              <a:t>those</a:t>
+            </a:r>
+            <a:r>
+              <a:rPr lang="fi-FI" dirty="0"/>
+              <a:t> </a:t>
+            </a:r>
+            <a:r>
+              <a:rPr lang="fi-FI" dirty="0" err="1"/>
+              <a:t>messages</a:t>
+            </a:r>
+            <a:r>
+              <a:rPr lang="fi-FI" dirty="0"/>
+              <a:t>.</a:t>
+            </a:r>
+          </a:p>
+          <a:p>
+            <a:pPr marL="789750" lvl="1" indent="-285750">
+              <a:buFont typeface="Arial" panose="020B0604020202020204" pitchFamily="34" charset="0"/>
+              <a:buChar char="•"/>
+            </a:pPr>
+            <a:r>
+              <a:rPr lang="fi-FI" dirty="0"/>
+              <a:t>Language </a:t>
+            </a:r>
+            <a:r>
+              <a:rPr lang="fi-FI" dirty="0" err="1"/>
+              <a:t>does</a:t>
+            </a:r>
+            <a:r>
+              <a:rPr lang="fi-FI" dirty="0"/>
+              <a:t> </a:t>
+            </a:r>
+            <a:r>
+              <a:rPr lang="fi-FI" dirty="0" err="1"/>
+              <a:t>not</a:t>
+            </a:r>
+            <a:r>
+              <a:rPr lang="fi-FI" dirty="0"/>
+              <a:t> </a:t>
+            </a:r>
+            <a:r>
+              <a:rPr lang="fi-FI" dirty="0" err="1"/>
+              <a:t>have</a:t>
+            </a:r>
+            <a:r>
+              <a:rPr lang="fi-FI" dirty="0"/>
+              <a:t> to </a:t>
+            </a:r>
+            <a:r>
+              <a:rPr lang="fi-FI" dirty="0" err="1"/>
+              <a:t>be</a:t>
+            </a:r>
+            <a:r>
+              <a:rPr lang="fi-FI" dirty="0"/>
+              <a:t> </a:t>
+            </a:r>
+            <a:r>
+              <a:rPr lang="fi-FI" dirty="0" err="1"/>
+              <a:t>same</a:t>
+            </a:r>
+            <a:r>
+              <a:rPr lang="fi-FI" dirty="0"/>
+              <a:t> as </a:t>
+            </a:r>
+            <a:r>
+              <a:rPr lang="fi-FI" dirty="0" err="1"/>
+              <a:t>the</a:t>
+            </a:r>
+            <a:r>
+              <a:rPr lang="fi-FI" dirty="0"/>
+              <a:t> </a:t>
+            </a:r>
+            <a:r>
+              <a:rPr lang="fi-FI" dirty="0" err="1"/>
+              <a:t>producer</a:t>
+            </a:r>
+            <a:r>
+              <a:rPr lang="fi-FI" dirty="0"/>
+              <a:t>. </a:t>
+            </a:r>
+            <a:r>
+              <a:rPr lang="fi-FI" dirty="0" err="1"/>
+              <a:t>But</a:t>
+            </a:r>
+            <a:r>
+              <a:rPr lang="fi-FI" dirty="0"/>
+              <a:t> </a:t>
+            </a:r>
+            <a:r>
+              <a:rPr lang="fi-FI" dirty="0" err="1"/>
+              <a:t>possibly</a:t>
+            </a:r>
+            <a:r>
+              <a:rPr lang="fi-FI" dirty="0"/>
+              <a:t> </a:t>
+            </a:r>
+            <a:r>
+              <a:rPr lang="fi-FI" dirty="0" err="1"/>
+              <a:t>you</a:t>
+            </a:r>
+            <a:r>
+              <a:rPr lang="fi-FI" dirty="0"/>
+              <a:t> </a:t>
+            </a:r>
+            <a:r>
+              <a:rPr lang="fi-FI" dirty="0" err="1"/>
+              <a:t>want</a:t>
+            </a:r>
+            <a:r>
+              <a:rPr lang="fi-FI" dirty="0"/>
+              <a:t> to </a:t>
+            </a:r>
+            <a:r>
+              <a:rPr lang="fi-FI" dirty="0" err="1"/>
+              <a:t>use</a:t>
+            </a:r>
+            <a:r>
+              <a:rPr lang="fi-FI" dirty="0"/>
+              <a:t> </a:t>
+            </a:r>
+            <a:r>
+              <a:rPr lang="fi-FI" dirty="0" err="1"/>
+              <a:t>the</a:t>
+            </a:r>
+            <a:r>
+              <a:rPr lang="fi-FI" dirty="0"/>
+              <a:t> </a:t>
+            </a:r>
+            <a:r>
+              <a:rPr lang="fi-FI" dirty="0" err="1"/>
+              <a:t>same</a:t>
+            </a:r>
+            <a:r>
+              <a:rPr lang="fi-FI" dirty="0"/>
+              <a:t> for </a:t>
+            </a:r>
+            <a:r>
+              <a:rPr lang="fi-FI" dirty="0" err="1"/>
+              <a:t>simplicity</a:t>
+            </a:r>
+            <a:endParaRPr lang="fi-FI" dirty="0"/>
+          </a:p>
+          <a:p>
+            <a:pPr marL="789750" lvl="1" indent="-285750">
+              <a:buFont typeface="Arial" panose="020B0604020202020204" pitchFamily="34" charset="0"/>
+              <a:buChar char="•"/>
+            </a:pPr>
+            <a:r>
+              <a:rPr lang="fi-FI" dirty="0" err="1"/>
+              <a:t>Start</a:t>
+            </a:r>
+            <a:r>
+              <a:rPr lang="fi-FI" dirty="0"/>
+              <a:t> </a:t>
+            </a:r>
+            <a:r>
+              <a:rPr lang="fi-FI" dirty="0" err="1"/>
+              <a:t>the</a:t>
+            </a:r>
+            <a:r>
+              <a:rPr lang="fi-FI" dirty="0"/>
+              <a:t> </a:t>
+            </a:r>
+            <a:r>
+              <a:rPr lang="fi-FI" dirty="0" err="1"/>
+              <a:t>consumer</a:t>
+            </a:r>
+            <a:endParaRPr lang="fi-FI" dirty="0"/>
+          </a:p>
+          <a:p>
+            <a:pPr marL="789750" lvl="1" indent="-285750">
+              <a:buFont typeface="Arial" panose="020B0604020202020204" pitchFamily="34" charset="0"/>
+              <a:buChar char="•"/>
+            </a:pPr>
+            <a:endParaRPr lang="fi-FI" dirty="0"/>
+          </a:p>
+          <a:p>
+            <a:pPr marL="285750" indent="-285750">
+              <a:buFont typeface="Arial" panose="020B0604020202020204" pitchFamily="34" charset="0"/>
+              <a:buChar char="•"/>
+            </a:pPr>
+            <a:endParaRPr lang="fi-FI" dirty="0"/>
+          </a:p>
+          <a:p>
+            <a:pPr marL="285750" indent="-285750">
+              <a:buFont typeface="Arial" panose="020B0604020202020204" pitchFamily="34" charset="0"/>
+              <a:buChar char="•"/>
+            </a:pPr>
+            <a:endParaRPr lang="fi-FI" dirty="0"/>
+          </a:p>
+          <a:p>
+            <a:pPr marL="0" indent="0">
+              <a:buNone/>
+            </a:pPr>
+            <a:endParaRPr lang="fi-FI" dirty="0"/>
+          </a:p>
+        </p:txBody>
+      </p:sp>
+      <p:sp>
+        <p:nvSpPr>
+          <p:cNvPr id="5" name="Date Placeholder 4">
+            <a:extLst>
+              <a:ext uri="{FF2B5EF4-FFF2-40B4-BE49-F238E27FC236}">
+                <a16:creationId xmlns:a16="http://schemas.microsoft.com/office/drawing/2014/main" id="{CDF9BDDB-4154-894E-83EF-04FB624FF30E}"/>
               </a:ext>
             </a:extLst>
           </p:cNvPr>
@@ -14829,7 +15718,7 @@
           <a:bodyPr/>
           <a:lstStyle/>
           <a:p>
-            <a:fld id="{7A2E22EC-FB8F-BE4C-8513-60D11DB7758C}" type="datetime1">
+            <a:fld id="{551D5D1D-8623-7244-B1BC-5984C123D6C5}" type="datetime1">
               <a:rPr lang="fi-FI" smtClean="0"/>
               <a:t>11.10.2022</a:t>
             </a:fld>
@@ -14839,10 +15728,10 @@
       </p:sp>
       <p:sp>
         <p:nvSpPr>
-          <p:cNvPr id="4" name="Footer Placeholder 3">
-            <a:extLst>
-              <a:ext uri="{FF2B5EF4-FFF2-40B4-BE49-F238E27FC236}">
-                <a16:creationId xmlns:a16="http://schemas.microsoft.com/office/drawing/2014/main" id="{C8DE976D-5A91-AB4D-B2D0-A126959D8CD3}"/>
+          <p:cNvPr id="6" name="Footer Placeholder 5">
+            <a:extLst>
+              <a:ext uri="{FF2B5EF4-FFF2-40B4-BE49-F238E27FC236}">
+                <a16:creationId xmlns:a16="http://schemas.microsoft.com/office/drawing/2014/main" id="{DEED56F3-0862-1748-A7A9-EE5914100F54}"/>
               </a:ext>
             </a:extLst>
           </p:cNvPr>
@@ -14864,10 +15753,10 @@
       </p:sp>
       <p:sp>
         <p:nvSpPr>
-          <p:cNvPr id="5" name="Slide Number Placeholder 4">
-            <a:extLst>
-              <a:ext uri="{FF2B5EF4-FFF2-40B4-BE49-F238E27FC236}">
-                <a16:creationId xmlns:a16="http://schemas.microsoft.com/office/drawing/2014/main" id="{F8A06A27-2D07-2E41-8780-1ACD4314987F}"/>
+          <p:cNvPr id="7" name="Slide Number Placeholder 6">
+            <a:extLst>
+              <a:ext uri="{FF2B5EF4-FFF2-40B4-BE49-F238E27FC236}">
+                <a16:creationId xmlns:a16="http://schemas.microsoft.com/office/drawing/2014/main" id="{6CBC8079-2140-8745-901A-8EB4BF8EAF2D}"/>
               </a:ext>
             </a:extLst>
           </p:cNvPr>
@@ -14894,7 +15783,7 @@
     </p:spTree>
     <p:extLst>
       <p:ext uri="{BB962C8B-B14F-4D97-AF65-F5344CB8AC3E}">
-        <p14:creationId xmlns:p14="http://schemas.microsoft.com/office/powerpoint/2010/main" val="3239231242"/>
+        <p14:creationId xmlns:p14="http://schemas.microsoft.com/office/powerpoint/2010/main" val="326178029"/>
       </p:ext>
     </p:extLst>
   </p:cSld>
@@ -15461,6 +16350,15 @@
 </file>
 
 <file path=customXml/item1.xml><?xml version="1.0" encoding="utf-8"?>
+<?mso-contentType ?>
+<FormTemplates xmlns="http://schemas.microsoft.com/sharepoint/v3/contenttype/forms">
+  <Display>DocumentLibraryForm</Display>
+  <Edit>DocumentLibraryForm</Edit>
+  <New>DocumentLibraryForm</New>
+</FormTemplates>
+</file>
+
+<file path=customXml/item2.xml><?xml version="1.0" encoding="utf-8"?>
 <ct:contentTypeSchema xmlns:ct="http://schemas.microsoft.com/office/2006/metadata/contentType" xmlns:ma="http://schemas.microsoft.com/office/2006/metadata/properties/metaAttributes" ct:_="" ma:_="" ma:contentTypeName="Document" ma:contentTypeID="0x01010024C55B41993A414DABB8DD07ACBA0814" ma:contentTypeVersion="1" ma:contentTypeDescription="Create a new document." ma:contentTypeScope="" ma:versionID="3ea0c22b5866975a7b271665de4056c5">
   <xsd:schema xmlns:xsd="http://www.w3.org/2001/XMLSchema" xmlns:xs="http://www.w3.org/2001/XMLSchema" xmlns:p="http://schemas.microsoft.com/office/2006/metadata/properties" xmlns:ns1="http://schemas.microsoft.com/sharepoint/v3" targetNamespace="http://schemas.microsoft.com/office/2006/metadata/properties" ma:root="true" ma:fieldsID="ef2aa9ed40e72a78c3822fc753b43e87" ns1:_="">
     <xsd:import namespace="http://schemas.microsoft.com/sharepoint/v3"/>
@@ -15592,15 +16490,6 @@
 </ct:contentTypeSchema>
 </file>
 
-<file path=customXml/item2.xml><?xml version="1.0" encoding="utf-8"?>
-<?mso-contentType ?>
-<FormTemplates xmlns="http://schemas.microsoft.com/sharepoint/v3/contenttype/forms">
-  <Display>DocumentLibraryForm</Display>
-  <Edit>DocumentLibraryForm</Edit>
-  <New>DocumentLibraryForm</New>
-</FormTemplates>
-</file>
-
 <file path=customXml/item3.xml><?xml version="1.0" encoding="utf-8"?>
 <p:properties xmlns:p="http://schemas.microsoft.com/office/2006/metadata/properties" xmlns:xsi="http://www.w3.org/2001/XMLSchema-instance" xmlns:pc="http://schemas.microsoft.com/office/infopath/2007/PartnerControls">
   <documentManagement>
@@ -15611,6 +16500,14 @@
 </file>
 
 <file path=customXml/itemProps1.xml><?xml version="1.0" encoding="utf-8"?>
+<ds:datastoreItem xmlns:ds="http://schemas.openxmlformats.org/officeDocument/2006/customXml" ds:itemID="{D546C03B-CD3A-4EA0-AAA4-0E00E896454E}">
+  <ds:schemaRefs>
+    <ds:schemaRef ds:uri="http://schemas.microsoft.com/sharepoint/v3/contenttype/forms"/>
+  </ds:schemaRefs>
+</ds:datastoreItem>
+</file>
+
+<file path=customXml/itemProps2.xml><?xml version="1.0" encoding="utf-8"?>
 <ds:datastoreItem xmlns:ds="http://schemas.openxmlformats.org/officeDocument/2006/customXml" ds:itemID="{B9E4DC25-62AA-44A0-8D5C-DB44892588AF}">
   <ds:schemaRefs>
     <ds:schemaRef ds:uri="http://schemas.microsoft.com/office/2006/metadata/contentType"/>
@@ -15628,26 +16525,18 @@
 </ds:datastoreItem>
 </file>
 
-<file path=customXml/itemProps2.xml><?xml version="1.0" encoding="utf-8"?>
-<ds:datastoreItem xmlns:ds="http://schemas.openxmlformats.org/officeDocument/2006/customXml" ds:itemID="{D546C03B-CD3A-4EA0-AAA4-0E00E896454E}">
-  <ds:schemaRefs>
-    <ds:schemaRef ds:uri="http://schemas.microsoft.com/sharepoint/v3/contenttype/forms"/>
-  </ds:schemaRefs>
-</ds:datastoreItem>
-</file>
-
 <file path=customXml/itemProps3.xml><?xml version="1.0" encoding="utf-8"?>
 <ds:datastoreItem xmlns:ds="http://schemas.openxmlformats.org/officeDocument/2006/customXml" ds:itemID="{DED4E12E-7268-4B03-A47B-0755D62B5E31}">
   <ds:schemaRefs>
     <ds:schemaRef ds:uri="http://schemas.openxmlformats.org/package/2006/metadata/core-properties"/>
-    <ds:schemaRef ds:uri="http://schemas.microsoft.com/office/2006/documentManagement/types"/>
+    <ds:schemaRef ds:uri="http://purl.org/dc/terms/"/>
     <ds:schemaRef ds:uri="http://purl.org/dc/elements/1.1/"/>
+    <ds:schemaRef ds:uri="http://schemas.microsoft.com/sharepoint/v3"/>
     <ds:schemaRef ds:uri="http://www.w3.org/XML/1998/namespace"/>
     <ds:schemaRef ds:uri="http://purl.org/dc/dcmitype/"/>
+    <ds:schemaRef ds:uri="http://schemas.microsoft.com/office/2006/documentManagement/types"/>
     <ds:schemaRef ds:uri="http://schemas.microsoft.com/office/infopath/2007/PartnerControls"/>
-    <ds:schemaRef ds:uri="http://schemas.microsoft.com/sharepoint/v3"/>
     <ds:schemaRef ds:uri="http://schemas.microsoft.com/office/2006/metadata/properties"/>
-    <ds:schemaRef ds:uri="http://purl.org/dc/terms/"/>
   </ds:schemaRefs>
 </ds:datastoreItem>
 </file>
</xml_diff>

<commit_message>
Kafka task changed and polished for Spring 23
</commit_message>
<xml_diff>
--- a/06_ohjelmistoarkkitehtuurit_ja_patternit/ApacheKafka_DistributedEventStreamOrBroker.pptx
+++ b/06_ohjelmistoarkkitehtuurit_ja_patternit/ApacheKafka_DistributedEventStreamOrBroker.pptx
@@ -1200,7 +1200,7 @@
           <a:p>
             <a:fld id="{5645C365-1C26-6946-87AF-75D6A7DF4277}" type="datetimeFigureOut">
               <a:rPr lang="en-GB" smtClean="0"/>
-              <a:t>11/10/2022</a:t>
+              <a:t>12/03/2023</a:t>
             </a:fld>
             <a:endParaRPr lang="en-GB"/>
           </a:p>
@@ -1699,7 +1699,7 @@
           <a:p>
             <a:fld id="{35B864B8-8D08-7B43-B4FB-B2FB41A5D9E3}" type="datetime1">
               <a:rPr lang="fi-FI" smtClean="0"/>
-              <a:t>11.10.2022</a:t>
+              <a:t>12.3.2023</a:t>
             </a:fld>
             <a:endParaRPr lang="en-GB" dirty="0"/>
           </a:p>
@@ -2026,7 +2026,7 @@
           <a:p>
             <a:fld id="{D5AEA85A-FC56-D34C-9AA6-ECC3D2586F37}" type="datetime1">
               <a:rPr lang="fi-FI" smtClean="0"/>
-              <a:t>11.10.2022</a:t>
+              <a:t>12.3.2023</a:t>
             </a:fld>
             <a:endParaRPr lang="en-GB" dirty="0"/>
           </a:p>
@@ -2236,7 +2236,7 @@
           <a:p>
             <a:fld id="{E6BC6EEF-E660-7844-8930-418AFF95EA40}" type="datetime1">
               <a:rPr lang="fi-FI" smtClean="0"/>
-              <a:t>11.10.2022</a:t>
+              <a:t>12.3.2023</a:t>
             </a:fld>
             <a:endParaRPr lang="en-GB" dirty="0"/>
           </a:p>
@@ -2545,7 +2545,7 @@
           <a:p>
             <a:fld id="{4E10C7EC-C1C1-9849-A573-7692478FCD52}" type="datetime1">
               <a:rPr lang="fi-FI" smtClean="0"/>
-              <a:t>11.10.2022</a:t>
+              <a:t>12.3.2023</a:t>
             </a:fld>
             <a:endParaRPr lang="en-GB" dirty="0"/>
           </a:p>
@@ -2818,7 +2818,7 @@
           <a:p>
             <a:fld id="{844FF3FE-30BE-2040-9151-6FBC4992BF4F}" type="datetime1">
               <a:rPr lang="fi-FI" smtClean="0"/>
-              <a:t>11.10.2022</a:t>
+              <a:t>12.3.2023</a:t>
             </a:fld>
             <a:endParaRPr lang="en-GB" dirty="0"/>
           </a:p>
@@ -3058,7 +3058,7 @@
           <a:p>
             <a:fld id="{11EDCD7B-6966-E249-89F2-D46BDFBF56BE}" type="datetime1">
               <a:rPr lang="fi-FI" smtClean="0"/>
-              <a:t>11.10.2022</a:t>
+              <a:t>12.3.2023</a:t>
             </a:fld>
             <a:endParaRPr lang="en-GB" dirty="0"/>
           </a:p>
@@ -3351,7 +3351,7 @@
           <a:p>
             <a:fld id="{11EDCD7B-6966-E249-89F2-D46BDFBF56BE}" type="datetime1">
               <a:rPr lang="fi-FI" smtClean="0"/>
-              <a:t>11.10.2022</a:t>
+              <a:t>12.3.2023</a:t>
             </a:fld>
             <a:endParaRPr lang="en-GB" dirty="0"/>
           </a:p>
@@ -3790,7 +3790,7 @@
           <a:p>
             <a:fld id="{844FF3FE-30BE-2040-9151-6FBC4992BF4F}" type="datetime1">
               <a:rPr lang="fi-FI" smtClean="0"/>
-              <a:t>11.10.2022</a:t>
+              <a:t>12.3.2023</a:t>
             </a:fld>
             <a:endParaRPr lang="en-GB" dirty="0"/>
           </a:p>
@@ -4018,7 +4018,7 @@
           <a:p>
             <a:fld id="{11EDCD7B-6966-E249-89F2-D46BDFBF56BE}" type="datetime1">
               <a:rPr lang="fi-FI" smtClean="0"/>
-              <a:t>11.10.2022</a:t>
+              <a:t>12.3.2023</a:t>
             </a:fld>
             <a:endParaRPr lang="en-GB" dirty="0"/>
           </a:p>
@@ -4433,7 +4433,7 @@
           <a:p>
             <a:fld id="{B62E192A-D52B-F541-B2AA-4AEB9388F1F7}" type="datetime1">
               <a:rPr lang="fi-FI" smtClean="0"/>
-              <a:t>11.10.2022</a:t>
+              <a:t>12.3.2023</a:t>
             </a:fld>
             <a:endParaRPr lang="en-GB" dirty="0"/>
           </a:p>
@@ -4733,7 +4733,7 @@
           <a:p>
             <a:fld id="{EEA4FAA2-2B3E-264C-A42F-2D6D3EF33A3C}" type="datetime1">
               <a:rPr lang="fi-FI" smtClean="0"/>
-              <a:t>11.10.2022</a:t>
+              <a:t>12.3.2023</a:t>
             </a:fld>
             <a:endParaRPr lang="en-GB" dirty="0"/>
           </a:p>
@@ -5636,7 +5636,7 @@
           <a:p>
             <a:fld id="{B3114A65-8017-1743-A85A-B2A4BB835AE9}" type="datetime1">
               <a:rPr lang="fi-FI" smtClean="0"/>
-              <a:t>11.10.2022</a:t>
+              <a:t>12.3.2023</a:t>
             </a:fld>
             <a:endParaRPr lang="en-GB" dirty="0"/>
           </a:p>
@@ -5864,7 +5864,7 @@
           <a:p>
             <a:fld id="{11EDCD7B-6966-E249-89F2-D46BDFBF56BE}" type="datetime1">
               <a:rPr lang="fi-FI" smtClean="0"/>
-              <a:t>11.10.2022</a:t>
+              <a:t>12.3.2023</a:t>
             </a:fld>
             <a:endParaRPr lang="en-GB" dirty="0"/>
           </a:p>
@@ -6156,7 +6156,7 @@
           <a:p>
             <a:fld id="{45F98643-D206-614D-B596-3C8548138211}" type="datetime1">
               <a:rPr lang="fi-FI" smtClean="0"/>
-              <a:t>11.10.2022</a:t>
+              <a:t>12.3.2023</a:t>
             </a:fld>
             <a:endParaRPr lang="en-GB" dirty="0"/>
           </a:p>
@@ -6768,7 +6768,7 @@
           <a:p>
             <a:r>
               <a:rPr lang="en-GB" dirty="0"/>
-              <a:t>Modern alternative for arranging the architecture of larger information systems and the integration of several systems</a:t>
+              <a:t>Modern alternative for arranging the architecture of larger information systems and the integration of several systems in very flexible and scalable way</a:t>
             </a:r>
           </a:p>
         </p:txBody>
@@ -6796,7 +6796,7 @@
           <a:p>
             <a:fld id="{30BF63A1-919F-FB49-ABA8-182126D24C50}" type="datetime1">
               <a:rPr lang="fi-FI" smtClean="0"/>
-              <a:t>11.10.2022</a:t>
+              <a:t>12.3.2023</a:t>
             </a:fld>
             <a:endParaRPr lang="en-GB" dirty="0"/>
           </a:p>
@@ -6942,11 +6942,11 @@
             </a:r>
             <a:r>
               <a:rPr lang="fi-FI" dirty="0" err="1"/>
-              <a:t>worklife</a:t>
-            </a:r>
-            <a:r>
-              <a:rPr lang="fi-FI" dirty="0"/>
-              <a:t> </a:t>
+              <a:t>work</a:t>
+            </a:r>
+            <a:r>
+              <a:rPr lang="fi-FI"/>
+              <a:t>-life </a:t>
             </a:r>
             <a:r>
               <a:rPr lang="fi-FI" dirty="0" err="1"/>
@@ -6967,6 +6967,10 @@
             <a:r>
               <a:rPr lang="fi-FI" dirty="0" err="1"/>
               <a:t>activities</a:t>
+            </a:r>
+            <a:r>
+              <a:rPr lang="fi-FI" dirty="0"/>
+              <a:t>!</a:t>
             </a:r>
             <a:endParaRPr lang="LID4096" dirty="0"/>
           </a:p>
@@ -6995,7 +6999,7 @@
           <a:p>
             <a:fld id="{7A2E22EC-FB8F-BE4C-8513-60D11DB7758C}" type="datetime1">
               <a:rPr lang="fi-FI" smtClean="0"/>
-              <a:t>11.10.2022</a:t>
+              <a:t>12.3.2023</a:t>
             </a:fld>
             <a:endParaRPr lang="en-GB"/>
           </a:p>
@@ -7249,7 +7253,7 @@
           <a:p>
             <a:fld id="{551D5D1D-8623-7244-B1BC-5984C123D6C5}" type="datetime1">
               <a:rPr lang="fi-FI" smtClean="0"/>
-              <a:t>11.10.2022</a:t>
+              <a:t>12.3.2023</a:t>
             </a:fld>
             <a:endParaRPr lang="en-GB"/>
           </a:p>
@@ -8152,7 +8156,7 @@
           <a:p>
             <a:fld id="{551D5D1D-8623-7244-B1BC-5984C123D6C5}" type="datetime1">
               <a:rPr lang="fi-FI" smtClean="0"/>
-              <a:t>11.10.2022</a:t>
+              <a:t>12.3.2023</a:t>
             </a:fld>
             <a:endParaRPr lang="en-GB"/>
           </a:p>
@@ -8460,7 +8464,7 @@
             </a:r>
             <a:r>
               <a:rPr lang="fi-FI" dirty="0"/>
-              <a:t>/ (Queue) / (</a:t>
+              <a:t>/ (*Queue) / (</a:t>
             </a:r>
             <a:r>
               <a:rPr lang="fi-FI" dirty="0" err="1"/>
@@ -8926,6 +8930,263 @@
             <a:r>
               <a:rPr lang="fi-FI" dirty="0"/>
               <a:t>)</a:t>
+            </a:r>
+          </a:p>
+          <a:p>
+            <a:pPr marL="285750" indent="-285750">
+              <a:buFont typeface="Arial" panose="020B0604020202020204" pitchFamily="34" charset="0"/>
+              <a:buChar char="•"/>
+            </a:pPr>
+            <a:endParaRPr lang="fi-FI" dirty="0"/>
+          </a:p>
+          <a:p>
+            <a:pPr marL="285750" indent="-285750">
+              <a:buFont typeface="Arial" panose="020B0604020202020204" pitchFamily="34" charset="0"/>
+              <a:buChar char="•"/>
+            </a:pPr>
+            <a:endParaRPr lang="fi-FI" dirty="0"/>
+          </a:p>
+          <a:p>
+            <a:pPr marL="285750" indent="-285750">
+              <a:buFont typeface="Arial" panose="020B0604020202020204" pitchFamily="34" charset="0"/>
+              <a:buChar char="•"/>
+            </a:pPr>
+            <a:endParaRPr lang="fi-FI" dirty="0"/>
+          </a:p>
+          <a:p>
+            <a:pPr marL="285750" indent="-285750">
+              <a:buFont typeface="Arial" panose="020B0604020202020204" pitchFamily="34" charset="0"/>
+              <a:buChar char="•"/>
+            </a:pPr>
+            <a:r>
+              <a:rPr lang="fi-FI" dirty="0">
+                <a:solidFill>
+                  <a:schemeClr val="bg1">
+                    <a:lumMod val="65000"/>
+                  </a:schemeClr>
+                </a:solidFill>
+              </a:rPr>
+              <a:t>(* </a:t>
+            </a:r>
+            <a:r>
+              <a:rPr lang="fi-FI" dirty="0" err="1">
+                <a:solidFill>
+                  <a:schemeClr val="bg1">
+                    <a:lumMod val="65000"/>
+                  </a:schemeClr>
+                </a:solidFill>
+              </a:rPr>
+              <a:t>with</a:t>
+            </a:r>
+            <a:r>
+              <a:rPr lang="fi-FI" dirty="0">
+                <a:solidFill>
+                  <a:schemeClr val="bg1">
+                    <a:lumMod val="65000"/>
+                  </a:schemeClr>
+                </a:solidFill>
+              </a:rPr>
+              <a:t> </a:t>
+            </a:r>
+            <a:r>
+              <a:rPr lang="fi-FI" dirty="0" err="1">
+                <a:solidFill>
+                  <a:schemeClr val="bg1">
+                    <a:lumMod val="65000"/>
+                  </a:schemeClr>
+                </a:solidFill>
+              </a:rPr>
+              <a:t>settings</a:t>
+            </a:r>
+            <a:r>
+              <a:rPr lang="fi-FI" dirty="0">
+                <a:solidFill>
+                  <a:schemeClr val="bg1">
+                    <a:lumMod val="65000"/>
+                  </a:schemeClr>
+                </a:solidFill>
+              </a:rPr>
+              <a:t> </a:t>
+            </a:r>
+            <a:r>
+              <a:rPr lang="fi-FI" dirty="0" err="1">
+                <a:solidFill>
+                  <a:schemeClr val="bg1">
+                    <a:lumMod val="65000"/>
+                  </a:schemeClr>
+                </a:solidFill>
+              </a:rPr>
+              <a:t>it’s</a:t>
+            </a:r>
+            <a:r>
+              <a:rPr lang="fi-FI" dirty="0">
+                <a:solidFill>
+                  <a:schemeClr val="bg1">
+                    <a:lumMod val="65000"/>
+                  </a:schemeClr>
+                </a:solidFill>
+              </a:rPr>
+              <a:t> </a:t>
+            </a:r>
+            <a:r>
+              <a:rPr lang="fi-FI" dirty="0" err="1">
+                <a:solidFill>
+                  <a:schemeClr val="bg1">
+                    <a:lumMod val="65000"/>
+                  </a:schemeClr>
+                </a:solidFill>
+              </a:rPr>
+              <a:t>possible</a:t>
+            </a:r>
+            <a:r>
+              <a:rPr lang="fi-FI" dirty="0">
+                <a:solidFill>
+                  <a:schemeClr val="bg1">
+                    <a:lumMod val="65000"/>
+                  </a:schemeClr>
+                </a:solidFill>
+              </a:rPr>
+              <a:t> to </a:t>
+            </a:r>
+            <a:r>
+              <a:rPr lang="fi-FI" dirty="0" err="1">
+                <a:solidFill>
+                  <a:schemeClr val="bg1">
+                    <a:lumMod val="65000"/>
+                  </a:schemeClr>
+                </a:solidFill>
+              </a:rPr>
+              <a:t>make</a:t>
+            </a:r>
+            <a:r>
+              <a:rPr lang="fi-FI" dirty="0">
+                <a:solidFill>
+                  <a:schemeClr val="bg1">
+                    <a:lumMod val="65000"/>
+                  </a:schemeClr>
+                </a:solidFill>
+              </a:rPr>
+              <a:t> it </a:t>
+            </a:r>
+            <a:r>
+              <a:rPr lang="fi-FI" dirty="0" err="1">
+                <a:solidFill>
+                  <a:schemeClr val="bg1">
+                    <a:lumMod val="65000"/>
+                  </a:schemeClr>
+                </a:solidFill>
+              </a:rPr>
+              <a:t>reversed</a:t>
+            </a:r>
+            <a:r>
+              <a:rPr lang="fi-FI" dirty="0">
+                <a:solidFill>
+                  <a:schemeClr val="bg1">
+                    <a:lumMod val="65000"/>
+                  </a:schemeClr>
+                </a:solidFill>
+              </a:rPr>
+              <a:t> as </a:t>
+            </a:r>
+            <a:r>
+              <a:rPr lang="fi-FI" dirty="0" err="1">
+                <a:solidFill>
+                  <a:schemeClr val="bg1">
+                    <a:lumMod val="65000"/>
+                  </a:schemeClr>
+                </a:solidFill>
+              </a:rPr>
+              <a:t>Stack</a:t>
+            </a:r>
+            <a:r>
+              <a:rPr lang="fi-FI" dirty="0">
+                <a:solidFill>
+                  <a:schemeClr val="bg1">
+                    <a:lumMod val="65000"/>
+                  </a:schemeClr>
+                </a:solidFill>
+              </a:rPr>
+              <a:t> </a:t>
+            </a:r>
+            <a:r>
+              <a:rPr lang="fi-FI" dirty="0" err="1">
+                <a:solidFill>
+                  <a:schemeClr val="bg1">
+                    <a:lumMod val="65000"/>
+                  </a:schemeClr>
+                </a:solidFill>
+              </a:rPr>
+              <a:t>too</a:t>
+            </a:r>
+            <a:r>
+              <a:rPr lang="fi-FI" dirty="0">
+                <a:solidFill>
+                  <a:schemeClr val="bg1">
+                    <a:lumMod val="65000"/>
+                  </a:schemeClr>
+                </a:solidFill>
+              </a:rPr>
+              <a:t>, </a:t>
+            </a:r>
+            <a:r>
+              <a:rPr lang="fi-FI" dirty="0" err="1">
+                <a:solidFill>
+                  <a:schemeClr val="bg1">
+                    <a:lumMod val="65000"/>
+                  </a:schemeClr>
+                </a:solidFill>
+              </a:rPr>
+              <a:t>Last</a:t>
+            </a:r>
+            <a:r>
+              <a:rPr lang="fi-FI" dirty="0">
+                <a:solidFill>
+                  <a:schemeClr val="bg1">
+                    <a:lumMod val="65000"/>
+                  </a:schemeClr>
+                </a:solidFill>
+              </a:rPr>
+              <a:t> in-</a:t>
+            </a:r>
+            <a:r>
+              <a:rPr lang="fi-FI" dirty="0" err="1">
+                <a:solidFill>
+                  <a:schemeClr val="bg1">
+                    <a:lumMod val="65000"/>
+                  </a:schemeClr>
+                </a:solidFill>
+              </a:rPr>
+              <a:t>First</a:t>
+            </a:r>
+            <a:r>
+              <a:rPr lang="fi-FI" dirty="0">
+                <a:solidFill>
+                  <a:schemeClr val="bg1">
+                    <a:lumMod val="65000"/>
+                  </a:schemeClr>
+                </a:solidFill>
+              </a:rPr>
+              <a:t> out </a:t>
+            </a:r>
+            <a:r>
+              <a:rPr lang="fi-FI" dirty="0" err="1">
+                <a:solidFill>
+                  <a:schemeClr val="bg1">
+                    <a:lumMod val="65000"/>
+                  </a:schemeClr>
+                </a:solidFill>
+              </a:rPr>
+              <a:t>that</a:t>
+            </a:r>
+            <a:r>
+              <a:rPr lang="fi-FI" dirty="0">
+                <a:solidFill>
+                  <a:schemeClr val="bg1">
+                    <a:lumMod val="65000"/>
+                  </a:schemeClr>
+                </a:solidFill>
+              </a:rPr>
+              <a:t> is)</a:t>
             </a:r>
           </a:p>
           <a:p>
@@ -8959,7 +9220,7 @@
           <a:p>
             <a:fld id="{551D5D1D-8623-7244-B1BC-5984C123D6C5}" type="datetime1">
               <a:rPr lang="fi-FI" smtClean="0"/>
-              <a:t>11.10.2022</a:t>
+              <a:t>12.3.2023</a:t>
             </a:fld>
             <a:endParaRPr lang="en-GB"/>
           </a:p>
@@ -10001,7 +10262,7 @@
           <a:p>
             <a:fld id="{551D5D1D-8623-7244-B1BC-5984C123D6C5}" type="datetime1">
               <a:rPr lang="fi-FI" smtClean="0"/>
-              <a:t>11.10.2022</a:t>
+              <a:t>12.3.2023</a:t>
             </a:fld>
             <a:endParaRPr lang="en-GB"/>
           </a:p>
@@ -10300,7 +10561,7 @@
           <a:p>
             <a:fld id="{551D5D1D-8623-7244-B1BC-5984C123D6C5}" type="datetime1">
               <a:rPr lang="fi-FI" smtClean="0"/>
-              <a:t>11.10.2022</a:t>
+              <a:t>12.3.2023</a:t>
             </a:fld>
             <a:endParaRPr lang="en-GB"/>
           </a:p>
@@ -12217,7 +12478,7 @@
           <a:p>
             <a:fld id="{551D5D1D-8623-7244-B1BC-5984C123D6C5}" type="datetime1">
               <a:rPr lang="fi-FI" smtClean="0"/>
-              <a:t>11.10.2022</a:t>
+              <a:t>12.3.2023</a:t>
             </a:fld>
             <a:endParaRPr lang="en-GB"/>
           </a:p>
@@ -14813,7 +15074,7 @@
           <a:p>
             <a:fld id="{551D5D1D-8623-7244-B1BC-5984C123D6C5}" type="datetime1">
               <a:rPr lang="fi-FI" smtClean="0"/>
-              <a:t>11.10.2022</a:t>
+              <a:t>12.3.2023</a:t>
             </a:fld>
             <a:endParaRPr lang="en-GB"/>
           </a:p>
@@ -15720,7 +15981,7 @@
           <a:p>
             <a:fld id="{551D5D1D-8623-7244-B1BC-5984C123D6C5}" type="datetime1">
               <a:rPr lang="fi-FI" smtClean="0"/>
-              <a:t>11.10.2022</a:t>
+              <a:t>12.3.2023</a:t>
             </a:fld>
             <a:endParaRPr lang="en-GB"/>
           </a:p>
@@ -16350,12 +16611,12 @@
 </file>
 
 <file path=customXml/item1.xml><?xml version="1.0" encoding="utf-8"?>
-<?mso-contentType ?>
-<FormTemplates xmlns="http://schemas.microsoft.com/sharepoint/v3/contenttype/forms">
-  <Display>DocumentLibraryForm</Display>
-  <Edit>DocumentLibraryForm</Edit>
-  <New>DocumentLibraryForm</New>
-</FormTemplates>
+<p:properties xmlns:p="http://schemas.microsoft.com/office/2006/metadata/properties" xmlns:xsi="http://www.w3.org/2001/XMLSchema-instance" xmlns:pc="http://schemas.microsoft.com/office/infopath/2007/PartnerControls">
+  <documentManagement>
+    <PublishingExpirationDate xmlns="http://schemas.microsoft.com/sharepoint/v3" xsi:nil="true"/>
+    <PublishingStartDate xmlns="http://schemas.microsoft.com/sharepoint/v3" xsi:nil="true"/>
+  </documentManagement>
+</p:properties>
 </file>
 
 <file path=customXml/item2.xml><?xml version="1.0" encoding="utf-8"?>
@@ -16491,18 +16752,26 @@
 </file>
 
 <file path=customXml/item3.xml><?xml version="1.0" encoding="utf-8"?>
-<p:properties xmlns:p="http://schemas.microsoft.com/office/2006/metadata/properties" xmlns:xsi="http://www.w3.org/2001/XMLSchema-instance" xmlns:pc="http://schemas.microsoft.com/office/infopath/2007/PartnerControls">
-  <documentManagement>
-    <PublishingExpirationDate xmlns="http://schemas.microsoft.com/sharepoint/v3" xsi:nil="true"/>
-    <PublishingStartDate xmlns="http://schemas.microsoft.com/sharepoint/v3" xsi:nil="true"/>
-  </documentManagement>
-</p:properties>
+<?mso-contentType ?>
+<FormTemplates xmlns="http://schemas.microsoft.com/sharepoint/v3/contenttype/forms">
+  <Display>DocumentLibraryForm</Display>
+  <Edit>DocumentLibraryForm</Edit>
+  <New>DocumentLibraryForm</New>
+</FormTemplates>
 </file>
 
 <file path=customXml/itemProps1.xml><?xml version="1.0" encoding="utf-8"?>
-<ds:datastoreItem xmlns:ds="http://schemas.openxmlformats.org/officeDocument/2006/customXml" ds:itemID="{D546C03B-CD3A-4EA0-AAA4-0E00E896454E}">
+<ds:datastoreItem xmlns:ds="http://schemas.openxmlformats.org/officeDocument/2006/customXml" ds:itemID="{DED4E12E-7268-4B03-A47B-0755D62B5E31}">
   <ds:schemaRefs>
-    <ds:schemaRef ds:uri="http://schemas.microsoft.com/sharepoint/v3/contenttype/forms"/>
+    <ds:schemaRef ds:uri="http://schemas.openxmlformats.org/package/2006/metadata/core-properties"/>
+    <ds:schemaRef ds:uri="http://purl.org/dc/terms/"/>
+    <ds:schemaRef ds:uri="http://purl.org/dc/elements/1.1/"/>
+    <ds:schemaRef ds:uri="http://schemas.microsoft.com/sharepoint/v3"/>
+    <ds:schemaRef ds:uri="http://www.w3.org/XML/1998/namespace"/>
+    <ds:schemaRef ds:uri="http://purl.org/dc/dcmitype/"/>
+    <ds:schemaRef ds:uri="http://schemas.microsoft.com/office/2006/documentManagement/types"/>
+    <ds:schemaRef ds:uri="http://schemas.microsoft.com/office/infopath/2007/PartnerControls"/>
+    <ds:schemaRef ds:uri="http://schemas.microsoft.com/office/2006/metadata/properties"/>
   </ds:schemaRefs>
 </ds:datastoreItem>
 </file>
@@ -16526,17 +16795,9 @@
 </file>
 
 <file path=customXml/itemProps3.xml><?xml version="1.0" encoding="utf-8"?>
-<ds:datastoreItem xmlns:ds="http://schemas.openxmlformats.org/officeDocument/2006/customXml" ds:itemID="{DED4E12E-7268-4B03-A47B-0755D62B5E31}">
+<ds:datastoreItem xmlns:ds="http://schemas.openxmlformats.org/officeDocument/2006/customXml" ds:itemID="{D546C03B-CD3A-4EA0-AAA4-0E00E896454E}">
   <ds:schemaRefs>
-    <ds:schemaRef ds:uri="http://schemas.openxmlformats.org/package/2006/metadata/core-properties"/>
-    <ds:schemaRef ds:uri="http://purl.org/dc/terms/"/>
-    <ds:schemaRef ds:uri="http://purl.org/dc/elements/1.1/"/>
-    <ds:schemaRef ds:uri="http://schemas.microsoft.com/sharepoint/v3"/>
-    <ds:schemaRef ds:uri="http://www.w3.org/XML/1998/namespace"/>
-    <ds:schemaRef ds:uri="http://purl.org/dc/dcmitype/"/>
-    <ds:schemaRef ds:uri="http://schemas.microsoft.com/office/2006/documentManagement/types"/>
-    <ds:schemaRef ds:uri="http://schemas.microsoft.com/office/infopath/2007/PartnerControls"/>
-    <ds:schemaRef ds:uri="http://schemas.microsoft.com/office/2006/metadata/properties"/>
+    <ds:schemaRef ds:uri="http://schemas.microsoft.com/sharepoint/v3/contenttype/forms"/>
   </ds:schemaRefs>
 </ds:datastoreItem>
 </file>
</xml_diff>